<commit_message>
traying training with the other implementation as well
</commit_message>
<xml_diff>
--- a/images/images.pptx
+++ b/images/images.pptx
@@ -9,6 +9,9 @@
     <p:sldId id="262" r:id="rId3"/>
     <p:sldId id="261" r:id="rId4"/>
     <p:sldId id="259" r:id="rId5"/>
+    <p:sldId id="263" r:id="rId6"/>
+    <p:sldId id="264" r:id="rId7"/>
+    <p:sldId id="265" r:id="rId8"/>
   </p:sldIdLst>
   <p:sldSz cx="12192000" cy="6858000"/>
   <p:notesSz cx="6858000" cy="9144000"/>
@@ -346,7 +349,7 @@
           <a:p>
             <a:fld id="{77668D65-797A-CD4A-9857-9804BB008E34}" type="datetimeFigureOut">
               <a:rPr lang="en-US" smtClean="0"/>
-              <a:t>3/1/19</a:t>
+              <a:t>3/11/19</a:t>
             </a:fld>
             <a:endParaRPr lang="en-US"/>
           </a:p>
@@ -544,7 +547,7 @@
           <a:p>
             <a:fld id="{77668D65-797A-CD4A-9857-9804BB008E34}" type="datetimeFigureOut">
               <a:rPr lang="en-US" smtClean="0"/>
-              <a:t>3/1/19</a:t>
+              <a:t>3/11/19</a:t>
             </a:fld>
             <a:endParaRPr lang="en-US"/>
           </a:p>
@@ -752,7 +755,7 @@
           <a:p>
             <a:fld id="{77668D65-797A-CD4A-9857-9804BB008E34}" type="datetimeFigureOut">
               <a:rPr lang="en-US" smtClean="0"/>
-              <a:t>3/1/19</a:t>
+              <a:t>3/11/19</a:t>
             </a:fld>
             <a:endParaRPr lang="en-US"/>
           </a:p>
@@ -950,7 +953,7 @@
           <a:p>
             <a:fld id="{77668D65-797A-CD4A-9857-9804BB008E34}" type="datetimeFigureOut">
               <a:rPr lang="en-US" smtClean="0"/>
-              <a:t>3/1/19</a:t>
+              <a:t>3/11/19</a:t>
             </a:fld>
             <a:endParaRPr lang="en-US"/>
           </a:p>
@@ -1225,7 +1228,7 @@
           <a:p>
             <a:fld id="{77668D65-797A-CD4A-9857-9804BB008E34}" type="datetimeFigureOut">
               <a:rPr lang="en-US" smtClean="0"/>
-              <a:t>3/1/19</a:t>
+              <a:t>3/11/19</a:t>
             </a:fld>
             <a:endParaRPr lang="en-US"/>
           </a:p>
@@ -1490,7 +1493,7 @@
           <a:p>
             <a:fld id="{77668D65-797A-CD4A-9857-9804BB008E34}" type="datetimeFigureOut">
               <a:rPr lang="en-US" smtClean="0"/>
-              <a:t>3/1/19</a:t>
+              <a:t>3/11/19</a:t>
             </a:fld>
             <a:endParaRPr lang="en-US"/>
           </a:p>
@@ -1902,7 +1905,7 @@
           <a:p>
             <a:fld id="{77668D65-797A-CD4A-9857-9804BB008E34}" type="datetimeFigureOut">
               <a:rPr lang="en-US" smtClean="0"/>
-              <a:t>3/1/19</a:t>
+              <a:t>3/11/19</a:t>
             </a:fld>
             <a:endParaRPr lang="en-US"/>
           </a:p>
@@ -2043,7 +2046,7 @@
           <a:p>
             <a:fld id="{77668D65-797A-CD4A-9857-9804BB008E34}" type="datetimeFigureOut">
               <a:rPr lang="en-US" smtClean="0"/>
-              <a:t>3/1/19</a:t>
+              <a:t>3/11/19</a:t>
             </a:fld>
             <a:endParaRPr lang="en-US"/>
           </a:p>
@@ -2156,7 +2159,7 @@
           <a:p>
             <a:fld id="{77668D65-797A-CD4A-9857-9804BB008E34}" type="datetimeFigureOut">
               <a:rPr lang="en-US" smtClean="0"/>
-              <a:t>3/1/19</a:t>
+              <a:t>3/11/19</a:t>
             </a:fld>
             <a:endParaRPr lang="en-US"/>
           </a:p>
@@ -2467,7 +2470,7 @@
           <a:p>
             <a:fld id="{77668D65-797A-CD4A-9857-9804BB008E34}" type="datetimeFigureOut">
               <a:rPr lang="en-US" smtClean="0"/>
-              <a:t>3/1/19</a:t>
+              <a:t>3/11/19</a:t>
             </a:fld>
             <a:endParaRPr lang="en-US"/>
           </a:p>
@@ -2755,7 +2758,7 @@
           <a:p>
             <a:fld id="{77668D65-797A-CD4A-9857-9804BB008E34}" type="datetimeFigureOut">
               <a:rPr lang="en-US" smtClean="0"/>
-              <a:t>3/1/19</a:t>
+              <a:t>3/11/19</a:t>
             </a:fld>
             <a:endParaRPr lang="en-US"/>
           </a:p>
@@ -2996,7 +2999,7 @@
           <a:p>
             <a:fld id="{77668D65-797A-CD4A-9857-9804BB008E34}" type="datetimeFigureOut">
               <a:rPr lang="en-US" smtClean="0"/>
-              <a:t>3/1/19</a:t>
+              <a:t>3/11/19</a:t>
             </a:fld>
             <a:endParaRPr lang="en-US"/>
           </a:p>
@@ -5358,8 +5361,8 @@
           </a:p>
         </p:txBody>
       </p:sp>
-      <mc:AlternateContent xmlns:mc="http://schemas.openxmlformats.org/markup-compatibility/2006" xmlns:a14="http://schemas.microsoft.com/office/drawing/2010/main">
-        <mc:Choice Requires="a14">
+      <mc:AlternateContent xmlns:mc="http://schemas.openxmlformats.org/markup-compatibility/2006">
+        <mc:Choice xmlns:a14="http://schemas.microsoft.com/office/drawing/2010/main" Requires="a14">
           <p:sp>
             <p:nvSpPr>
               <p:cNvPr id="35" name="TextBox 34">
@@ -5374,7 +5377,7 @@
             </p:nvSpPr>
             <p:spPr>
               <a:xfrm>
-                <a:off x="10762962" y="1198591"/>
+                <a:off x="10745032" y="1144801"/>
                 <a:ext cx="365741" cy="369332"/>
               </a:xfrm>
               <a:prstGeom prst="rect">
@@ -5409,7 +5412,7 @@
             </p:txBody>
           </p:sp>
         </mc:Choice>
-        <mc:Fallback xmlns="">
+        <mc:Fallback>
           <p:sp>
             <p:nvSpPr>
               <p:cNvPr id="35" name="TextBox 34">
@@ -5426,7 +5429,7 @@
             </p:nvSpPr>
             <p:spPr>
               <a:xfrm>
-                <a:off x="10762962" y="1198591"/>
+                <a:off x="10745032" y="1144801"/>
                 <a:ext cx="365741" cy="369332"/>
               </a:xfrm>
               <a:prstGeom prst="rect">
@@ -17494,8 +17497,8 @@
           </p:sp>
         </mc:Fallback>
       </mc:AlternateContent>
-      <mc:AlternateContent xmlns:mc="http://schemas.openxmlformats.org/markup-compatibility/2006">
-        <mc:Choice xmlns:a14="http://schemas.microsoft.com/office/drawing/2010/main" Requires="a14">
+      <mc:AlternateContent xmlns:mc="http://schemas.openxmlformats.org/markup-compatibility/2006" xmlns:a14="http://schemas.microsoft.com/office/drawing/2010/main">
+        <mc:Choice Requires="a14">
           <p:sp>
             <p:nvSpPr>
               <p:cNvPr id="59" name="TextBox 58">
@@ -17564,7 +17567,7 @@
             </p:txBody>
           </p:sp>
         </mc:Choice>
-        <mc:Fallback>
+        <mc:Fallback xmlns="">
           <p:sp>
             <p:nvSpPr>
               <p:cNvPr id="59" name="TextBox 58">
@@ -22034,8 +22037,8 @@
           </a:fontRef>
         </p:style>
       </p:cxnSp>
-      <mc:AlternateContent xmlns:mc="http://schemas.openxmlformats.org/markup-compatibility/2006">
-        <mc:Choice xmlns:a14="http://schemas.microsoft.com/office/drawing/2010/main" Requires="a14">
+      <mc:AlternateContent xmlns:mc="http://schemas.openxmlformats.org/markup-compatibility/2006" xmlns:a14="http://schemas.microsoft.com/office/drawing/2010/main">
+        <mc:Choice Requires="a14">
           <p:sp>
             <p:nvSpPr>
               <p:cNvPr id="112" name="Rectangle 111">
@@ -22144,7 +22147,7 @@
             </p:txBody>
           </p:sp>
         </mc:Choice>
-        <mc:Fallback>
+        <mc:Fallback xmlns="">
           <p:sp>
             <p:nvSpPr>
               <p:cNvPr id="112" name="Rectangle 111">
@@ -22197,8 +22200,8 @@
           </p:sp>
         </mc:Fallback>
       </mc:AlternateContent>
-      <mc:AlternateContent xmlns:mc="http://schemas.openxmlformats.org/markup-compatibility/2006">
-        <mc:Choice xmlns:a14="http://schemas.microsoft.com/office/drawing/2010/main" Requires="a14">
+      <mc:AlternateContent xmlns:mc="http://schemas.openxmlformats.org/markup-compatibility/2006" xmlns:a14="http://schemas.microsoft.com/office/drawing/2010/main">
+        <mc:Choice Requires="a14">
           <p:sp>
             <p:nvSpPr>
               <p:cNvPr id="113" name="Rectangle 112">
@@ -22307,7 +22310,7 @@
             </p:txBody>
           </p:sp>
         </mc:Choice>
-        <mc:Fallback>
+        <mc:Fallback xmlns="">
           <p:sp>
             <p:nvSpPr>
               <p:cNvPr id="113" name="Rectangle 112">
@@ -22360,8 +22363,8 @@
           </p:sp>
         </mc:Fallback>
       </mc:AlternateContent>
-      <mc:AlternateContent xmlns:mc="http://schemas.openxmlformats.org/markup-compatibility/2006">
-        <mc:Choice xmlns:a14="http://schemas.microsoft.com/office/drawing/2010/main" Requires="a14">
+      <mc:AlternateContent xmlns:mc="http://schemas.openxmlformats.org/markup-compatibility/2006" xmlns:a14="http://schemas.microsoft.com/office/drawing/2010/main">
+        <mc:Choice Requires="a14">
           <p:sp>
             <p:nvSpPr>
               <p:cNvPr id="114" name="Rectangle 113">
@@ -22441,7 +22444,7 @@
             </p:txBody>
           </p:sp>
         </mc:Choice>
-        <mc:Fallback>
+        <mc:Fallback xmlns="">
           <p:sp>
             <p:nvSpPr>
               <p:cNvPr id="114" name="Rectangle 113">
@@ -22494,8 +22497,8 @@
           </p:sp>
         </mc:Fallback>
       </mc:AlternateContent>
-      <mc:AlternateContent xmlns:mc="http://schemas.openxmlformats.org/markup-compatibility/2006">
-        <mc:Choice xmlns:a14="http://schemas.microsoft.com/office/drawing/2010/main" Requires="a14">
+      <mc:AlternateContent xmlns:mc="http://schemas.openxmlformats.org/markup-compatibility/2006" xmlns:a14="http://schemas.microsoft.com/office/drawing/2010/main">
+        <mc:Choice Requires="a14">
           <p:sp>
             <p:nvSpPr>
               <p:cNvPr id="115" name="Rectangle 114">
@@ -22605,7 +22608,7 @@
             </p:txBody>
           </p:sp>
         </mc:Choice>
-        <mc:Fallback>
+        <mc:Fallback xmlns="">
           <p:sp>
             <p:nvSpPr>
               <p:cNvPr id="115" name="Rectangle 114">
@@ -23370,6 +23373,4306 @@
     <p:extLst>
       <p:ext uri="{BB962C8B-B14F-4D97-AF65-F5344CB8AC3E}">
         <p14:creationId xmlns:p14="http://schemas.microsoft.com/office/powerpoint/2010/main" val="2468987005"/>
+      </p:ext>
+    </p:extLst>
+  </p:cSld>
+  <p:clrMapOvr>
+    <a:masterClrMapping/>
+  </p:clrMapOvr>
+</p:sld>
+</file>
+
+<file path=ppt/slides/slide5.xml><?xml version="1.0" encoding="utf-8"?>
+<p:sld xmlns:a="http://schemas.openxmlformats.org/drawingml/2006/main" xmlns:r="http://schemas.openxmlformats.org/officeDocument/2006/relationships" xmlns:p="http://schemas.openxmlformats.org/presentationml/2006/main">
+  <p:cSld>
+    <p:spTree>
+      <p:nvGrpSpPr>
+        <p:cNvPr id="1" name=""/>
+        <p:cNvGrpSpPr/>
+        <p:nvPr/>
+      </p:nvGrpSpPr>
+      <p:grpSpPr>
+        <a:xfrm>
+          <a:off x="0" y="0"/>
+          <a:ext cx="0" cy="0"/>
+          <a:chOff x="0" y="0"/>
+          <a:chExt cx="0" cy="0"/>
+        </a:xfrm>
+      </p:grpSpPr>
+      <p:sp>
+        <p:nvSpPr>
+          <p:cNvPr id="2" name="Rectangle 1">
+            <a:extLst>
+              <a:ext uri="{FF2B5EF4-FFF2-40B4-BE49-F238E27FC236}">
+                <a16:creationId xmlns:a16="http://schemas.microsoft.com/office/drawing/2014/main" id="{67D53CA7-C2B3-E845-B5C7-0EACC5B33975}"/>
+              </a:ext>
+            </a:extLst>
+          </p:cNvPr>
+          <p:cNvSpPr/>
+          <p:nvPr/>
+        </p:nvSpPr>
+        <p:spPr>
+          <a:xfrm>
+            <a:off x="824733" y="2637410"/>
+            <a:ext cx="1712259" cy="896470"/>
+          </a:xfrm>
+          <a:prstGeom prst="rect">
+            <a:avLst/>
+          </a:prstGeom>
+          <a:solidFill>
+            <a:schemeClr val="accent5">
+              <a:lumMod val="40000"/>
+              <a:lumOff val="60000"/>
+            </a:schemeClr>
+          </a:solidFill>
+          <a:ln>
+            <a:solidFill>
+              <a:schemeClr val="accent5">
+                <a:lumMod val="40000"/>
+                <a:lumOff val="60000"/>
+              </a:schemeClr>
+            </a:solidFill>
+          </a:ln>
+        </p:spPr>
+        <p:style>
+          <a:lnRef idx="2">
+            <a:schemeClr val="accent1">
+              <a:shade val="50000"/>
+            </a:schemeClr>
+          </a:lnRef>
+          <a:fillRef idx="1">
+            <a:schemeClr val="accent1"/>
+          </a:fillRef>
+          <a:effectRef idx="0">
+            <a:schemeClr val="accent1"/>
+          </a:effectRef>
+          <a:fontRef idx="minor">
+            <a:schemeClr val="lt1"/>
+          </a:fontRef>
+        </p:style>
+        <p:txBody>
+          <a:bodyPr rtlCol="0" anchor="ctr"/>
+          <a:lstStyle/>
+          <a:p>
+            <a:pPr algn="ctr"/>
+            <a:endParaRPr lang="en-US"/>
+          </a:p>
+        </p:txBody>
+      </p:sp>
+      <p:sp>
+        <p:nvSpPr>
+          <p:cNvPr id="3" name="Rectangle 2">
+            <a:extLst>
+              <a:ext uri="{FF2B5EF4-FFF2-40B4-BE49-F238E27FC236}">
+                <a16:creationId xmlns:a16="http://schemas.microsoft.com/office/drawing/2014/main" id="{89CA3367-8A78-8040-8805-A89295F9C50C}"/>
+              </a:ext>
+            </a:extLst>
+          </p:cNvPr>
+          <p:cNvSpPr/>
+          <p:nvPr/>
+        </p:nvSpPr>
+        <p:spPr>
+          <a:xfrm>
+            <a:off x="3787535" y="2268078"/>
+            <a:ext cx="1712259" cy="448235"/>
+          </a:xfrm>
+          <a:prstGeom prst="rect">
+            <a:avLst/>
+          </a:prstGeom>
+          <a:solidFill>
+            <a:schemeClr val="accent4">
+              <a:lumMod val="40000"/>
+              <a:lumOff val="60000"/>
+            </a:schemeClr>
+          </a:solidFill>
+          <a:ln>
+            <a:solidFill>
+              <a:schemeClr val="accent4">
+                <a:lumMod val="60000"/>
+                <a:lumOff val="40000"/>
+              </a:schemeClr>
+            </a:solidFill>
+          </a:ln>
+        </p:spPr>
+        <p:style>
+          <a:lnRef idx="2">
+            <a:schemeClr val="accent1">
+              <a:shade val="50000"/>
+            </a:schemeClr>
+          </a:lnRef>
+          <a:fillRef idx="1">
+            <a:schemeClr val="accent1"/>
+          </a:fillRef>
+          <a:effectRef idx="0">
+            <a:schemeClr val="accent1"/>
+          </a:effectRef>
+          <a:fontRef idx="minor">
+            <a:schemeClr val="lt1"/>
+          </a:fontRef>
+        </p:style>
+        <p:txBody>
+          <a:bodyPr rtlCol="0" anchor="ctr"/>
+          <a:lstStyle/>
+          <a:p>
+            <a:pPr algn="ctr"/>
+            <a:endParaRPr lang="en-US"/>
+          </a:p>
+        </p:txBody>
+      </p:sp>
+      <p:sp>
+        <p:nvSpPr>
+          <p:cNvPr id="4" name="Rectangle 3">
+            <a:extLst>
+              <a:ext uri="{FF2B5EF4-FFF2-40B4-BE49-F238E27FC236}">
+                <a16:creationId xmlns:a16="http://schemas.microsoft.com/office/drawing/2014/main" id="{03D6EEDC-4B80-F547-BBA4-0A792CDAAF83}"/>
+              </a:ext>
+            </a:extLst>
+          </p:cNvPr>
+          <p:cNvSpPr/>
+          <p:nvPr/>
+        </p:nvSpPr>
+        <p:spPr>
+          <a:xfrm>
+            <a:off x="3787535" y="2967322"/>
+            <a:ext cx="1712259" cy="448235"/>
+          </a:xfrm>
+          <a:prstGeom prst="rect">
+            <a:avLst/>
+          </a:prstGeom>
+          <a:solidFill>
+            <a:schemeClr val="accent6">
+              <a:lumMod val="40000"/>
+              <a:lumOff val="60000"/>
+            </a:schemeClr>
+          </a:solidFill>
+          <a:ln>
+            <a:solidFill>
+              <a:schemeClr val="accent6">
+                <a:lumMod val="60000"/>
+                <a:lumOff val="40000"/>
+              </a:schemeClr>
+            </a:solidFill>
+          </a:ln>
+        </p:spPr>
+        <p:style>
+          <a:lnRef idx="2">
+            <a:schemeClr val="accent1">
+              <a:shade val="50000"/>
+            </a:schemeClr>
+          </a:lnRef>
+          <a:fillRef idx="1">
+            <a:schemeClr val="accent1"/>
+          </a:fillRef>
+          <a:effectRef idx="0">
+            <a:schemeClr val="accent1"/>
+          </a:effectRef>
+          <a:fontRef idx="minor">
+            <a:schemeClr val="lt1"/>
+          </a:fontRef>
+        </p:style>
+        <p:txBody>
+          <a:bodyPr rtlCol="0" anchor="ctr"/>
+          <a:lstStyle/>
+          <a:p>
+            <a:pPr algn="ctr"/>
+            <a:endParaRPr lang="en-US"/>
+          </a:p>
+        </p:txBody>
+      </p:sp>
+      <p:sp>
+        <p:nvSpPr>
+          <p:cNvPr id="5" name="Rectangle 4">
+            <a:extLst>
+              <a:ext uri="{FF2B5EF4-FFF2-40B4-BE49-F238E27FC236}">
+                <a16:creationId xmlns:a16="http://schemas.microsoft.com/office/drawing/2014/main" id="{1DEEE822-B9B4-E544-ADC5-4D70A570EB4B}"/>
+              </a:ext>
+            </a:extLst>
+          </p:cNvPr>
+          <p:cNvSpPr/>
+          <p:nvPr/>
+        </p:nvSpPr>
+        <p:spPr>
+          <a:xfrm>
+            <a:off x="3787535" y="3666566"/>
+            <a:ext cx="1712259" cy="448235"/>
+          </a:xfrm>
+          <a:prstGeom prst="rect">
+            <a:avLst/>
+          </a:prstGeom>
+          <a:solidFill>
+            <a:schemeClr val="accent2">
+              <a:lumMod val="40000"/>
+              <a:lumOff val="60000"/>
+            </a:schemeClr>
+          </a:solidFill>
+          <a:ln>
+            <a:solidFill>
+              <a:schemeClr val="accent2">
+                <a:lumMod val="60000"/>
+                <a:lumOff val="40000"/>
+              </a:schemeClr>
+            </a:solidFill>
+          </a:ln>
+        </p:spPr>
+        <p:style>
+          <a:lnRef idx="2">
+            <a:schemeClr val="accent1">
+              <a:shade val="50000"/>
+            </a:schemeClr>
+          </a:lnRef>
+          <a:fillRef idx="1">
+            <a:schemeClr val="accent1"/>
+          </a:fillRef>
+          <a:effectRef idx="0">
+            <a:schemeClr val="accent1"/>
+          </a:effectRef>
+          <a:fontRef idx="minor">
+            <a:schemeClr val="lt1"/>
+          </a:fontRef>
+        </p:style>
+        <p:txBody>
+          <a:bodyPr rtlCol="0" anchor="ctr"/>
+          <a:lstStyle/>
+          <a:p>
+            <a:pPr algn="ctr"/>
+            <a:endParaRPr lang="en-US"/>
+          </a:p>
+        </p:txBody>
+      </p:sp>
+      <p:cxnSp>
+        <p:nvCxnSpPr>
+          <p:cNvPr id="7" name="Straight Arrow Connector 6">
+            <a:extLst>
+              <a:ext uri="{FF2B5EF4-FFF2-40B4-BE49-F238E27FC236}">
+                <a16:creationId xmlns:a16="http://schemas.microsoft.com/office/drawing/2014/main" id="{00105F6A-D1D5-014C-A435-33BE57589744}"/>
+              </a:ext>
+            </a:extLst>
+          </p:cNvPr>
+          <p:cNvCxnSpPr/>
+          <p:nvPr/>
+        </p:nvCxnSpPr>
+        <p:spPr>
+          <a:xfrm>
+            <a:off x="600615" y="2637410"/>
+            <a:ext cx="0" cy="896470"/>
+          </a:xfrm>
+          <a:prstGeom prst="straightConnector1">
+            <a:avLst/>
+          </a:prstGeom>
+          <a:ln>
+            <a:headEnd type="triangle"/>
+            <a:tailEnd type="triangle"/>
+          </a:ln>
+        </p:spPr>
+        <p:style>
+          <a:lnRef idx="1">
+            <a:schemeClr val="accent1"/>
+          </a:lnRef>
+          <a:fillRef idx="0">
+            <a:schemeClr val="accent1"/>
+          </a:fillRef>
+          <a:effectRef idx="0">
+            <a:schemeClr val="accent1"/>
+          </a:effectRef>
+          <a:fontRef idx="minor">
+            <a:schemeClr val="tx1"/>
+          </a:fontRef>
+        </p:style>
+      </p:cxnSp>
+      <p:sp>
+        <p:nvSpPr>
+          <p:cNvPr id="8" name="TextBox 7">
+            <a:extLst>
+              <a:ext uri="{FF2B5EF4-FFF2-40B4-BE49-F238E27FC236}">
+                <a16:creationId xmlns:a16="http://schemas.microsoft.com/office/drawing/2014/main" id="{8D99E211-2C2E-1544-AAF7-FABF1A96CB40}"/>
+              </a:ext>
+            </a:extLst>
+          </p:cNvPr>
+          <p:cNvSpPr txBox="1"/>
+          <p:nvPr/>
+        </p:nvSpPr>
+        <p:spPr>
+          <a:xfrm>
+            <a:off x="218779" y="2900979"/>
+            <a:ext cx="381836" cy="369332"/>
+          </a:xfrm>
+          <a:prstGeom prst="rect">
+            <a:avLst/>
+          </a:prstGeom>
+          <a:noFill/>
+        </p:spPr>
+        <p:txBody>
+          <a:bodyPr wrap="none" rtlCol="0">
+            <a:spAutoFit/>
+          </a:bodyPr>
+          <a:lstStyle/>
+          <a:p>
+            <a:r>
+              <a:rPr lang="en-US" dirty="0"/>
+              <a:t>M</a:t>
+            </a:r>
+          </a:p>
+        </p:txBody>
+      </p:sp>
+      <p:cxnSp>
+        <p:nvCxnSpPr>
+          <p:cNvPr id="10" name="Straight Arrow Connector 9">
+            <a:extLst>
+              <a:ext uri="{FF2B5EF4-FFF2-40B4-BE49-F238E27FC236}">
+                <a16:creationId xmlns:a16="http://schemas.microsoft.com/office/drawing/2014/main" id="{D916499F-4B77-3045-BD56-31BD4896A1F0}"/>
+              </a:ext>
+            </a:extLst>
+          </p:cNvPr>
+          <p:cNvCxnSpPr/>
+          <p:nvPr/>
+        </p:nvCxnSpPr>
+        <p:spPr>
+          <a:xfrm>
+            <a:off x="824733" y="2395363"/>
+            <a:ext cx="1712259" cy="0"/>
+          </a:xfrm>
+          <a:prstGeom prst="straightConnector1">
+            <a:avLst/>
+          </a:prstGeom>
+          <a:ln>
+            <a:headEnd type="triangle"/>
+            <a:tailEnd type="triangle"/>
+          </a:ln>
+        </p:spPr>
+        <p:style>
+          <a:lnRef idx="1">
+            <a:schemeClr val="accent1"/>
+          </a:lnRef>
+          <a:fillRef idx="0">
+            <a:schemeClr val="accent1"/>
+          </a:fillRef>
+          <a:effectRef idx="0">
+            <a:schemeClr val="accent1"/>
+          </a:effectRef>
+          <a:fontRef idx="minor">
+            <a:schemeClr val="tx1"/>
+          </a:fontRef>
+        </p:style>
+      </p:cxnSp>
+      <p:sp>
+        <p:nvSpPr>
+          <p:cNvPr id="11" name="TextBox 10">
+            <a:extLst>
+              <a:ext uri="{FF2B5EF4-FFF2-40B4-BE49-F238E27FC236}">
+                <a16:creationId xmlns:a16="http://schemas.microsoft.com/office/drawing/2014/main" id="{CA42D462-FBBA-4D4F-A79F-A0931217367D}"/>
+              </a:ext>
+            </a:extLst>
+          </p:cNvPr>
+          <p:cNvSpPr txBox="1"/>
+          <p:nvPr/>
+        </p:nvSpPr>
+        <p:spPr>
+          <a:xfrm>
+            <a:off x="1539637" y="2034107"/>
+            <a:ext cx="282450" cy="369332"/>
+          </a:xfrm>
+          <a:prstGeom prst="rect">
+            <a:avLst/>
+          </a:prstGeom>
+          <a:noFill/>
+        </p:spPr>
+        <p:txBody>
+          <a:bodyPr wrap="none" rtlCol="0">
+            <a:spAutoFit/>
+          </a:bodyPr>
+          <a:lstStyle/>
+          <a:p>
+            <a:r>
+              <a:rPr lang="en-US" dirty="0"/>
+              <a:t>L</a:t>
+            </a:r>
+          </a:p>
+        </p:txBody>
+      </p:sp>
+      <p:cxnSp>
+        <p:nvCxnSpPr>
+          <p:cNvPr id="12" name="Straight Arrow Connector 11">
+            <a:extLst>
+              <a:ext uri="{FF2B5EF4-FFF2-40B4-BE49-F238E27FC236}">
+                <a16:creationId xmlns:a16="http://schemas.microsoft.com/office/drawing/2014/main" id="{6B26CC6D-18C1-3647-9676-725986FB767A}"/>
+              </a:ext>
+            </a:extLst>
+          </p:cNvPr>
+          <p:cNvCxnSpPr>
+            <a:cxnSpLocks/>
+          </p:cNvCxnSpPr>
+          <p:nvPr/>
+        </p:nvCxnSpPr>
+        <p:spPr>
+          <a:xfrm>
+            <a:off x="3662031" y="2268078"/>
+            <a:ext cx="0" cy="448235"/>
+          </a:xfrm>
+          <a:prstGeom prst="straightConnector1">
+            <a:avLst/>
+          </a:prstGeom>
+          <a:ln>
+            <a:headEnd type="triangle"/>
+            <a:tailEnd type="triangle"/>
+          </a:ln>
+        </p:spPr>
+        <p:style>
+          <a:lnRef idx="1">
+            <a:schemeClr val="accent1"/>
+          </a:lnRef>
+          <a:fillRef idx="0">
+            <a:schemeClr val="accent1"/>
+          </a:fillRef>
+          <a:effectRef idx="0">
+            <a:schemeClr val="accent1"/>
+          </a:effectRef>
+          <a:fontRef idx="minor">
+            <a:schemeClr val="tx1"/>
+          </a:fontRef>
+        </p:style>
+      </p:cxnSp>
+      <mc:AlternateContent xmlns:mc="http://schemas.openxmlformats.org/markup-compatibility/2006">
+        <mc:Choice xmlns:a14="http://schemas.microsoft.com/office/drawing/2010/main" Requires="a14">
+          <p:sp>
+            <p:nvSpPr>
+              <p:cNvPr id="14" name="TextBox 13">
+                <a:extLst>
+                  <a:ext uri="{FF2B5EF4-FFF2-40B4-BE49-F238E27FC236}">
+                    <a16:creationId xmlns:a16="http://schemas.microsoft.com/office/drawing/2014/main" id="{585C4A74-F4E1-5040-A8F0-A2CF99C68ABE}"/>
+                  </a:ext>
+                </a:extLst>
+              </p:cNvPr>
+              <p:cNvSpPr txBox="1"/>
+              <p:nvPr/>
+            </p:nvSpPr>
+            <p:spPr>
+              <a:xfrm>
+                <a:off x="3171655" y="2268078"/>
+                <a:ext cx="527196" cy="369332"/>
+              </a:xfrm>
+              <a:prstGeom prst="rect">
+                <a:avLst/>
+              </a:prstGeom>
+              <a:noFill/>
+            </p:spPr>
+            <p:txBody>
+              <a:bodyPr wrap="none" rtlCol="0">
+                <a:spAutoFit/>
+              </a:bodyPr>
+              <a:lstStyle/>
+              <a:p>
+                <a14:m>
+                  <m:oMathPara xmlns:m="http://schemas.openxmlformats.org/officeDocument/2006/math">
+                    <m:oMathParaPr>
+                      <m:jc m:val="centerGroup"/>
+                    </m:oMathParaPr>
+                    <m:oMath xmlns:m="http://schemas.openxmlformats.org/officeDocument/2006/math">
+                      <m:sSub>
+                        <m:sSubPr>
+                          <m:ctrlPr>
+                            <a:rPr lang="en-US" i="1" smtClean="0">
+                              <a:latin typeface="Cambria Math" panose="02040503050406030204" pitchFamily="18" charset="0"/>
+                            </a:rPr>
+                          </m:ctrlPr>
+                        </m:sSubPr>
+                        <m:e>
+                          <m:r>
+                            <a:rPr lang="es-ES" b="0" i="1" smtClean="0">
+                              <a:latin typeface="Cambria Math" panose="02040503050406030204" pitchFamily="18" charset="0"/>
+                            </a:rPr>
+                            <m:t>𝑀</m:t>
+                          </m:r>
+                        </m:e>
+                        <m:sub>
+                          <m:r>
+                            <a:rPr lang="es-ES" b="0" i="1" smtClean="0">
+                              <a:latin typeface="Cambria Math" panose="02040503050406030204" pitchFamily="18" charset="0"/>
+                            </a:rPr>
+                            <m:t>𝑒</m:t>
+                          </m:r>
+                        </m:sub>
+                      </m:sSub>
+                    </m:oMath>
+                  </m:oMathPara>
+                </a14:m>
+                <a:endParaRPr lang="en-US" dirty="0"/>
+              </a:p>
+            </p:txBody>
+          </p:sp>
+        </mc:Choice>
+        <mc:Fallback>
+          <p:sp>
+            <p:nvSpPr>
+              <p:cNvPr id="14" name="TextBox 13">
+                <a:extLst>
+                  <a:ext uri="{FF2B5EF4-FFF2-40B4-BE49-F238E27FC236}">
+                    <a16:creationId xmlns:a16="http://schemas.microsoft.com/office/drawing/2014/main" id="{585C4A74-F4E1-5040-A8F0-A2CF99C68ABE}"/>
+                  </a:ext>
+                </a:extLst>
+              </p:cNvPr>
+              <p:cNvSpPr txBox="1">
+                <a:spLocks noRot="1" noChangeAspect="1" noMove="1" noResize="1" noEditPoints="1" noAdjustHandles="1" noChangeArrowheads="1" noChangeShapeType="1" noTextEdit="1"/>
+              </p:cNvSpPr>
+              <p:nvPr/>
+            </p:nvSpPr>
+            <p:spPr>
+              <a:xfrm>
+                <a:off x="3171655" y="2268078"/>
+                <a:ext cx="527196" cy="369332"/>
+              </a:xfrm>
+              <a:prstGeom prst="rect">
+                <a:avLst/>
+              </a:prstGeom>
+              <a:blipFill>
+                <a:blip r:embed="rId2"/>
+                <a:stretch>
+                  <a:fillRect/>
+                </a:stretch>
+              </a:blipFill>
+            </p:spPr>
+            <p:txBody>
+              <a:bodyPr/>
+              <a:lstStyle/>
+              <a:p>
+                <a:r>
+                  <a:rPr lang="en-US">
+                    <a:noFill/>
+                  </a:rPr>
+                  <a:t> </a:t>
+                </a:r>
+              </a:p>
+            </p:txBody>
+          </p:sp>
+        </mc:Fallback>
+      </mc:AlternateContent>
+      <p:cxnSp>
+        <p:nvCxnSpPr>
+          <p:cNvPr id="15" name="Straight Arrow Connector 14">
+            <a:extLst>
+              <a:ext uri="{FF2B5EF4-FFF2-40B4-BE49-F238E27FC236}">
+                <a16:creationId xmlns:a16="http://schemas.microsoft.com/office/drawing/2014/main" id="{B211364C-D971-EB41-9986-08EA550198EC}"/>
+              </a:ext>
+            </a:extLst>
+          </p:cNvPr>
+          <p:cNvCxnSpPr/>
+          <p:nvPr/>
+        </p:nvCxnSpPr>
+        <p:spPr>
+          <a:xfrm>
+            <a:off x="3787535" y="2133607"/>
+            <a:ext cx="1712259" cy="0"/>
+          </a:xfrm>
+          <a:prstGeom prst="straightConnector1">
+            <a:avLst/>
+          </a:prstGeom>
+          <a:ln>
+            <a:headEnd type="triangle"/>
+            <a:tailEnd type="triangle"/>
+          </a:ln>
+        </p:spPr>
+        <p:style>
+          <a:lnRef idx="1">
+            <a:schemeClr val="accent1"/>
+          </a:lnRef>
+          <a:fillRef idx="0">
+            <a:schemeClr val="accent1"/>
+          </a:fillRef>
+          <a:effectRef idx="0">
+            <a:schemeClr val="accent1"/>
+          </a:effectRef>
+          <a:fontRef idx="minor">
+            <a:schemeClr val="tx1"/>
+          </a:fontRef>
+        </p:style>
+      </p:cxnSp>
+      <mc:AlternateContent xmlns:mc="http://schemas.openxmlformats.org/markup-compatibility/2006">
+        <mc:Choice xmlns:a14="http://schemas.microsoft.com/office/drawing/2010/main" Requires="a14">
+          <p:sp>
+            <p:nvSpPr>
+              <p:cNvPr id="22" name="TextBox 21">
+                <a:extLst>
+                  <a:ext uri="{FF2B5EF4-FFF2-40B4-BE49-F238E27FC236}">
+                    <a16:creationId xmlns:a16="http://schemas.microsoft.com/office/drawing/2014/main" id="{7FBDA812-EB0D-B349-9D4E-B666C75ED86A}"/>
+                  </a:ext>
+                </a:extLst>
+              </p:cNvPr>
+              <p:cNvSpPr txBox="1"/>
+              <p:nvPr/>
+            </p:nvSpPr>
+            <p:spPr>
+              <a:xfrm>
+                <a:off x="4195400" y="1773242"/>
+                <a:ext cx="896527" cy="369332"/>
+              </a:xfrm>
+              <a:prstGeom prst="rect">
+                <a:avLst/>
+              </a:prstGeom>
+              <a:noFill/>
+            </p:spPr>
+            <p:txBody>
+              <a:bodyPr wrap="none" rtlCol="0">
+                <a:spAutoFit/>
+              </a:bodyPr>
+              <a:lstStyle/>
+              <a:p>
+                <a14:m>
+                  <m:oMathPara xmlns:m="http://schemas.openxmlformats.org/officeDocument/2006/math">
+                    <m:oMathParaPr>
+                      <m:jc m:val="centerGroup"/>
+                    </m:oMathParaPr>
+                    <m:oMath xmlns:m="http://schemas.openxmlformats.org/officeDocument/2006/math">
+                      <m:sSub>
+                        <m:sSubPr>
+                          <m:ctrlPr>
+                            <a:rPr lang="en-US" i="1" smtClean="0">
+                              <a:latin typeface="Cambria Math" panose="02040503050406030204" pitchFamily="18" charset="0"/>
+                            </a:rPr>
+                          </m:ctrlPr>
+                        </m:sSubPr>
+                        <m:e>
+                          <m:r>
+                            <a:rPr lang="es-ES" b="0" i="1" smtClean="0">
+                              <a:latin typeface="Cambria Math" panose="02040503050406030204" pitchFamily="18" charset="0"/>
+                            </a:rPr>
+                            <m:t>𝐿</m:t>
+                          </m:r>
+                        </m:e>
+                        <m:sub>
+                          <m:r>
+                            <a:rPr lang="es-ES" b="0" i="1" smtClean="0">
+                              <a:latin typeface="Cambria Math" panose="02040503050406030204" pitchFamily="18" charset="0"/>
+                            </a:rPr>
+                            <m:t>𝑒</m:t>
+                          </m:r>
+                        </m:sub>
+                      </m:sSub>
+                      <m:r>
+                        <a:rPr lang="es-ES" b="0" i="1" smtClean="0">
+                          <a:latin typeface="Cambria Math" panose="02040503050406030204" pitchFamily="18" charset="0"/>
+                        </a:rPr>
+                        <m:t>=</m:t>
+                      </m:r>
+                      <m:r>
+                        <a:rPr lang="es-ES" b="0" i="1" smtClean="0">
+                          <a:latin typeface="Cambria Math" panose="02040503050406030204" pitchFamily="18" charset="0"/>
+                        </a:rPr>
+                        <m:t>𝐿</m:t>
+                      </m:r>
+                    </m:oMath>
+                  </m:oMathPara>
+                </a14:m>
+                <a:endParaRPr lang="en-US" dirty="0"/>
+              </a:p>
+            </p:txBody>
+          </p:sp>
+        </mc:Choice>
+        <mc:Fallback>
+          <p:sp>
+            <p:nvSpPr>
+              <p:cNvPr id="22" name="TextBox 21">
+                <a:extLst>
+                  <a:ext uri="{FF2B5EF4-FFF2-40B4-BE49-F238E27FC236}">
+                    <a16:creationId xmlns:a16="http://schemas.microsoft.com/office/drawing/2014/main" id="{7FBDA812-EB0D-B349-9D4E-B666C75ED86A}"/>
+                  </a:ext>
+                </a:extLst>
+              </p:cNvPr>
+              <p:cNvSpPr txBox="1">
+                <a:spLocks noRot="1" noChangeAspect="1" noMove="1" noResize="1" noEditPoints="1" noAdjustHandles="1" noChangeArrowheads="1" noChangeShapeType="1" noTextEdit="1"/>
+              </p:cNvSpPr>
+              <p:nvPr/>
+            </p:nvSpPr>
+            <p:spPr>
+              <a:xfrm>
+                <a:off x="4195400" y="1773242"/>
+                <a:ext cx="896527" cy="369332"/>
+              </a:xfrm>
+              <a:prstGeom prst="rect">
+                <a:avLst/>
+              </a:prstGeom>
+              <a:blipFill>
+                <a:blip r:embed="rId3"/>
+                <a:stretch>
+                  <a:fillRect/>
+                </a:stretch>
+              </a:blipFill>
+            </p:spPr>
+            <p:txBody>
+              <a:bodyPr/>
+              <a:lstStyle/>
+              <a:p>
+                <a:r>
+                  <a:rPr lang="en-US">
+                    <a:noFill/>
+                  </a:rPr>
+                  <a:t> </a:t>
+                </a:r>
+              </a:p>
+            </p:txBody>
+          </p:sp>
+        </mc:Fallback>
+      </mc:AlternateContent>
+      <p:sp>
+        <p:nvSpPr>
+          <p:cNvPr id="34" name="TextBox 33">
+            <a:extLst>
+              <a:ext uri="{FF2B5EF4-FFF2-40B4-BE49-F238E27FC236}">
+                <a16:creationId xmlns:a16="http://schemas.microsoft.com/office/drawing/2014/main" id="{229DAEDE-52D3-B541-B84F-6ECBE6090A13}"/>
+              </a:ext>
+            </a:extLst>
+          </p:cNvPr>
+          <p:cNvSpPr txBox="1"/>
+          <p:nvPr/>
+        </p:nvSpPr>
+        <p:spPr>
+          <a:xfrm>
+            <a:off x="3437912" y="1335741"/>
+            <a:ext cx="2189638" cy="369332"/>
+          </a:xfrm>
+          <a:prstGeom prst="rect">
+            <a:avLst/>
+          </a:prstGeom>
+          <a:noFill/>
+        </p:spPr>
+        <p:txBody>
+          <a:bodyPr wrap="none" rtlCol="0">
+            <a:spAutoFit/>
+          </a:bodyPr>
+          <a:lstStyle/>
+          <a:p>
+            <a:r>
+              <a:rPr lang="en-US" dirty="0"/>
+              <a:t>A: Horizontal Division</a:t>
+            </a:r>
+          </a:p>
+        </p:txBody>
+      </p:sp>
+      <p:sp>
+        <p:nvSpPr>
+          <p:cNvPr id="35" name="Rectangle 34">
+            <a:extLst>
+              <a:ext uri="{FF2B5EF4-FFF2-40B4-BE49-F238E27FC236}">
+                <a16:creationId xmlns:a16="http://schemas.microsoft.com/office/drawing/2014/main" id="{189D335E-C268-E04B-B2B5-CB29D8864DA6}"/>
+              </a:ext>
+            </a:extLst>
+          </p:cNvPr>
+          <p:cNvSpPr/>
+          <p:nvPr/>
+        </p:nvSpPr>
+        <p:spPr>
+          <a:xfrm>
+            <a:off x="6792573" y="2332608"/>
+            <a:ext cx="2176563" cy="322730"/>
+          </a:xfrm>
+          <a:prstGeom prst="rect">
+            <a:avLst/>
+          </a:prstGeom>
+          <a:solidFill>
+            <a:schemeClr val="accent4">
+              <a:lumMod val="40000"/>
+              <a:lumOff val="60000"/>
+            </a:schemeClr>
+          </a:solidFill>
+          <a:ln>
+            <a:solidFill>
+              <a:schemeClr val="accent4">
+                <a:lumMod val="60000"/>
+                <a:lumOff val="40000"/>
+              </a:schemeClr>
+            </a:solidFill>
+          </a:ln>
+        </p:spPr>
+        <p:style>
+          <a:lnRef idx="2">
+            <a:schemeClr val="accent1">
+              <a:shade val="50000"/>
+            </a:schemeClr>
+          </a:lnRef>
+          <a:fillRef idx="1">
+            <a:schemeClr val="accent1"/>
+          </a:fillRef>
+          <a:effectRef idx="0">
+            <a:schemeClr val="accent1"/>
+          </a:effectRef>
+          <a:fontRef idx="minor">
+            <a:schemeClr val="lt1"/>
+          </a:fontRef>
+        </p:style>
+        <p:txBody>
+          <a:bodyPr rtlCol="0" anchor="ctr"/>
+          <a:lstStyle/>
+          <a:p>
+            <a:pPr algn="ctr"/>
+            <a:endParaRPr lang="en-US"/>
+          </a:p>
+        </p:txBody>
+      </p:sp>
+      <p:sp>
+        <p:nvSpPr>
+          <p:cNvPr id="36" name="Rectangle 35">
+            <a:extLst>
+              <a:ext uri="{FF2B5EF4-FFF2-40B4-BE49-F238E27FC236}">
+                <a16:creationId xmlns:a16="http://schemas.microsoft.com/office/drawing/2014/main" id="{A7832DF5-F424-B247-80E5-4391E12A93DB}"/>
+              </a:ext>
+            </a:extLst>
+          </p:cNvPr>
+          <p:cNvSpPr/>
+          <p:nvPr/>
+        </p:nvSpPr>
+        <p:spPr>
+          <a:xfrm>
+            <a:off x="6792573" y="3031852"/>
+            <a:ext cx="2176563" cy="322730"/>
+          </a:xfrm>
+          <a:prstGeom prst="rect">
+            <a:avLst/>
+          </a:prstGeom>
+          <a:solidFill>
+            <a:schemeClr val="accent6">
+              <a:lumMod val="40000"/>
+              <a:lumOff val="60000"/>
+            </a:schemeClr>
+          </a:solidFill>
+          <a:ln>
+            <a:solidFill>
+              <a:schemeClr val="accent6">
+                <a:lumMod val="60000"/>
+                <a:lumOff val="40000"/>
+              </a:schemeClr>
+            </a:solidFill>
+          </a:ln>
+        </p:spPr>
+        <p:style>
+          <a:lnRef idx="2">
+            <a:schemeClr val="accent1">
+              <a:shade val="50000"/>
+            </a:schemeClr>
+          </a:lnRef>
+          <a:fillRef idx="1">
+            <a:schemeClr val="accent1"/>
+          </a:fillRef>
+          <a:effectRef idx="0">
+            <a:schemeClr val="accent1"/>
+          </a:effectRef>
+          <a:fontRef idx="minor">
+            <a:schemeClr val="lt1"/>
+          </a:fontRef>
+        </p:style>
+        <p:txBody>
+          <a:bodyPr rtlCol="0" anchor="ctr"/>
+          <a:lstStyle/>
+          <a:p>
+            <a:pPr algn="ctr"/>
+            <a:endParaRPr lang="en-US"/>
+          </a:p>
+        </p:txBody>
+      </p:sp>
+      <p:sp>
+        <p:nvSpPr>
+          <p:cNvPr id="37" name="Rectangle 36">
+            <a:extLst>
+              <a:ext uri="{FF2B5EF4-FFF2-40B4-BE49-F238E27FC236}">
+                <a16:creationId xmlns:a16="http://schemas.microsoft.com/office/drawing/2014/main" id="{FDF23902-68B3-244C-BF5C-F773615D7B2B}"/>
+              </a:ext>
+            </a:extLst>
+          </p:cNvPr>
+          <p:cNvSpPr/>
+          <p:nvPr/>
+        </p:nvSpPr>
+        <p:spPr>
+          <a:xfrm>
+            <a:off x="6792573" y="3731096"/>
+            <a:ext cx="2176563" cy="322730"/>
+          </a:xfrm>
+          <a:prstGeom prst="rect">
+            <a:avLst/>
+          </a:prstGeom>
+          <a:solidFill>
+            <a:schemeClr val="accent2">
+              <a:lumMod val="40000"/>
+              <a:lumOff val="60000"/>
+            </a:schemeClr>
+          </a:solidFill>
+          <a:ln>
+            <a:solidFill>
+              <a:schemeClr val="accent2">
+                <a:lumMod val="60000"/>
+                <a:lumOff val="40000"/>
+              </a:schemeClr>
+            </a:solidFill>
+          </a:ln>
+        </p:spPr>
+        <p:style>
+          <a:lnRef idx="2">
+            <a:schemeClr val="accent1">
+              <a:shade val="50000"/>
+            </a:schemeClr>
+          </a:lnRef>
+          <a:fillRef idx="1">
+            <a:schemeClr val="accent1"/>
+          </a:fillRef>
+          <a:effectRef idx="0">
+            <a:schemeClr val="accent1"/>
+          </a:effectRef>
+          <a:fontRef idx="minor">
+            <a:schemeClr val="lt1"/>
+          </a:fontRef>
+        </p:style>
+        <p:txBody>
+          <a:bodyPr rtlCol="0" anchor="ctr"/>
+          <a:lstStyle/>
+          <a:p>
+            <a:pPr algn="ctr"/>
+            <a:endParaRPr lang="en-US"/>
+          </a:p>
+        </p:txBody>
+      </p:sp>
+      <p:cxnSp>
+        <p:nvCxnSpPr>
+          <p:cNvPr id="38" name="Straight Arrow Connector 37">
+            <a:extLst>
+              <a:ext uri="{FF2B5EF4-FFF2-40B4-BE49-F238E27FC236}">
+                <a16:creationId xmlns:a16="http://schemas.microsoft.com/office/drawing/2014/main" id="{D120D054-BF92-E94F-9DA5-A60DC95B6122}"/>
+              </a:ext>
+            </a:extLst>
+          </p:cNvPr>
+          <p:cNvCxnSpPr>
+            <a:cxnSpLocks/>
+          </p:cNvCxnSpPr>
+          <p:nvPr/>
+        </p:nvCxnSpPr>
+        <p:spPr>
+          <a:xfrm>
+            <a:off x="6687621" y="2268078"/>
+            <a:ext cx="0" cy="448235"/>
+          </a:xfrm>
+          <a:prstGeom prst="straightConnector1">
+            <a:avLst/>
+          </a:prstGeom>
+          <a:ln>
+            <a:headEnd type="triangle"/>
+            <a:tailEnd type="triangle"/>
+          </a:ln>
+        </p:spPr>
+        <p:style>
+          <a:lnRef idx="1">
+            <a:schemeClr val="accent1"/>
+          </a:lnRef>
+          <a:fillRef idx="0">
+            <a:schemeClr val="accent1"/>
+          </a:fillRef>
+          <a:effectRef idx="0">
+            <a:schemeClr val="accent1"/>
+          </a:effectRef>
+          <a:fontRef idx="minor">
+            <a:schemeClr val="tx1"/>
+          </a:fontRef>
+        </p:style>
+      </p:cxnSp>
+      <mc:AlternateContent xmlns:mc="http://schemas.openxmlformats.org/markup-compatibility/2006">
+        <mc:Choice xmlns:a14="http://schemas.microsoft.com/office/drawing/2010/main" Requires="a14">
+          <p:sp>
+            <p:nvSpPr>
+              <p:cNvPr id="39" name="TextBox 38">
+                <a:extLst>
+                  <a:ext uri="{FF2B5EF4-FFF2-40B4-BE49-F238E27FC236}">
+                    <a16:creationId xmlns:a16="http://schemas.microsoft.com/office/drawing/2014/main" id="{1E41E511-E1C6-954E-9075-AB0B7214EB5D}"/>
+                  </a:ext>
+                </a:extLst>
+              </p:cNvPr>
+              <p:cNvSpPr txBox="1"/>
+              <p:nvPr/>
+            </p:nvSpPr>
+            <p:spPr>
+              <a:xfrm>
+                <a:off x="6197245" y="2268078"/>
+                <a:ext cx="527196" cy="369332"/>
+              </a:xfrm>
+              <a:prstGeom prst="rect">
+                <a:avLst/>
+              </a:prstGeom>
+              <a:noFill/>
+            </p:spPr>
+            <p:txBody>
+              <a:bodyPr wrap="none" rtlCol="0">
+                <a:spAutoFit/>
+              </a:bodyPr>
+              <a:lstStyle/>
+              <a:p>
+                <a14:m>
+                  <m:oMathPara xmlns:m="http://schemas.openxmlformats.org/officeDocument/2006/math">
+                    <m:oMathParaPr>
+                      <m:jc m:val="centerGroup"/>
+                    </m:oMathParaPr>
+                    <m:oMath xmlns:m="http://schemas.openxmlformats.org/officeDocument/2006/math">
+                      <m:sSub>
+                        <m:sSubPr>
+                          <m:ctrlPr>
+                            <a:rPr lang="en-US" i="1" smtClean="0">
+                              <a:latin typeface="Cambria Math" panose="02040503050406030204" pitchFamily="18" charset="0"/>
+                            </a:rPr>
+                          </m:ctrlPr>
+                        </m:sSubPr>
+                        <m:e>
+                          <m:r>
+                            <a:rPr lang="es-ES" b="0" i="1" smtClean="0">
+                              <a:latin typeface="Cambria Math" panose="02040503050406030204" pitchFamily="18" charset="0"/>
+                            </a:rPr>
+                            <m:t>𝑀</m:t>
+                          </m:r>
+                        </m:e>
+                        <m:sub>
+                          <m:r>
+                            <a:rPr lang="es-ES" b="0" i="1" smtClean="0">
+                              <a:latin typeface="Cambria Math" panose="02040503050406030204" pitchFamily="18" charset="0"/>
+                            </a:rPr>
+                            <m:t>𝑒</m:t>
+                          </m:r>
+                        </m:sub>
+                      </m:sSub>
+                    </m:oMath>
+                  </m:oMathPara>
+                </a14:m>
+                <a:endParaRPr lang="en-US" dirty="0"/>
+              </a:p>
+            </p:txBody>
+          </p:sp>
+        </mc:Choice>
+        <mc:Fallback>
+          <p:sp>
+            <p:nvSpPr>
+              <p:cNvPr id="39" name="TextBox 38">
+                <a:extLst>
+                  <a:ext uri="{FF2B5EF4-FFF2-40B4-BE49-F238E27FC236}">
+                    <a16:creationId xmlns:a16="http://schemas.microsoft.com/office/drawing/2014/main" id="{1E41E511-E1C6-954E-9075-AB0B7214EB5D}"/>
+                  </a:ext>
+                </a:extLst>
+              </p:cNvPr>
+              <p:cNvSpPr txBox="1">
+                <a:spLocks noRot="1" noChangeAspect="1" noMove="1" noResize="1" noEditPoints="1" noAdjustHandles="1" noChangeArrowheads="1" noChangeShapeType="1" noTextEdit="1"/>
+              </p:cNvSpPr>
+              <p:nvPr/>
+            </p:nvSpPr>
+            <p:spPr>
+              <a:xfrm>
+                <a:off x="6197245" y="2268078"/>
+                <a:ext cx="527196" cy="369332"/>
+              </a:xfrm>
+              <a:prstGeom prst="rect">
+                <a:avLst/>
+              </a:prstGeom>
+              <a:blipFill>
+                <a:blip r:embed="rId4"/>
+                <a:stretch>
+                  <a:fillRect/>
+                </a:stretch>
+              </a:blipFill>
+            </p:spPr>
+            <p:txBody>
+              <a:bodyPr/>
+              <a:lstStyle/>
+              <a:p>
+                <a:r>
+                  <a:rPr lang="en-US">
+                    <a:noFill/>
+                  </a:rPr>
+                  <a:t> </a:t>
+                </a:r>
+              </a:p>
+            </p:txBody>
+          </p:sp>
+        </mc:Fallback>
+      </mc:AlternateContent>
+      <p:cxnSp>
+        <p:nvCxnSpPr>
+          <p:cNvPr id="40" name="Straight Arrow Connector 39">
+            <a:extLst>
+              <a:ext uri="{FF2B5EF4-FFF2-40B4-BE49-F238E27FC236}">
+                <a16:creationId xmlns:a16="http://schemas.microsoft.com/office/drawing/2014/main" id="{E47B8E27-24C8-C742-A92D-BD2844AF9539}"/>
+              </a:ext>
+            </a:extLst>
+          </p:cNvPr>
+          <p:cNvCxnSpPr>
+            <a:cxnSpLocks/>
+          </p:cNvCxnSpPr>
+          <p:nvPr/>
+        </p:nvCxnSpPr>
+        <p:spPr>
+          <a:xfrm>
+            <a:off x="6813125" y="2133607"/>
+            <a:ext cx="2156011" cy="0"/>
+          </a:xfrm>
+          <a:prstGeom prst="straightConnector1">
+            <a:avLst/>
+          </a:prstGeom>
+          <a:ln>
+            <a:headEnd type="triangle"/>
+            <a:tailEnd type="triangle"/>
+          </a:ln>
+        </p:spPr>
+        <p:style>
+          <a:lnRef idx="1">
+            <a:schemeClr val="accent1"/>
+          </a:lnRef>
+          <a:fillRef idx="0">
+            <a:schemeClr val="accent1"/>
+          </a:fillRef>
+          <a:effectRef idx="0">
+            <a:schemeClr val="accent1"/>
+          </a:effectRef>
+          <a:fontRef idx="minor">
+            <a:schemeClr val="tx1"/>
+          </a:fontRef>
+        </p:style>
+      </p:cxnSp>
+      <mc:AlternateContent xmlns:mc="http://schemas.openxmlformats.org/markup-compatibility/2006">
+        <mc:Choice xmlns:a14="http://schemas.microsoft.com/office/drawing/2010/main" Requires="a14">
+          <p:sp>
+            <p:nvSpPr>
+              <p:cNvPr id="41" name="TextBox 40">
+                <a:extLst>
+                  <a:ext uri="{FF2B5EF4-FFF2-40B4-BE49-F238E27FC236}">
+                    <a16:creationId xmlns:a16="http://schemas.microsoft.com/office/drawing/2014/main" id="{6B5F66FB-F13D-B448-AC09-14E6AE771B47}"/>
+                  </a:ext>
+                </a:extLst>
+              </p:cNvPr>
+              <p:cNvSpPr txBox="1"/>
+              <p:nvPr/>
+            </p:nvSpPr>
+            <p:spPr>
+              <a:xfrm>
+                <a:off x="7220990" y="1773242"/>
+                <a:ext cx="1301318" cy="369332"/>
+              </a:xfrm>
+              <a:prstGeom prst="rect">
+                <a:avLst/>
+              </a:prstGeom>
+              <a:noFill/>
+            </p:spPr>
+            <p:txBody>
+              <a:bodyPr wrap="none" rtlCol="0">
+                <a:spAutoFit/>
+              </a:bodyPr>
+              <a:lstStyle/>
+              <a:p>
+                <a14:m>
+                  <m:oMathPara xmlns:m="http://schemas.openxmlformats.org/officeDocument/2006/math">
+                    <m:oMathParaPr>
+                      <m:jc m:val="centerGroup"/>
+                    </m:oMathParaPr>
+                    <m:oMath xmlns:m="http://schemas.openxmlformats.org/officeDocument/2006/math">
+                      <m:sSub>
+                        <m:sSubPr>
+                          <m:ctrlPr>
+                            <a:rPr lang="en-US" i="1" smtClean="0">
+                              <a:latin typeface="Cambria Math" panose="02040503050406030204" pitchFamily="18" charset="0"/>
+                            </a:rPr>
+                          </m:ctrlPr>
+                        </m:sSubPr>
+                        <m:e>
+                          <m:r>
+                            <a:rPr lang="es-ES" b="0" i="1" smtClean="0">
+                              <a:latin typeface="Cambria Math" panose="02040503050406030204" pitchFamily="18" charset="0"/>
+                            </a:rPr>
+                            <m:t>𝐿</m:t>
+                          </m:r>
+                        </m:e>
+                        <m:sub>
+                          <m:r>
+                            <a:rPr lang="es-ES" b="0" i="1" smtClean="0">
+                              <a:latin typeface="Cambria Math" panose="02040503050406030204" pitchFamily="18" charset="0"/>
+                            </a:rPr>
+                            <m:t>𝑒</m:t>
+                          </m:r>
+                        </m:sub>
+                      </m:sSub>
+                      <m:r>
+                        <a:rPr lang="es-ES" b="0" i="1" smtClean="0">
+                          <a:latin typeface="Cambria Math" panose="02040503050406030204" pitchFamily="18" charset="0"/>
+                        </a:rPr>
+                        <m:t> (</m:t>
+                      </m:r>
+                      <m:r>
+                        <a:rPr lang="es-ES" b="0" i="1" smtClean="0">
+                          <a:latin typeface="Cambria Math" panose="02040503050406030204" pitchFamily="18" charset="0"/>
+                        </a:rPr>
+                        <m:t>𝑔𝑖𝑣𝑒𝑛</m:t>
+                      </m:r>
+                      <m:r>
+                        <a:rPr lang="es-ES" b="0" i="1" smtClean="0">
+                          <a:latin typeface="Cambria Math" panose="02040503050406030204" pitchFamily="18" charset="0"/>
+                        </a:rPr>
+                        <m:t>)</m:t>
+                      </m:r>
+                    </m:oMath>
+                  </m:oMathPara>
+                </a14:m>
+                <a:endParaRPr lang="en-US" dirty="0"/>
+              </a:p>
+            </p:txBody>
+          </p:sp>
+        </mc:Choice>
+        <mc:Fallback>
+          <p:sp>
+            <p:nvSpPr>
+              <p:cNvPr id="41" name="TextBox 40">
+                <a:extLst>
+                  <a:ext uri="{FF2B5EF4-FFF2-40B4-BE49-F238E27FC236}">
+                    <a16:creationId xmlns:a16="http://schemas.microsoft.com/office/drawing/2014/main" id="{6B5F66FB-F13D-B448-AC09-14E6AE771B47}"/>
+                  </a:ext>
+                </a:extLst>
+              </p:cNvPr>
+              <p:cNvSpPr txBox="1">
+                <a:spLocks noRot="1" noChangeAspect="1" noMove="1" noResize="1" noEditPoints="1" noAdjustHandles="1" noChangeArrowheads="1" noChangeShapeType="1" noTextEdit="1"/>
+              </p:cNvSpPr>
+              <p:nvPr/>
+            </p:nvSpPr>
+            <p:spPr>
+              <a:xfrm>
+                <a:off x="7220990" y="1773242"/>
+                <a:ext cx="1301318" cy="369332"/>
+              </a:xfrm>
+              <a:prstGeom prst="rect">
+                <a:avLst/>
+              </a:prstGeom>
+              <a:blipFill>
+                <a:blip r:embed="rId5"/>
+                <a:stretch>
+                  <a:fillRect b="-13333"/>
+                </a:stretch>
+              </a:blipFill>
+            </p:spPr>
+            <p:txBody>
+              <a:bodyPr/>
+              <a:lstStyle/>
+              <a:p>
+                <a:r>
+                  <a:rPr lang="en-US">
+                    <a:noFill/>
+                  </a:rPr>
+                  <a:t> </a:t>
+                </a:r>
+              </a:p>
+            </p:txBody>
+          </p:sp>
+        </mc:Fallback>
+      </mc:AlternateContent>
+      <p:sp>
+        <p:nvSpPr>
+          <p:cNvPr id="42" name="TextBox 41">
+            <a:extLst>
+              <a:ext uri="{FF2B5EF4-FFF2-40B4-BE49-F238E27FC236}">
+                <a16:creationId xmlns:a16="http://schemas.microsoft.com/office/drawing/2014/main" id="{477AC6E4-2974-0642-B9E3-870C05FB8CF8}"/>
+              </a:ext>
+            </a:extLst>
+          </p:cNvPr>
+          <p:cNvSpPr txBox="1"/>
+          <p:nvPr/>
+        </p:nvSpPr>
+        <p:spPr>
+          <a:xfrm>
+            <a:off x="6096000" y="1335741"/>
+            <a:ext cx="3520131" cy="369332"/>
+          </a:xfrm>
+          <a:prstGeom prst="rect">
+            <a:avLst/>
+          </a:prstGeom>
+          <a:noFill/>
+        </p:spPr>
+        <p:txBody>
+          <a:bodyPr wrap="none" rtlCol="0">
+            <a:spAutoFit/>
+          </a:bodyPr>
+          <a:lstStyle/>
+          <a:p>
+            <a:r>
+              <a:rPr lang="en-US" dirty="0"/>
+              <a:t>AB: Conditioned Horizontal Division</a:t>
+            </a:r>
+          </a:p>
+        </p:txBody>
+      </p:sp>
+    </p:spTree>
+    <p:extLst>
+      <p:ext uri="{BB962C8B-B14F-4D97-AF65-F5344CB8AC3E}">
+        <p14:creationId xmlns:p14="http://schemas.microsoft.com/office/powerpoint/2010/main" val="2719070373"/>
+      </p:ext>
+    </p:extLst>
+  </p:cSld>
+  <p:clrMapOvr>
+    <a:masterClrMapping/>
+  </p:clrMapOvr>
+</p:sld>
+</file>
+
+<file path=ppt/slides/slide6.xml><?xml version="1.0" encoding="utf-8"?>
+<p:sld xmlns:a="http://schemas.openxmlformats.org/drawingml/2006/main" xmlns:r="http://schemas.openxmlformats.org/officeDocument/2006/relationships" xmlns:p="http://schemas.openxmlformats.org/presentationml/2006/main">
+  <p:cSld>
+    <p:spTree>
+      <p:nvGrpSpPr>
+        <p:cNvPr id="1" name=""/>
+        <p:cNvGrpSpPr/>
+        <p:nvPr/>
+      </p:nvGrpSpPr>
+      <p:grpSpPr>
+        <a:xfrm>
+          <a:off x="0" y="0"/>
+          <a:ext cx="0" cy="0"/>
+          <a:chOff x="0" y="0"/>
+          <a:chExt cx="0" cy="0"/>
+        </a:xfrm>
+      </p:grpSpPr>
+      <p:sp>
+        <p:nvSpPr>
+          <p:cNvPr id="2" name="Rectangle 1">
+            <a:extLst>
+              <a:ext uri="{FF2B5EF4-FFF2-40B4-BE49-F238E27FC236}">
+                <a16:creationId xmlns:a16="http://schemas.microsoft.com/office/drawing/2014/main" id="{67D53CA7-C2B3-E845-B5C7-0EACC5B33975}"/>
+              </a:ext>
+            </a:extLst>
+          </p:cNvPr>
+          <p:cNvSpPr/>
+          <p:nvPr/>
+        </p:nvSpPr>
+        <p:spPr>
+          <a:xfrm>
+            <a:off x="1123335" y="3042845"/>
+            <a:ext cx="1712259" cy="896470"/>
+          </a:xfrm>
+          <a:prstGeom prst="rect">
+            <a:avLst/>
+          </a:prstGeom>
+          <a:solidFill>
+            <a:schemeClr val="accent5">
+              <a:lumMod val="40000"/>
+              <a:lumOff val="60000"/>
+            </a:schemeClr>
+          </a:solidFill>
+          <a:ln>
+            <a:solidFill>
+              <a:schemeClr val="accent5">
+                <a:lumMod val="40000"/>
+                <a:lumOff val="60000"/>
+              </a:schemeClr>
+            </a:solidFill>
+          </a:ln>
+        </p:spPr>
+        <p:style>
+          <a:lnRef idx="2">
+            <a:schemeClr val="accent1">
+              <a:shade val="50000"/>
+            </a:schemeClr>
+          </a:lnRef>
+          <a:fillRef idx="1">
+            <a:schemeClr val="accent1"/>
+          </a:fillRef>
+          <a:effectRef idx="0">
+            <a:schemeClr val="accent1"/>
+          </a:effectRef>
+          <a:fontRef idx="minor">
+            <a:schemeClr val="lt1"/>
+          </a:fontRef>
+        </p:style>
+        <p:txBody>
+          <a:bodyPr rtlCol="0" anchor="ctr"/>
+          <a:lstStyle/>
+          <a:p>
+            <a:pPr algn="ctr"/>
+            <a:endParaRPr lang="en-US"/>
+          </a:p>
+        </p:txBody>
+      </p:sp>
+      <p:cxnSp>
+        <p:nvCxnSpPr>
+          <p:cNvPr id="7" name="Straight Arrow Connector 6">
+            <a:extLst>
+              <a:ext uri="{FF2B5EF4-FFF2-40B4-BE49-F238E27FC236}">
+                <a16:creationId xmlns:a16="http://schemas.microsoft.com/office/drawing/2014/main" id="{00105F6A-D1D5-014C-A435-33BE57589744}"/>
+              </a:ext>
+            </a:extLst>
+          </p:cNvPr>
+          <p:cNvCxnSpPr/>
+          <p:nvPr/>
+        </p:nvCxnSpPr>
+        <p:spPr>
+          <a:xfrm>
+            <a:off x="899217" y="3042845"/>
+            <a:ext cx="0" cy="896470"/>
+          </a:xfrm>
+          <a:prstGeom prst="straightConnector1">
+            <a:avLst/>
+          </a:prstGeom>
+          <a:ln>
+            <a:headEnd type="triangle"/>
+            <a:tailEnd type="triangle"/>
+          </a:ln>
+        </p:spPr>
+        <p:style>
+          <a:lnRef idx="1">
+            <a:schemeClr val="accent1"/>
+          </a:lnRef>
+          <a:fillRef idx="0">
+            <a:schemeClr val="accent1"/>
+          </a:fillRef>
+          <a:effectRef idx="0">
+            <a:schemeClr val="accent1"/>
+          </a:effectRef>
+          <a:fontRef idx="minor">
+            <a:schemeClr val="tx1"/>
+          </a:fontRef>
+        </p:style>
+      </p:cxnSp>
+      <p:sp>
+        <p:nvSpPr>
+          <p:cNvPr id="8" name="TextBox 7">
+            <a:extLst>
+              <a:ext uri="{FF2B5EF4-FFF2-40B4-BE49-F238E27FC236}">
+                <a16:creationId xmlns:a16="http://schemas.microsoft.com/office/drawing/2014/main" id="{8D99E211-2C2E-1544-AAF7-FABF1A96CB40}"/>
+              </a:ext>
+            </a:extLst>
+          </p:cNvPr>
+          <p:cNvSpPr txBox="1"/>
+          <p:nvPr/>
+        </p:nvSpPr>
+        <p:spPr>
+          <a:xfrm>
+            <a:off x="517381" y="3306414"/>
+            <a:ext cx="381836" cy="369332"/>
+          </a:xfrm>
+          <a:prstGeom prst="rect">
+            <a:avLst/>
+          </a:prstGeom>
+          <a:noFill/>
+        </p:spPr>
+        <p:txBody>
+          <a:bodyPr wrap="none" rtlCol="0">
+            <a:spAutoFit/>
+          </a:bodyPr>
+          <a:lstStyle/>
+          <a:p>
+            <a:r>
+              <a:rPr lang="en-US" dirty="0"/>
+              <a:t>M</a:t>
+            </a:r>
+          </a:p>
+        </p:txBody>
+      </p:sp>
+      <p:cxnSp>
+        <p:nvCxnSpPr>
+          <p:cNvPr id="10" name="Straight Arrow Connector 9">
+            <a:extLst>
+              <a:ext uri="{FF2B5EF4-FFF2-40B4-BE49-F238E27FC236}">
+                <a16:creationId xmlns:a16="http://schemas.microsoft.com/office/drawing/2014/main" id="{D916499F-4B77-3045-BD56-31BD4896A1F0}"/>
+              </a:ext>
+            </a:extLst>
+          </p:cNvPr>
+          <p:cNvCxnSpPr/>
+          <p:nvPr/>
+        </p:nvCxnSpPr>
+        <p:spPr>
+          <a:xfrm>
+            <a:off x="1123335" y="2800798"/>
+            <a:ext cx="1712259" cy="0"/>
+          </a:xfrm>
+          <a:prstGeom prst="straightConnector1">
+            <a:avLst/>
+          </a:prstGeom>
+          <a:ln>
+            <a:headEnd type="triangle"/>
+            <a:tailEnd type="triangle"/>
+          </a:ln>
+        </p:spPr>
+        <p:style>
+          <a:lnRef idx="1">
+            <a:schemeClr val="accent1"/>
+          </a:lnRef>
+          <a:fillRef idx="0">
+            <a:schemeClr val="accent1"/>
+          </a:fillRef>
+          <a:effectRef idx="0">
+            <a:schemeClr val="accent1"/>
+          </a:effectRef>
+          <a:fontRef idx="minor">
+            <a:schemeClr val="tx1"/>
+          </a:fontRef>
+        </p:style>
+      </p:cxnSp>
+      <p:sp>
+        <p:nvSpPr>
+          <p:cNvPr id="11" name="TextBox 10">
+            <a:extLst>
+              <a:ext uri="{FF2B5EF4-FFF2-40B4-BE49-F238E27FC236}">
+                <a16:creationId xmlns:a16="http://schemas.microsoft.com/office/drawing/2014/main" id="{CA42D462-FBBA-4D4F-A79F-A0931217367D}"/>
+              </a:ext>
+            </a:extLst>
+          </p:cNvPr>
+          <p:cNvSpPr txBox="1"/>
+          <p:nvPr/>
+        </p:nvSpPr>
+        <p:spPr>
+          <a:xfrm>
+            <a:off x="1838239" y="2439542"/>
+            <a:ext cx="282450" cy="369332"/>
+          </a:xfrm>
+          <a:prstGeom prst="rect">
+            <a:avLst/>
+          </a:prstGeom>
+          <a:noFill/>
+        </p:spPr>
+        <p:txBody>
+          <a:bodyPr wrap="none" rtlCol="0">
+            <a:spAutoFit/>
+          </a:bodyPr>
+          <a:lstStyle/>
+          <a:p>
+            <a:r>
+              <a:rPr lang="en-US" dirty="0"/>
+              <a:t>L</a:t>
+            </a:r>
+          </a:p>
+        </p:txBody>
+      </p:sp>
+      <p:sp>
+        <p:nvSpPr>
+          <p:cNvPr id="25" name="Rectangle 24">
+            <a:extLst>
+              <a:ext uri="{FF2B5EF4-FFF2-40B4-BE49-F238E27FC236}">
+                <a16:creationId xmlns:a16="http://schemas.microsoft.com/office/drawing/2014/main" id="{2BB5EE3F-EA8C-3541-B76E-3600EB2B05A4}"/>
+              </a:ext>
+            </a:extLst>
+          </p:cNvPr>
+          <p:cNvSpPr/>
+          <p:nvPr/>
+        </p:nvSpPr>
+        <p:spPr>
+          <a:xfrm>
+            <a:off x="4000112" y="2052032"/>
+            <a:ext cx="1712259" cy="896470"/>
+          </a:xfrm>
+          <a:prstGeom prst="rect">
+            <a:avLst/>
+          </a:prstGeom>
+          <a:solidFill>
+            <a:schemeClr val="accent4">
+              <a:lumMod val="40000"/>
+              <a:lumOff val="60000"/>
+            </a:schemeClr>
+          </a:solidFill>
+          <a:ln>
+            <a:solidFill>
+              <a:schemeClr val="accent4">
+                <a:lumMod val="60000"/>
+                <a:lumOff val="40000"/>
+              </a:schemeClr>
+            </a:solidFill>
+          </a:ln>
+        </p:spPr>
+        <p:style>
+          <a:lnRef idx="2">
+            <a:schemeClr val="accent1">
+              <a:shade val="50000"/>
+            </a:schemeClr>
+          </a:lnRef>
+          <a:fillRef idx="1">
+            <a:schemeClr val="accent1"/>
+          </a:fillRef>
+          <a:effectRef idx="0">
+            <a:schemeClr val="accent1"/>
+          </a:effectRef>
+          <a:fontRef idx="minor">
+            <a:schemeClr val="lt1"/>
+          </a:fontRef>
+        </p:style>
+        <p:txBody>
+          <a:bodyPr rtlCol="0" anchor="ctr"/>
+          <a:lstStyle/>
+          <a:p>
+            <a:pPr algn="ctr"/>
+            <a:endParaRPr lang="en-US"/>
+          </a:p>
+        </p:txBody>
+      </p:sp>
+      <p:sp>
+        <p:nvSpPr>
+          <p:cNvPr id="26" name="Rectangle 25">
+            <a:extLst>
+              <a:ext uri="{FF2B5EF4-FFF2-40B4-BE49-F238E27FC236}">
+                <a16:creationId xmlns:a16="http://schemas.microsoft.com/office/drawing/2014/main" id="{D4F72141-3AA6-CE45-B685-206446D01A83}"/>
+              </a:ext>
+            </a:extLst>
+          </p:cNvPr>
+          <p:cNvSpPr/>
+          <p:nvPr/>
+        </p:nvSpPr>
+        <p:spPr>
+          <a:xfrm>
+            <a:off x="4000112" y="3100898"/>
+            <a:ext cx="1712259" cy="896470"/>
+          </a:xfrm>
+          <a:prstGeom prst="rect">
+            <a:avLst/>
+          </a:prstGeom>
+          <a:solidFill>
+            <a:schemeClr val="accent6">
+              <a:lumMod val="40000"/>
+              <a:lumOff val="60000"/>
+            </a:schemeClr>
+          </a:solidFill>
+          <a:ln>
+            <a:solidFill>
+              <a:schemeClr val="accent6">
+                <a:lumMod val="60000"/>
+                <a:lumOff val="40000"/>
+              </a:schemeClr>
+            </a:solidFill>
+          </a:ln>
+        </p:spPr>
+        <p:style>
+          <a:lnRef idx="2">
+            <a:schemeClr val="accent1">
+              <a:shade val="50000"/>
+            </a:schemeClr>
+          </a:lnRef>
+          <a:fillRef idx="1">
+            <a:schemeClr val="accent1"/>
+          </a:fillRef>
+          <a:effectRef idx="0">
+            <a:schemeClr val="accent1"/>
+          </a:effectRef>
+          <a:fontRef idx="minor">
+            <a:schemeClr val="lt1"/>
+          </a:fontRef>
+        </p:style>
+        <p:txBody>
+          <a:bodyPr rtlCol="0" anchor="ctr"/>
+          <a:lstStyle/>
+          <a:p>
+            <a:pPr algn="ctr"/>
+            <a:endParaRPr lang="en-US"/>
+          </a:p>
+        </p:txBody>
+      </p:sp>
+      <p:sp>
+        <p:nvSpPr>
+          <p:cNvPr id="27" name="Rectangle 26">
+            <a:extLst>
+              <a:ext uri="{FF2B5EF4-FFF2-40B4-BE49-F238E27FC236}">
+                <a16:creationId xmlns:a16="http://schemas.microsoft.com/office/drawing/2014/main" id="{E7B57AF6-21C8-4645-9F40-86F1464F73B1}"/>
+              </a:ext>
+            </a:extLst>
+          </p:cNvPr>
+          <p:cNvSpPr/>
+          <p:nvPr/>
+        </p:nvSpPr>
+        <p:spPr>
+          <a:xfrm>
+            <a:off x="4000112" y="4149764"/>
+            <a:ext cx="1712259" cy="896470"/>
+          </a:xfrm>
+          <a:prstGeom prst="rect">
+            <a:avLst/>
+          </a:prstGeom>
+          <a:solidFill>
+            <a:schemeClr val="accent2">
+              <a:lumMod val="40000"/>
+              <a:lumOff val="60000"/>
+            </a:schemeClr>
+          </a:solidFill>
+          <a:ln>
+            <a:solidFill>
+              <a:schemeClr val="accent2">
+                <a:lumMod val="60000"/>
+                <a:lumOff val="40000"/>
+              </a:schemeClr>
+            </a:solidFill>
+          </a:ln>
+        </p:spPr>
+        <p:style>
+          <a:lnRef idx="2">
+            <a:schemeClr val="accent1">
+              <a:shade val="50000"/>
+            </a:schemeClr>
+          </a:lnRef>
+          <a:fillRef idx="1">
+            <a:schemeClr val="accent1"/>
+          </a:fillRef>
+          <a:effectRef idx="0">
+            <a:schemeClr val="accent1"/>
+          </a:effectRef>
+          <a:fontRef idx="minor">
+            <a:schemeClr val="lt1"/>
+          </a:fontRef>
+        </p:style>
+        <p:txBody>
+          <a:bodyPr rtlCol="0" anchor="ctr"/>
+          <a:lstStyle/>
+          <a:p>
+            <a:pPr algn="ctr"/>
+            <a:endParaRPr lang="en-US"/>
+          </a:p>
+        </p:txBody>
+      </p:sp>
+      <p:cxnSp>
+        <p:nvCxnSpPr>
+          <p:cNvPr id="28" name="Straight Arrow Connector 27">
+            <a:extLst>
+              <a:ext uri="{FF2B5EF4-FFF2-40B4-BE49-F238E27FC236}">
+                <a16:creationId xmlns:a16="http://schemas.microsoft.com/office/drawing/2014/main" id="{E0B56DD5-0D60-5C49-971D-747252ABBCC6}"/>
+              </a:ext>
+            </a:extLst>
+          </p:cNvPr>
+          <p:cNvCxnSpPr>
+            <a:cxnSpLocks/>
+          </p:cNvCxnSpPr>
+          <p:nvPr/>
+        </p:nvCxnSpPr>
+        <p:spPr>
+          <a:xfrm>
+            <a:off x="3847713" y="2052032"/>
+            <a:ext cx="0" cy="896470"/>
+          </a:xfrm>
+          <a:prstGeom prst="straightConnector1">
+            <a:avLst/>
+          </a:prstGeom>
+          <a:ln>
+            <a:headEnd type="triangle"/>
+            <a:tailEnd type="triangle"/>
+          </a:ln>
+        </p:spPr>
+        <p:style>
+          <a:lnRef idx="1">
+            <a:schemeClr val="accent1"/>
+          </a:lnRef>
+          <a:fillRef idx="0">
+            <a:schemeClr val="accent1"/>
+          </a:fillRef>
+          <a:effectRef idx="0">
+            <a:schemeClr val="accent1"/>
+          </a:effectRef>
+          <a:fontRef idx="minor">
+            <a:schemeClr val="tx1"/>
+          </a:fontRef>
+        </p:style>
+      </p:cxnSp>
+      <mc:AlternateContent xmlns:mc="http://schemas.openxmlformats.org/markup-compatibility/2006">
+        <mc:Choice xmlns:a14="http://schemas.microsoft.com/office/drawing/2010/main" Requires="a14">
+          <p:sp>
+            <p:nvSpPr>
+              <p:cNvPr id="29" name="TextBox 28">
+                <a:extLst>
+                  <a:ext uri="{FF2B5EF4-FFF2-40B4-BE49-F238E27FC236}">
+                    <a16:creationId xmlns:a16="http://schemas.microsoft.com/office/drawing/2014/main" id="{AF8F7ECC-C9C7-E94C-9128-6C3FC01D89D4}"/>
+                  </a:ext>
+                </a:extLst>
+              </p:cNvPr>
+              <p:cNvSpPr txBox="1"/>
+              <p:nvPr/>
+            </p:nvSpPr>
+            <p:spPr>
+              <a:xfrm rot="16200000">
+                <a:off x="3124037" y="2342492"/>
+                <a:ext cx="1031373" cy="369332"/>
+              </a:xfrm>
+              <a:prstGeom prst="rect">
+                <a:avLst/>
+              </a:prstGeom>
+              <a:noFill/>
+            </p:spPr>
+            <p:txBody>
+              <a:bodyPr wrap="none" rtlCol="0">
+                <a:spAutoFit/>
+              </a:bodyPr>
+              <a:lstStyle/>
+              <a:p>
+                <a14:m>
+                  <m:oMathPara xmlns:m="http://schemas.openxmlformats.org/officeDocument/2006/math">
+                    <m:oMathParaPr>
+                      <m:jc m:val="centerGroup"/>
+                    </m:oMathParaPr>
+                    <m:oMath xmlns:m="http://schemas.openxmlformats.org/officeDocument/2006/math">
+                      <m:sSub>
+                        <m:sSubPr>
+                          <m:ctrlPr>
+                            <a:rPr lang="en-US" i="1" smtClean="0">
+                              <a:latin typeface="Cambria Math" panose="02040503050406030204" pitchFamily="18" charset="0"/>
+                            </a:rPr>
+                          </m:ctrlPr>
+                        </m:sSubPr>
+                        <m:e>
+                          <m:r>
+                            <a:rPr lang="es-ES" b="0" i="1" smtClean="0">
+                              <a:latin typeface="Cambria Math" panose="02040503050406030204" pitchFamily="18" charset="0"/>
+                            </a:rPr>
+                            <m:t>𝑀</m:t>
+                          </m:r>
+                        </m:e>
+                        <m:sub>
+                          <m:r>
+                            <a:rPr lang="es-ES" b="0" i="1" smtClean="0">
+                              <a:latin typeface="Cambria Math" panose="02040503050406030204" pitchFamily="18" charset="0"/>
+                            </a:rPr>
+                            <m:t>𝑒</m:t>
+                          </m:r>
+                        </m:sub>
+                      </m:sSub>
+                      <m:r>
+                        <a:rPr lang="es-ES" b="0" i="1" smtClean="0">
+                          <a:latin typeface="Cambria Math" panose="02040503050406030204" pitchFamily="18" charset="0"/>
+                        </a:rPr>
+                        <m:t>=</m:t>
+                      </m:r>
+                      <m:r>
+                        <a:rPr lang="es-ES" b="0" i="1" smtClean="0">
+                          <a:latin typeface="Cambria Math" panose="02040503050406030204" pitchFamily="18" charset="0"/>
+                        </a:rPr>
+                        <m:t>𝑀</m:t>
+                      </m:r>
+                    </m:oMath>
+                  </m:oMathPara>
+                </a14:m>
+                <a:endParaRPr lang="en-US" dirty="0"/>
+              </a:p>
+            </p:txBody>
+          </p:sp>
+        </mc:Choice>
+        <mc:Fallback>
+          <p:sp>
+            <p:nvSpPr>
+              <p:cNvPr id="29" name="TextBox 28">
+                <a:extLst>
+                  <a:ext uri="{FF2B5EF4-FFF2-40B4-BE49-F238E27FC236}">
+                    <a16:creationId xmlns:a16="http://schemas.microsoft.com/office/drawing/2014/main" id="{AF8F7ECC-C9C7-E94C-9128-6C3FC01D89D4}"/>
+                  </a:ext>
+                </a:extLst>
+              </p:cNvPr>
+              <p:cNvSpPr txBox="1">
+                <a:spLocks noRot="1" noChangeAspect="1" noMove="1" noResize="1" noEditPoints="1" noAdjustHandles="1" noChangeArrowheads="1" noChangeShapeType="1" noTextEdit="1"/>
+              </p:cNvSpPr>
+              <p:nvPr/>
+            </p:nvSpPr>
+            <p:spPr>
+              <a:xfrm rot="16200000">
+                <a:off x="3124037" y="2342492"/>
+                <a:ext cx="1031373" cy="369332"/>
+              </a:xfrm>
+              <a:prstGeom prst="rect">
+                <a:avLst/>
+              </a:prstGeom>
+              <a:blipFill>
+                <a:blip r:embed="rId2"/>
+                <a:stretch>
+                  <a:fillRect/>
+                </a:stretch>
+              </a:blipFill>
+            </p:spPr>
+            <p:txBody>
+              <a:bodyPr/>
+              <a:lstStyle/>
+              <a:p>
+                <a:r>
+                  <a:rPr lang="en-US">
+                    <a:noFill/>
+                  </a:rPr>
+                  <a:t> </a:t>
+                </a:r>
+              </a:p>
+            </p:txBody>
+          </p:sp>
+        </mc:Fallback>
+      </mc:AlternateContent>
+      <p:cxnSp>
+        <p:nvCxnSpPr>
+          <p:cNvPr id="30" name="Straight Arrow Connector 29">
+            <a:extLst>
+              <a:ext uri="{FF2B5EF4-FFF2-40B4-BE49-F238E27FC236}">
+                <a16:creationId xmlns:a16="http://schemas.microsoft.com/office/drawing/2014/main" id="{A95999B9-B2B3-5941-8C6D-0A3C4043E943}"/>
+              </a:ext>
+            </a:extLst>
+          </p:cNvPr>
+          <p:cNvCxnSpPr>
+            <a:cxnSpLocks/>
+          </p:cNvCxnSpPr>
+          <p:nvPr/>
+        </p:nvCxnSpPr>
+        <p:spPr>
+          <a:xfrm>
+            <a:off x="4000112" y="1917561"/>
+            <a:ext cx="1712259" cy="0"/>
+          </a:xfrm>
+          <a:prstGeom prst="straightConnector1">
+            <a:avLst/>
+          </a:prstGeom>
+          <a:ln>
+            <a:headEnd type="triangle"/>
+            <a:tailEnd type="triangle"/>
+          </a:ln>
+        </p:spPr>
+        <p:style>
+          <a:lnRef idx="1">
+            <a:schemeClr val="accent1"/>
+          </a:lnRef>
+          <a:fillRef idx="0">
+            <a:schemeClr val="accent1"/>
+          </a:fillRef>
+          <a:effectRef idx="0">
+            <a:schemeClr val="accent1"/>
+          </a:effectRef>
+          <a:fontRef idx="minor">
+            <a:schemeClr val="tx1"/>
+          </a:fontRef>
+        </p:style>
+      </p:cxnSp>
+      <mc:AlternateContent xmlns:mc="http://schemas.openxmlformats.org/markup-compatibility/2006">
+        <mc:Choice xmlns:a14="http://schemas.microsoft.com/office/drawing/2010/main" Requires="a14">
+          <p:sp>
+            <p:nvSpPr>
+              <p:cNvPr id="31" name="TextBox 30">
+                <a:extLst>
+                  <a:ext uri="{FF2B5EF4-FFF2-40B4-BE49-F238E27FC236}">
+                    <a16:creationId xmlns:a16="http://schemas.microsoft.com/office/drawing/2014/main" id="{E92A7F68-EFC7-4948-BC3E-5DF6B001AF66}"/>
+                  </a:ext>
+                </a:extLst>
+              </p:cNvPr>
+              <p:cNvSpPr txBox="1"/>
+              <p:nvPr/>
+            </p:nvSpPr>
+            <p:spPr>
+              <a:xfrm>
+                <a:off x="4622748" y="1548229"/>
+                <a:ext cx="466986" cy="369332"/>
+              </a:xfrm>
+              <a:prstGeom prst="rect">
+                <a:avLst/>
+              </a:prstGeom>
+              <a:noFill/>
+            </p:spPr>
+            <p:txBody>
+              <a:bodyPr wrap="none" rtlCol="0">
+                <a:spAutoFit/>
+              </a:bodyPr>
+              <a:lstStyle/>
+              <a:p>
+                <a14:m>
+                  <m:oMathPara xmlns:m="http://schemas.openxmlformats.org/officeDocument/2006/math">
+                    <m:oMathParaPr>
+                      <m:jc m:val="centerGroup"/>
+                    </m:oMathParaPr>
+                    <m:oMath xmlns:m="http://schemas.openxmlformats.org/officeDocument/2006/math">
+                      <m:sSub>
+                        <m:sSubPr>
+                          <m:ctrlPr>
+                            <a:rPr lang="en-US" i="1" smtClean="0">
+                              <a:latin typeface="Cambria Math" panose="02040503050406030204" pitchFamily="18" charset="0"/>
+                            </a:rPr>
+                          </m:ctrlPr>
+                        </m:sSubPr>
+                        <m:e>
+                          <m:r>
+                            <a:rPr lang="es-ES" b="0" i="1" smtClean="0">
+                              <a:latin typeface="Cambria Math" panose="02040503050406030204" pitchFamily="18" charset="0"/>
+                            </a:rPr>
+                            <m:t>𝐿</m:t>
+                          </m:r>
+                        </m:e>
+                        <m:sub>
+                          <m:r>
+                            <a:rPr lang="es-ES" b="0" i="1" smtClean="0">
+                              <a:latin typeface="Cambria Math" panose="02040503050406030204" pitchFamily="18" charset="0"/>
+                            </a:rPr>
+                            <m:t>𝑒</m:t>
+                          </m:r>
+                        </m:sub>
+                      </m:sSub>
+                    </m:oMath>
+                  </m:oMathPara>
+                </a14:m>
+                <a:endParaRPr lang="en-US" dirty="0"/>
+              </a:p>
+            </p:txBody>
+          </p:sp>
+        </mc:Choice>
+        <mc:Fallback>
+          <p:sp>
+            <p:nvSpPr>
+              <p:cNvPr id="31" name="TextBox 30">
+                <a:extLst>
+                  <a:ext uri="{FF2B5EF4-FFF2-40B4-BE49-F238E27FC236}">
+                    <a16:creationId xmlns:a16="http://schemas.microsoft.com/office/drawing/2014/main" id="{E92A7F68-EFC7-4948-BC3E-5DF6B001AF66}"/>
+                  </a:ext>
+                </a:extLst>
+              </p:cNvPr>
+              <p:cNvSpPr txBox="1">
+                <a:spLocks noRot="1" noChangeAspect="1" noMove="1" noResize="1" noEditPoints="1" noAdjustHandles="1" noChangeArrowheads="1" noChangeShapeType="1" noTextEdit="1"/>
+              </p:cNvSpPr>
+              <p:nvPr/>
+            </p:nvSpPr>
+            <p:spPr>
+              <a:xfrm>
+                <a:off x="4622748" y="1548229"/>
+                <a:ext cx="466986" cy="369332"/>
+              </a:xfrm>
+              <a:prstGeom prst="rect">
+                <a:avLst/>
+              </a:prstGeom>
+              <a:blipFill>
+                <a:blip r:embed="rId3"/>
+                <a:stretch>
+                  <a:fillRect/>
+                </a:stretch>
+              </a:blipFill>
+            </p:spPr>
+            <p:txBody>
+              <a:bodyPr/>
+              <a:lstStyle/>
+              <a:p>
+                <a:r>
+                  <a:rPr lang="en-US">
+                    <a:noFill/>
+                  </a:rPr>
+                  <a:t> </a:t>
+                </a:r>
+              </a:p>
+            </p:txBody>
+          </p:sp>
+        </mc:Fallback>
+      </mc:AlternateContent>
+      <p:sp>
+        <p:nvSpPr>
+          <p:cNvPr id="34" name="TextBox 33">
+            <a:extLst>
+              <a:ext uri="{FF2B5EF4-FFF2-40B4-BE49-F238E27FC236}">
+                <a16:creationId xmlns:a16="http://schemas.microsoft.com/office/drawing/2014/main" id="{229DAEDE-52D3-B541-B84F-6ECBE6090A13}"/>
+              </a:ext>
+            </a:extLst>
+          </p:cNvPr>
+          <p:cNvSpPr txBox="1"/>
+          <p:nvPr/>
+        </p:nvSpPr>
+        <p:spPr>
+          <a:xfrm>
+            <a:off x="3711388" y="1213828"/>
+            <a:ext cx="1921745" cy="369332"/>
+          </a:xfrm>
+          <a:prstGeom prst="rect">
+            <a:avLst/>
+          </a:prstGeom>
+          <a:noFill/>
+        </p:spPr>
+        <p:txBody>
+          <a:bodyPr wrap="none" rtlCol="0">
+            <a:spAutoFit/>
+          </a:bodyPr>
+          <a:lstStyle/>
+          <a:p>
+            <a:r>
+              <a:rPr lang="en-US" dirty="0"/>
+              <a:t>B: Vertical Division</a:t>
+            </a:r>
+          </a:p>
+        </p:txBody>
+      </p:sp>
+      <p:sp>
+        <p:nvSpPr>
+          <p:cNvPr id="42" name="TextBox 41">
+            <a:extLst>
+              <a:ext uri="{FF2B5EF4-FFF2-40B4-BE49-F238E27FC236}">
+                <a16:creationId xmlns:a16="http://schemas.microsoft.com/office/drawing/2014/main" id="{477AC6E4-2974-0642-B9E3-870C05FB8CF8}"/>
+              </a:ext>
+            </a:extLst>
+          </p:cNvPr>
+          <p:cNvSpPr txBox="1"/>
+          <p:nvPr/>
+        </p:nvSpPr>
+        <p:spPr>
+          <a:xfrm>
+            <a:off x="6369476" y="1213828"/>
+            <a:ext cx="3258008" cy="369332"/>
+          </a:xfrm>
+          <a:prstGeom prst="rect">
+            <a:avLst/>
+          </a:prstGeom>
+          <a:noFill/>
+        </p:spPr>
+        <p:txBody>
+          <a:bodyPr wrap="none" rtlCol="0">
+            <a:spAutoFit/>
+          </a:bodyPr>
+          <a:lstStyle/>
+          <a:p>
+            <a:r>
+              <a:rPr lang="en-US" dirty="0"/>
+              <a:t>BA: Conditioned Vertical Division</a:t>
+            </a:r>
+          </a:p>
+        </p:txBody>
+      </p:sp>
+      <p:sp>
+        <p:nvSpPr>
+          <p:cNvPr id="47" name="Rectangle 46">
+            <a:extLst>
+              <a:ext uri="{FF2B5EF4-FFF2-40B4-BE49-F238E27FC236}">
+                <a16:creationId xmlns:a16="http://schemas.microsoft.com/office/drawing/2014/main" id="{971241F2-256C-CA44-8241-716CECCE1741}"/>
+              </a:ext>
+            </a:extLst>
+          </p:cNvPr>
+          <p:cNvSpPr/>
+          <p:nvPr/>
+        </p:nvSpPr>
+        <p:spPr>
+          <a:xfrm>
+            <a:off x="7130655" y="2052032"/>
+            <a:ext cx="2291251" cy="757515"/>
+          </a:xfrm>
+          <a:prstGeom prst="rect">
+            <a:avLst/>
+          </a:prstGeom>
+          <a:solidFill>
+            <a:schemeClr val="accent4">
+              <a:lumMod val="40000"/>
+              <a:lumOff val="60000"/>
+            </a:schemeClr>
+          </a:solidFill>
+          <a:ln>
+            <a:solidFill>
+              <a:schemeClr val="accent4">
+                <a:lumMod val="60000"/>
+                <a:lumOff val="40000"/>
+              </a:schemeClr>
+            </a:solidFill>
+          </a:ln>
+        </p:spPr>
+        <p:style>
+          <a:lnRef idx="2">
+            <a:schemeClr val="accent1">
+              <a:shade val="50000"/>
+            </a:schemeClr>
+          </a:lnRef>
+          <a:fillRef idx="1">
+            <a:schemeClr val="accent1"/>
+          </a:fillRef>
+          <a:effectRef idx="0">
+            <a:schemeClr val="accent1"/>
+          </a:effectRef>
+          <a:fontRef idx="minor">
+            <a:schemeClr val="lt1"/>
+          </a:fontRef>
+        </p:style>
+        <p:txBody>
+          <a:bodyPr rtlCol="0" anchor="ctr"/>
+          <a:lstStyle/>
+          <a:p>
+            <a:pPr algn="ctr"/>
+            <a:endParaRPr lang="en-US"/>
+          </a:p>
+        </p:txBody>
+      </p:sp>
+      <p:sp>
+        <p:nvSpPr>
+          <p:cNvPr id="48" name="Rectangle 47">
+            <a:extLst>
+              <a:ext uri="{FF2B5EF4-FFF2-40B4-BE49-F238E27FC236}">
+                <a16:creationId xmlns:a16="http://schemas.microsoft.com/office/drawing/2014/main" id="{608134B8-3D14-D144-A2BC-910C7AE11744}"/>
+              </a:ext>
+            </a:extLst>
+          </p:cNvPr>
+          <p:cNvSpPr/>
+          <p:nvPr/>
+        </p:nvSpPr>
+        <p:spPr>
+          <a:xfrm>
+            <a:off x="7130655" y="3100898"/>
+            <a:ext cx="2291251" cy="757515"/>
+          </a:xfrm>
+          <a:prstGeom prst="rect">
+            <a:avLst/>
+          </a:prstGeom>
+          <a:solidFill>
+            <a:schemeClr val="accent6">
+              <a:lumMod val="40000"/>
+              <a:lumOff val="60000"/>
+            </a:schemeClr>
+          </a:solidFill>
+          <a:ln>
+            <a:solidFill>
+              <a:schemeClr val="accent6">
+                <a:lumMod val="60000"/>
+                <a:lumOff val="40000"/>
+              </a:schemeClr>
+            </a:solidFill>
+          </a:ln>
+        </p:spPr>
+        <p:style>
+          <a:lnRef idx="2">
+            <a:schemeClr val="accent1">
+              <a:shade val="50000"/>
+            </a:schemeClr>
+          </a:lnRef>
+          <a:fillRef idx="1">
+            <a:schemeClr val="accent1"/>
+          </a:fillRef>
+          <a:effectRef idx="0">
+            <a:schemeClr val="accent1"/>
+          </a:effectRef>
+          <a:fontRef idx="minor">
+            <a:schemeClr val="lt1"/>
+          </a:fontRef>
+        </p:style>
+        <p:txBody>
+          <a:bodyPr rtlCol="0" anchor="ctr"/>
+          <a:lstStyle/>
+          <a:p>
+            <a:pPr algn="ctr"/>
+            <a:endParaRPr lang="en-US"/>
+          </a:p>
+        </p:txBody>
+      </p:sp>
+      <p:sp>
+        <p:nvSpPr>
+          <p:cNvPr id="49" name="Rectangle 48">
+            <a:extLst>
+              <a:ext uri="{FF2B5EF4-FFF2-40B4-BE49-F238E27FC236}">
+                <a16:creationId xmlns:a16="http://schemas.microsoft.com/office/drawing/2014/main" id="{8607FA21-97A5-C14F-8730-A63D662889D9}"/>
+              </a:ext>
+            </a:extLst>
+          </p:cNvPr>
+          <p:cNvSpPr/>
+          <p:nvPr/>
+        </p:nvSpPr>
+        <p:spPr>
+          <a:xfrm>
+            <a:off x="7130655" y="4149764"/>
+            <a:ext cx="2291251" cy="757515"/>
+          </a:xfrm>
+          <a:prstGeom prst="rect">
+            <a:avLst/>
+          </a:prstGeom>
+          <a:solidFill>
+            <a:schemeClr val="accent2">
+              <a:lumMod val="40000"/>
+              <a:lumOff val="60000"/>
+            </a:schemeClr>
+          </a:solidFill>
+          <a:ln>
+            <a:solidFill>
+              <a:schemeClr val="accent2">
+                <a:lumMod val="60000"/>
+                <a:lumOff val="40000"/>
+              </a:schemeClr>
+            </a:solidFill>
+          </a:ln>
+        </p:spPr>
+        <p:style>
+          <a:lnRef idx="2">
+            <a:schemeClr val="accent1">
+              <a:shade val="50000"/>
+            </a:schemeClr>
+          </a:lnRef>
+          <a:fillRef idx="1">
+            <a:schemeClr val="accent1"/>
+          </a:fillRef>
+          <a:effectRef idx="0">
+            <a:schemeClr val="accent1"/>
+          </a:effectRef>
+          <a:fontRef idx="minor">
+            <a:schemeClr val="lt1"/>
+          </a:fontRef>
+        </p:style>
+        <p:txBody>
+          <a:bodyPr rtlCol="0" anchor="ctr"/>
+          <a:lstStyle/>
+          <a:p>
+            <a:pPr algn="ctr"/>
+            <a:endParaRPr lang="en-US"/>
+          </a:p>
+        </p:txBody>
+      </p:sp>
+      <p:cxnSp>
+        <p:nvCxnSpPr>
+          <p:cNvPr id="50" name="Straight Arrow Connector 49">
+            <a:extLst>
+              <a:ext uri="{FF2B5EF4-FFF2-40B4-BE49-F238E27FC236}">
+                <a16:creationId xmlns:a16="http://schemas.microsoft.com/office/drawing/2014/main" id="{5E1F3D84-DB5B-A74B-8E63-270BD163AEAA}"/>
+              </a:ext>
+            </a:extLst>
+          </p:cNvPr>
+          <p:cNvCxnSpPr>
+            <a:cxnSpLocks/>
+          </p:cNvCxnSpPr>
+          <p:nvPr/>
+        </p:nvCxnSpPr>
+        <p:spPr>
+          <a:xfrm>
+            <a:off x="6978256" y="2052032"/>
+            <a:ext cx="0" cy="896470"/>
+          </a:xfrm>
+          <a:prstGeom prst="straightConnector1">
+            <a:avLst/>
+          </a:prstGeom>
+          <a:ln>
+            <a:headEnd type="triangle"/>
+            <a:tailEnd type="triangle"/>
+          </a:ln>
+        </p:spPr>
+        <p:style>
+          <a:lnRef idx="1">
+            <a:schemeClr val="accent1"/>
+          </a:lnRef>
+          <a:fillRef idx="0">
+            <a:schemeClr val="accent1"/>
+          </a:fillRef>
+          <a:effectRef idx="0">
+            <a:schemeClr val="accent1"/>
+          </a:effectRef>
+          <a:fontRef idx="minor">
+            <a:schemeClr val="tx1"/>
+          </a:fontRef>
+        </p:style>
+      </p:cxnSp>
+      <mc:AlternateContent xmlns:mc="http://schemas.openxmlformats.org/markup-compatibility/2006">
+        <mc:Choice xmlns:a14="http://schemas.microsoft.com/office/drawing/2010/main" Requires="a14">
+          <p:sp>
+            <p:nvSpPr>
+              <p:cNvPr id="51" name="TextBox 50">
+                <a:extLst>
+                  <a:ext uri="{FF2B5EF4-FFF2-40B4-BE49-F238E27FC236}">
+                    <a16:creationId xmlns:a16="http://schemas.microsoft.com/office/drawing/2014/main" id="{3F7EDF32-73C3-AB43-9BAA-62195F68E053}"/>
+                  </a:ext>
+                </a:extLst>
+              </p:cNvPr>
+              <p:cNvSpPr txBox="1"/>
+              <p:nvPr/>
+            </p:nvSpPr>
+            <p:spPr>
+              <a:xfrm rot="16200000">
+                <a:off x="6115153" y="2342492"/>
+                <a:ext cx="1310230" cy="369332"/>
+              </a:xfrm>
+              <a:prstGeom prst="rect">
+                <a:avLst/>
+              </a:prstGeom>
+              <a:noFill/>
+            </p:spPr>
+            <p:txBody>
+              <a:bodyPr wrap="none" rtlCol="0">
+                <a:spAutoFit/>
+              </a:bodyPr>
+              <a:lstStyle/>
+              <a:p>
+                <a14:m>
+                  <m:oMathPara xmlns:m="http://schemas.openxmlformats.org/officeDocument/2006/math">
+                    <m:oMathParaPr>
+                      <m:jc m:val="centerGroup"/>
+                    </m:oMathParaPr>
+                    <m:oMath xmlns:m="http://schemas.openxmlformats.org/officeDocument/2006/math">
+                      <m:sSub>
+                        <m:sSubPr>
+                          <m:ctrlPr>
+                            <a:rPr lang="en-US" i="1" smtClean="0">
+                              <a:latin typeface="Cambria Math" panose="02040503050406030204" pitchFamily="18" charset="0"/>
+                            </a:rPr>
+                          </m:ctrlPr>
+                        </m:sSubPr>
+                        <m:e>
+                          <m:r>
+                            <a:rPr lang="es-ES" b="0" i="1" smtClean="0">
+                              <a:latin typeface="Cambria Math" panose="02040503050406030204" pitchFamily="18" charset="0"/>
+                            </a:rPr>
+                            <m:t>𝑀</m:t>
+                          </m:r>
+                        </m:e>
+                        <m:sub>
+                          <m:r>
+                            <a:rPr lang="es-ES" b="0" i="1" smtClean="0">
+                              <a:latin typeface="Cambria Math" panose="02040503050406030204" pitchFamily="18" charset="0"/>
+                            </a:rPr>
+                            <m:t>𝑒</m:t>
+                          </m:r>
+                        </m:sub>
+                      </m:sSub>
+                      <m:r>
+                        <a:rPr lang="es-ES" b="0" i="1" smtClean="0">
+                          <a:latin typeface="Cambria Math" panose="02040503050406030204" pitchFamily="18" charset="0"/>
+                        </a:rPr>
+                        <m:t>(</m:t>
+                      </m:r>
+                      <m:r>
+                        <a:rPr lang="es-ES" b="0" i="1" smtClean="0">
+                          <a:latin typeface="Cambria Math" panose="02040503050406030204" pitchFamily="18" charset="0"/>
+                        </a:rPr>
+                        <m:t>𝑔𝑖𝑣𝑒𝑛</m:t>
+                      </m:r>
+                      <m:r>
+                        <a:rPr lang="es-ES" b="0" i="1" smtClean="0">
+                          <a:latin typeface="Cambria Math" panose="02040503050406030204" pitchFamily="18" charset="0"/>
+                        </a:rPr>
+                        <m:t>)</m:t>
+                      </m:r>
+                    </m:oMath>
+                  </m:oMathPara>
+                </a14:m>
+                <a:endParaRPr lang="en-US" dirty="0"/>
+              </a:p>
+            </p:txBody>
+          </p:sp>
+        </mc:Choice>
+        <mc:Fallback>
+          <p:sp>
+            <p:nvSpPr>
+              <p:cNvPr id="51" name="TextBox 50">
+                <a:extLst>
+                  <a:ext uri="{FF2B5EF4-FFF2-40B4-BE49-F238E27FC236}">
+                    <a16:creationId xmlns:a16="http://schemas.microsoft.com/office/drawing/2014/main" id="{3F7EDF32-73C3-AB43-9BAA-62195F68E053}"/>
+                  </a:ext>
+                </a:extLst>
+              </p:cNvPr>
+              <p:cNvSpPr txBox="1">
+                <a:spLocks noRot="1" noChangeAspect="1" noMove="1" noResize="1" noEditPoints="1" noAdjustHandles="1" noChangeArrowheads="1" noChangeShapeType="1" noTextEdit="1"/>
+              </p:cNvSpPr>
+              <p:nvPr/>
+            </p:nvSpPr>
+            <p:spPr>
+              <a:xfrm rot="16200000">
+                <a:off x="6115153" y="2342492"/>
+                <a:ext cx="1310230" cy="369332"/>
+              </a:xfrm>
+              <a:prstGeom prst="rect">
+                <a:avLst/>
+              </a:prstGeom>
+              <a:blipFill>
+                <a:blip r:embed="rId4"/>
+                <a:stretch>
+                  <a:fillRect r="-13333"/>
+                </a:stretch>
+              </a:blipFill>
+            </p:spPr>
+            <p:txBody>
+              <a:bodyPr/>
+              <a:lstStyle/>
+              <a:p>
+                <a:r>
+                  <a:rPr lang="en-US">
+                    <a:noFill/>
+                  </a:rPr>
+                  <a:t> </a:t>
+                </a:r>
+              </a:p>
+            </p:txBody>
+          </p:sp>
+        </mc:Fallback>
+      </mc:AlternateContent>
+      <p:cxnSp>
+        <p:nvCxnSpPr>
+          <p:cNvPr id="52" name="Straight Arrow Connector 51">
+            <a:extLst>
+              <a:ext uri="{FF2B5EF4-FFF2-40B4-BE49-F238E27FC236}">
+                <a16:creationId xmlns:a16="http://schemas.microsoft.com/office/drawing/2014/main" id="{772E2D3A-8190-A945-9DB3-EE9F1912FCF1}"/>
+              </a:ext>
+            </a:extLst>
+          </p:cNvPr>
+          <p:cNvCxnSpPr>
+            <a:cxnSpLocks/>
+          </p:cNvCxnSpPr>
+          <p:nvPr/>
+        </p:nvCxnSpPr>
+        <p:spPr>
+          <a:xfrm>
+            <a:off x="7130655" y="1917561"/>
+            <a:ext cx="2291251" cy="0"/>
+          </a:xfrm>
+          <a:prstGeom prst="straightConnector1">
+            <a:avLst/>
+          </a:prstGeom>
+          <a:ln>
+            <a:headEnd type="triangle"/>
+            <a:tailEnd type="triangle"/>
+          </a:ln>
+        </p:spPr>
+        <p:style>
+          <a:lnRef idx="1">
+            <a:schemeClr val="accent1"/>
+          </a:lnRef>
+          <a:fillRef idx="0">
+            <a:schemeClr val="accent1"/>
+          </a:fillRef>
+          <a:effectRef idx="0">
+            <a:schemeClr val="accent1"/>
+          </a:effectRef>
+          <a:fontRef idx="minor">
+            <a:schemeClr val="tx1"/>
+          </a:fontRef>
+        </p:style>
+      </p:cxnSp>
+      <mc:AlternateContent xmlns:mc="http://schemas.openxmlformats.org/markup-compatibility/2006">
+        <mc:Choice xmlns:a14="http://schemas.microsoft.com/office/drawing/2010/main" Requires="a14">
+          <p:sp>
+            <p:nvSpPr>
+              <p:cNvPr id="53" name="TextBox 52">
+                <a:extLst>
+                  <a:ext uri="{FF2B5EF4-FFF2-40B4-BE49-F238E27FC236}">
+                    <a16:creationId xmlns:a16="http://schemas.microsoft.com/office/drawing/2014/main" id="{74D1F2DF-7F85-B740-AF75-F317483E0ED1}"/>
+                  </a:ext>
+                </a:extLst>
+              </p:cNvPr>
+              <p:cNvSpPr txBox="1"/>
+              <p:nvPr/>
+            </p:nvSpPr>
+            <p:spPr>
+              <a:xfrm>
+                <a:off x="8174632" y="1565695"/>
+                <a:ext cx="466986" cy="369332"/>
+              </a:xfrm>
+              <a:prstGeom prst="rect">
+                <a:avLst/>
+              </a:prstGeom>
+              <a:noFill/>
+            </p:spPr>
+            <p:txBody>
+              <a:bodyPr wrap="none" rtlCol="0">
+                <a:spAutoFit/>
+              </a:bodyPr>
+              <a:lstStyle/>
+              <a:p>
+                <a14:m>
+                  <m:oMathPara xmlns:m="http://schemas.openxmlformats.org/officeDocument/2006/math">
+                    <m:oMathParaPr>
+                      <m:jc m:val="centerGroup"/>
+                    </m:oMathParaPr>
+                    <m:oMath xmlns:m="http://schemas.openxmlformats.org/officeDocument/2006/math">
+                      <m:sSub>
+                        <m:sSubPr>
+                          <m:ctrlPr>
+                            <a:rPr lang="en-US" i="1" smtClean="0">
+                              <a:latin typeface="Cambria Math" panose="02040503050406030204" pitchFamily="18" charset="0"/>
+                            </a:rPr>
+                          </m:ctrlPr>
+                        </m:sSubPr>
+                        <m:e>
+                          <m:r>
+                            <a:rPr lang="es-ES" b="0" i="1" smtClean="0">
+                              <a:latin typeface="Cambria Math" panose="02040503050406030204" pitchFamily="18" charset="0"/>
+                            </a:rPr>
+                            <m:t>𝐿</m:t>
+                          </m:r>
+                        </m:e>
+                        <m:sub>
+                          <m:r>
+                            <a:rPr lang="es-ES" b="0" i="1" smtClean="0">
+                              <a:latin typeface="Cambria Math" panose="02040503050406030204" pitchFamily="18" charset="0"/>
+                            </a:rPr>
+                            <m:t>𝑒</m:t>
+                          </m:r>
+                        </m:sub>
+                      </m:sSub>
+                    </m:oMath>
+                  </m:oMathPara>
+                </a14:m>
+                <a:endParaRPr lang="en-US" dirty="0"/>
+              </a:p>
+            </p:txBody>
+          </p:sp>
+        </mc:Choice>
+        <mc:Fallback>
+          <p:sp>
+            <p:nvSpPr>
+              <p:cNvPr id="53" name="TextBox 52">
+                <a:extLst>
+                  <a:ext uri="{FF2B5EF4-FFF2-40B4-BE49-F238E27FC236}">
+                    <a16:creationId xmlns:a16="http://schemas.microsoft.com/office/drawing/2014/main" id="{74D1F2DF-7F85-B740-AF75-F317483E0ED1}"/>
+                  </a:ext>
+                </a:extLst>
+              </p:cNvPr>
+              <p:cNvSpPr txBox="1">
+                <a:spLocks noRot="1" noChangeAspect="1" noMove="1" noResize="1" noEditPoints="1" noAdjustHandles="1" noChangeArrowheads="1" noChangeShapeType="1" noTextEdit="1"/>
+              </p:cNvSpPr>
+              <p:nvPr/>
+            </p:nvSpPr>
+            <p:spPr>
+              <a:xfrm>
+                <a:off x="8174632" y="1565695"/>
+                <a:ext cx="466986" cy="369332"/>
+              </a:xfrm>
+              <a:prstGeom prst="rect">
+                <a:avLst/>
+              </a:prstGeom>
+              <a:blipFill>
+                <a:blip r:embed="rId5"/>
+                <a:stretch>
+                  <a:fillRect/>
+                </a:stretch>
+              </a:blipFill>
+            </p:spPr>
+            <p:txBody>
+              <a:bodyPr/>
+              <a:lstStyle/>
+              <a:p>
+                <a:r>
+                  <a:rPr lang="en-US">
+                    <a:noFill/>
+                  </a:rPr>
+                  <a:t> </a:t>
+                </a:r>
+              </a:p>
+            </p:txBody>
+          </p:sp>
+        </mc:Fallback>
+      </mc:AlternateContent>
+    </p:spTree>
+    <p:extLst>
+      <p:ext uri="{BB962C8B-B14F-4D97-AF65-F5344CB8AC3E}">
+        <p14:creationId xmlns:p14="http://schemas.microsoft.com/office/powerpoint/2010/main" val="3462539595"/>
+      </p:ext>
+    </p:extLst>
+  </p:cSld>
+  <p:clrMapOvr>
+    <a:masterClrMapping/>
+  </p:clrMapOvr>
+</p:sld>
+</file>
+
+<file path=ppt/slides/slide7.xml><?xml version="1.0" encoding="utf-8"?>
+<p:sld xmlns:a="http://schemas.openxmlformats.org/drawingml/2006/main" xmlns:r="http://schemas.openxmlformats.org/officeDocument/2006/relationships" xmlns:p="http://schemas.openxmlformats.org/presentationml/2006/main">
+  <p:cSld>
+    <p:spTree>
+      <p:nvGrpSpPr>
+        <p:cNvPr id="1" name=""/>
+        <p:cNvGrpSpPr/>
+        <p:nvPr/>
+      </p:nvGrpSpPr>
+      <p:grpSpPr>
+        <a:xfrm>
+          <a:off x="0" y="0"/>
+          <a:ext cx="0" cy="0"/>
+          <a:chOff x="0" y="0"/>
+          <a:chExt cx="0" cy="0"/>
+        </a:xfrm>
+      </p:grpSpPr>
+      <p:sp>
+        <p:nvSpPr>
+          <p:cNvPr id="2" name="Rectangle 1">
+            <a:extLst>
+              <a:ext uri="{FF2B5EF4-FFF2-40B4-BE49-F238E27FC236}">
+                <a16:creationId xmlns:a16="http://schemas.microsoft.com/office/drawing/2014/main" id="{67D53CA7-C2B3-E845-B5C7-0EACC5B33975}"/>
+              </a:ext>
+            </a:extLst>
+          </p:cNvPr>
+          <p:cNvSpPr/>
+          <p:nvPr/>
+        </p:nvSpPr>
+        <p:spPr>
+          <a:xfrm>
+            <a:off x="987103" y="3429000"/>
+            <a:ext cx="1712259" cy="896470"/>
+          </a:xfrm>
+          <a:prstGeom prst="rect">
+            <a:avLst/>
+          </a:prstGeom>
+          <a:solidFill>
+            <a:schemeClr val="accent5">
+              <a:lumMod val="40000"/>
+              <a:lumOff val="60000"/>
+            </a:schemeClr>
+          </a:solidFill>
+          <a:ln>
+            <a:solidFill>
+              <a:schemeClr val="accent5">
+                <a:lumMod val="40000"/>
+                <a:lumOff val="60000"/>
+              </a:schemeClr>
+            </a:solidFill>
+          </a:ln>
+        </p:spPr>
+        <p:style>
+          <a:lnRef idx="2">
+            <a:schemeClr val="accent1">
+              <a:shade val="50000"/>
+            </a:schemeClr>
+          </a:lnRef>
+          <a:fillRef idx="1">
+            <a:schemeClr val="accent1"/>
+          </a:fillRef>
+          <a:effectRef idx="0">
+            <a:schemeClr val="accent1"/>
+          </a:effectRef>
+          <a:fontRef idx="minor">
+            <a:schemeClr val="lt1"/>
+          </a:fontRef>
+        </p:style>
+        <p:txBody>
+          <a:bodyPr rtlCol="0" anchor="ctr"/>
+          <a:lstStyle/>
+          <a:p>
+            <a:pPr algn="ctr"/>
+            <a:endParaRPr lang="en-US"/>
+          </a:p>
+        </p:txBody>
+      </p:sp>
+      <p:cxnSp>
+        <p:nvCxnSpPr>
+          <p:cNvPr id="7" name="Straight Arrow Connector 6">
+            <a:extLst>
+              <a:ext uri="{FF2B5EF4-FFF2-40B4-BE49-F238E27FC236}">
+                <a16:creationId xmlns:a16="http://schemas.microsoft.com/office/drawing/2014/main" id="{00105F6A-D1D5-014C-A435-33BE57589744}"/>
+              </a:ext>
+            </a:extLst>
+          </p:cNvPr>
+          <p:cNvCxnSpPr/>
+          <p:nvPr/>
+        </p:nvCxnSpPr>
+        <p:spPr>
+          <a:xfrm>
+            <a:off x="762985" y="3429000"/>
+            <a:ext cx="0" cy="896470"/>
+          </a:xfrm>
+          <a:prstGeom prst="straightConnector1">
+            <a:avLst/>
+          </a:prstGeom>
+          <a:ln>
+            <a:headEnd type="triangle"/>
+            <a:tailEnd type="triangle"/>
+          </a:ln>
+        </p:spPr>
+        <p:style>
+          <a:lnRef idx="1">
+            <a:schemeClr val="accent1"/>
+          </a:lnRef>
+          <a:fillRef idx="0">
+            <a:schemeClr val="accent1"/>
+          </a:fillRef>
+          <a:effectRef idx="0">
+            <a:schemeClr val="accent1"/>
+          </a:effectRef>
+          <a:fontRef idx="minor">
+            <a:schemeClr val="tx1"/>
+          </a:fontRef>
+        </p:style>
+      </p:cxnSp>
+      <p:sp>
+        <p:nvSpPr>
+          <p:cNvPr id="8" name="TextBox 7">
+            <a:extLst>
+              <a:ext uri="{FF2B5EF4-FFF2-40B4-BE49-F238E27FC236}">
+                <a16:creationId xmlns:a16="http://schemas.microsoft.com/office/drawing/2014/main" id="{8D99E211-2C2E-1544-AAF7-FABF1A96CB40}"/>
+              </a:ext>
+            </a:extLst>
+          </p:cNvPr>
+          <p:cNvSpPr txBox="1"/>
+          <p:nvPr/>
+        </p:nvSpPr>
+        <p:spPr>
+          <a:xfrm>
+            <a:off x="381149" y="3692569"/>
+            <a:ext cx="381836" cy="369332"/>
+          </a:xfrm>
+          <a:prstGeom prst="rect">
+            <a:avLst/>
+          </a:prstGeom>
+          <a:noFill/>
+        </p:spPr>
+        <p:txBody>
+          <a:bodyPr wrap="none" rtlCol="0">
+            <a:spAutoFit/>
+          </a:bodyPr>
+          <a:lstStyle/>
+          <a:p>
+            <a:r>
+              <a:rPr lang="en-US" dirty="0"/>
+              <a:t>M</a:t>
+            </a:r>
+          </a:p>
+        </p:txBody>
+      </p:sp>
+      <p:cxnSp>
+        <p:nvCxnSpPr>
+          <p:cNvPr id="10" name="Straight Arrow Connector 9">
+            <a:extLst>
+              <a:ext uri="{FF2B5EF4-FFF2-40B4-BE49-F238E27FC236}">
+                <a16:creationId xmlns:a16="http://schemas.microsoft.com/office/drawing/2014/main" id="{D916499F-4B77-3045-BD56-31BD4896A1F0}"/>
+              </a:ext>
+            </a:extLst>
+          </p:cNvPr>
+          <p:cNvCxnSpPr/>
+          <p:nvPr/>
+        </p:nvCxnSpPr>
+        <p:spPr>
+          <a:xfrm>
+            <a:off x="987103" y="3186953"/>
+            <a:ext cx="1712259" cy="0"/>
+          </a:xfrm>
+          <a:prstGeom prst="straightConnector1">
+            <a:avLst/>
+          </a:prstGeom>
+          <a:ln>
+            <a:headEnd type="triangle"/>
+            <a:tailEnd type="triangle"/>
+          </a:ln>
+        </p:spPr>
+        <p:style>
+          <a:lnRef idx="1">
+            <a:schemeClr val="accent1"/>
+          </a:lnRef>
+          <a:fillRef idx="0">
+            <a:schemeClr val="accent1"/>
+          </a:fillRef>
+          <a:effectRef idx="0">
+            <a:schemeClr val="accent1"/>
+          </a:effectRef>
+          <a:fontRef idx="minor">
+            <a:schemeClr val="tx1"/>
+          </a:fontRef>
+        </p:style>
+      </p:cxnSp>
+      <p:sp>
+        <p:nvSpPr>
+          <p:cNvPr id="11" name="TextBox 10">
+            <a:extLst>
+              <a:ext uri="{FF2B5EF4-FFF2-40B4-BE49-F238E27FC236}">
+                <a16:creationId xmlns:a16="http://schemas.microsoft.com/office/drawing/2014/main" id="{CA42D462-FBBA-4D4F-A79F-A0931217367D}"/>
+              </a:ext>
+            </a:extLst>
+          </p:cNvPr>
+          <p:cNvSpPr txBox="1"/>
+          <p:nvPr/>
+        </p:nvSpPr>
+        <p:spPr>
+          <a:xfrm>
+            <a:off x="1702007" y="2825697"/>
+            <a:ext cx="282450" cy="369332"/>
+          </a:xfrm>
+          <a:prstGeom prst="rect">
+            <a:avLst/>
+          </a:prstGeom>
+          <a:noFill/>
+        </p:spPr>
+        <p:txBody>
+          <a:bodyPr wrap="none" rtlCol="0">
+            <a:spAutoFit/>
+          </a:bodyPr>
+          <a:lstStyle/>
+          <a:p>
+            <a:r>
+              <a:rPr lang="en-US" dirty="0"/>
+              <a:t>L</a:t>
+            </a:r>
+          </a:p>
+        </p:txBody>
+      </p:sp>
+      <p:sp>
+        <p:nvSpPr>
+          <p:cNvPr id="25" name="Rectangle 24">
+            <a:extLst>
+              <a:ext uri="{FF2B5EF4-FFF2-40B4-BE49-F238E27FC236}">
+                <a16:creationId xmlns:a16="http://schemas.microsoft.com/office/drawing/2014/main" id="{2BB5EE3F-EA8C-3541-B76E-3600EB2B05A4}"/>
+              </a:ext>
+            </a:extLst>
+          </p:cNvPr>
+          <p:cNvSpPr/>
+          <p:nvPr/>
+        </p:nvSpPr>
+        <p:spPr>
+          <a:xfrm>
+            <a:off x="3623595" y="2326342"/>
+            <a:ext cx="204334" cy="896470"/>
+          </a:xfrm>
+          <a:prstGeom prst="rect">
+            <a:avLst/>
+          </a:prstGeom>
+          <a:solidFill>
+            <a:schemeClr val="accent4">
+              <a:lumMod val="40000"/>
+              <a:lumOff val="60000"/>
+            </a:schemeClr>
+          </a:solidFill>
+          <a:ln>
+            <a:solidFill>
+              <a:schemeClr val="accent4">
+                <a:lumMod val="60000"/>
+                <a:lumOff val="40000"/>
+              </a:schemeClr>
+            </a:solidFill>
+          </a:ln>
+        </p:spPr>
+        <p:style>
+          <a:lnRef idx="2">
+            <a:schemeClr val="accent1">
+              <a:shade val="50000"/>
+            </a:schemeClr>
+          </a:lnRef>
+          <a:fillRef idx="1">
+            <a:schemeClr val="accent1"/>
+          </a:fillRef>
+          <a:effectRef idx="0">
+            <a:schemeClr val="accent1"/>
+          </a:effectRef>
+          <a:fontRef idx="minor">
+            <a:schemeClr val="lt1"/>
+          </a:fontRef>
+        </p:style>
+        <p:txBody>
+          <a:bodyPr rtlCol="0" anchor="ctr"/>
+          <a:lstStyle/>
+          <a:p>
+            <a:pPr algn="ctr"/>
+            <a:endParaRPr lang="en-US"/>
+          </a:p>
+        </p:txBody>
+      </p:sp>
+      <p:sp>
+        <p:nvSpPr>
+          <p:cNvPr id="26" name="Rectangle 25">
+            <a:extLst>
+              <a:ext uri="{FF2B5EF4-FFF2-40B4-BE49-F238E27FC236}">
+                <a16:creationId xmlns:a16="http://schemas.microsoft.com/office/drawing/2014/main" id="{D4F72141-3AA6-CE45-B685-206446D01A83}"/>
+              </a:ext>
+            </a:extLst>
+          </p:cNvPr>
+          <p:cNvSpPr/>
+          <p:nvPr/>
+        </p:nvSpPr>
+        <p:spPr>
+          <a:xfrm>
+            <a:off x="3623595" y="3375208"/>
+            <a:ext cx="204334" cy="896470"/>
+          </a:xfrm>
+          <a:prstGeom prst="rect">
+            <a:avLst/>
+          </a:prstGeom>
+          <a:solidFill>
+            <a:schemeClr val="accent6">
+              <a:lumMod val="40000"/>
+              <a:lumOff val="60000"/>
+            </a:schemeClr>
+          </a:solidFill>
+          <a:ln>
+            <a:solidFill>
+              <a:schemeClr val="accent6">
+                <a:lumMod val="60000"/>
+                <a:lumOff val="40000"/>
+              </a:schemeClr>
+            </a:solidFill>
+          </a:ln>
+        </p:spPr>
+        <p:style>
+          <a:lnRef idx="2">
+            <a:schemeClr val="accent1">
+              <a:shade val="50000"/>
+            </a:schemeClr>
+          </a:lnRef>
+          <a:fillRef idx="1">
+            <a:schemeClr val="accent1"/>
+          </a:fillRef>
+          <a:effectRef idx="0">
+            <a:schemeClr val="accent1"/>
+          </a:effectRef>
+          <a:fontRef idx="minor">
+            <a:schemeClr val="lt1"/>
+          </a:fontRef>
+        </p:style>
+        <p:txBody>
+          <a:bodyPr rtlCol="0" anchor="ctr"/>
+          <a:lstStyle/>
+          <a:p>
+            <a:pPr algn="ctr"/>
+            <a:endParaRPr lang="en-US"/>
+          </a:p>
+        </p:txBody>
+      </p:sp>
+      <p:sp>
+        <p:nvSpPr>
+          <p:cNvPr id="27" name="Rectangle 26">
+            <a:extLst>
+              <a:ext uri="{FF2B5EF4-FFF2-40B4-BE49-F238E27FC236}">
+                <a16:creationId xmlns:a16="http://schemas.microsoft.com/office/drawing/2014/main" id="{E7B57AF6-21C8-4645-9F40-86F1464F73B1}"/>
+              </a:ext>
+            </a:extLst>
+          </p:cNvPr>
+          <p:cNvSpPr/>
+          <p:nvPr/>
+        </p:nvSpPr>
+        <p:spPr>
+          <a:xfrm>
+            <a:off x="3623595" y="4424074"/>
+            <a:ext cx="204334" cy="896470"/>
+          </a:xfrm>
+          <a:prstGeom prst="rect">
+            <a:avLst/>
+          </a:prstGeom>
+          <a:solidFill>
+            <a:schemeClr val="accent2">
+              <a:lumMod val="40000"/>
+              <a:lumOff val="60000"/>
+            </a:schemeClr>
+          </a:solidFill>
+          <a:ln>
+            <a:solidFill>
+              <a:schemeClr val="accent2">
+                <a:lumMod val="60000"/>
+                <a:lumOff val="40000"/>
+              </a:schemeClr>
+            </a:solidFill>
+          </a:ln>
+        </p:spPr>
+        <p:style>
+          <a:lnRef idx="2">
+            <a:schemeClr val="accent1">
+              <a:shade val="50000"/>
+            </a:schemeClr>
+          </a:lnRef>
+          <a:fillRef idx="1">
+            <a:schemeClr val="accent1"/>
+          </a:fillRef>
+          <a:effectRef idx="0">
+            <a:schemeClr val="accent1"/>
+          </a:effectRef>
+          <a:fontRef idx="minor">
+            <a:schemeClr val="lt1"/>
+          </a:fontRef>
+        </p:style>
+        <p:txBody>
+          <a:bodyPr rtlCol="0" anchor="ctr"/>
+          <a:lstStyle/>
+          <a:p>
+            <a:pPr algn="ctr"/>
+            <a:endParaRPr lang="en-US"/>
+          </a:p>
+        </p:txBody>
+      </p:sp>
+      <p:cxnSp>
+        <p:nvCxnSpPr>
+          <p:cNvPr id="28" name="Straight Arrow Connector 27">
+            <a:extLst>
+              <a:ext uri="{FF2B5EF4-FFF2-40B4-BE49-F238E27FC236}">
+                <a16:creationId xmlns:a16="http://schemas.microsoft.com/office/drawing/2014/main" id="{E0B56DD5-0D60-5C49-971D-747252ABBCC6}"/>
+              </a:ext>
+            </a:extLst>
+          </p:cNvPr>
+          <p:cNvCxnSpPr>
+            <a:cxnSpLocks/>
+          </p:cNvCxnSpPr>
+          <p:nvPr/>
+        </p:nvCxnSpPr>
+        <p:spPr>
+          <a:xfrm>
+            <a:off x="3471195" y="2326342"/>
+            <a:ext cx="0" cy="896470"/>
+          </a:xfrm>
+          <a:prstGeom prst="straightConnector1">
+            <a:avLst/>
+          </a:prstGeom>
+          <a:ln>
+            <a:headEnd type="triangle"/>
+            <a:tailEnd type="triangle"/>
+          </a:ln>
+        </p:spPr>
+        <p:style>
+          <a:lnRef idx="1">
+            <a:schemeClr val="accent1"/>
+          </a:lnRef>
+          <a:fillRef idx="0">
+            <a:schemeClr val="accent1"/>
+          </a:fillRef>
+          <a:effectRef idx="0">
+            <a:schemeClr val="accent1"/>
+          </a:effectRef>
+          <a:fontRef idx="minor">
+            <a:schemeClr val="tx1"/>
+          </a:fontRef>
+        </p:style>
+      </p:cxnSp>
+      <mc:AlternateContent xmlns:mc="http://schemas.openxmlformats.org/markup-compatibility/2006">
+        <mc:Choice xmlns:a14="http://schemas.microsoft.com/office/drawing/2010/main" Requires="a14">
+          <p:sp>
+            <p:nvSpPr>
+              <p:cNvPr id="29" name="TextBox 28">
+                <a:extLst>
+                  <a:ext uri="{FF2B5EF4-FFF2-40B4-BE49-F238E27FC236}">
+                    <a16:creationId xmlns:a16="http://schemas.microsoft.com/office/drawing/2014/main" id="{AF8F7ECC-C9C7-E94C-9128-6C3FC01D89D4}"/>
+                  </a:ext>
+                </a:extLst>
+              </p:cNvPr>
+              <p:cNvSpPr txBox="1"/>
+              <p:nvPr/>
+            </p:nvSpPr>
+            <p:spPr>
+              <a:xfrm rot="16200000">
+                <a:off x="2747519" y="2616802"/>
+                <a:ext cx="1031373" cy="369332"/>
+              </a:xfrm>
+              <a:prstGeom prst="rect">
+                <a:avLst/>
+              </a:prstGeom>
+              <a:noFill/>
+            </p:spPr>
+            <p:txBody>
+              <a:bodyPr wrap="none" rtlCol="0">
+                <a:spAutoFit/>
+              </a:bodyPr>
+              <a:lstStyle/>
+              <a:p>
+                <a14:m>
+                  <m:oMathPara xmlns:m="http://schemas.openxmlformats.org/officeDocument/2006/math">
+                    <m:oMathParaPr>
+                      <m:jc m:val="centerGroup"/>
+                    </m:oMathParaPr>
+                    <m:oMath xmlns:m="http://schemas.openxmlformats.org/officeDocument/2006/math">
+                      <m:sSub>
+                        <m:sSubPr>
+                          <m:ctrlPr>
+                            <a:rPr lang="en-US" i="1" smtClean="0">
+                              <a:latin typeface="Cambria Math" panose="02040503050406030204" pitchFamily="18" charset="0"/>
+                            </a:rPr>
+                          </m:ctrlPr>
+                        </m:sSubPr>
+                        <m:e>
+                          <m:r>
+                            <a:rPr lang="es-ES" b="0" i="1" smtClean="0">
+                              <a:latin typeface="Cambria Math" panose="02040503050406030204" pitchFamily="18" charset="0"/>
+                            </a:rPr>
+                            <m:t>𝑀</m:t>
+                          </m:r>
+                        </m:e>
+                        <m:sub>
+                          <m:r>
+                            <a:rPr lang="es-ES" b="0" i="1" smtClean="0">
+                              <a:latin typeface="Cambria Math" panose="02040503050406030204" pitchFamily="18" charset="0"/>
+                            </a:rPr>
+                            <m:t>𝑒</m:t>
+                          </m:r>
+                        </m:sub>
+                      </m:sSub>
+                      <m:r>
+                        <a:rPr lang="es-ES" b="0" i="1" smtClean="0">
+                          <a:latin typeface="Cambria Math" panose="02040503050406030204" pitchFamily="18" charset="0"/>
+                        </a:rPr>
+                        <m:t>=</m:t>
+                      </m:r>
+                      <m:r>
+                        <a:rPr lang="es-ES" b="0" i="1" smtClean="0">
+                          <a:latin typeface="Cambria Math" panose="02040503050406030204" pitchFamily="18" charset="0"/>
+                        </a:rPr>
+                        <m:t>𝑀</m:t>
+                      </m:r>
+                    </m:oMath>
+                  </m:oMathPara>
+                </a14:m>
+                <a:endParaRPr lang="en-US" dirty="0"/>
+              </a:p>
+            </p:txBody>
+          </p:sp>
+        </mc:Choice>
+        <mc:Fallback>
+          <p:sp>
+            <p:nvSpPr>
+              <p:cNvPr id="29" name="TextBox 28">
+                <a:extLst>
+                  <a:ext uri="{FF2B5EF4-FFF2-40B4-BE49-F238E27FC236}">
+                    <a16:creationId xmlns:a16="http://schemas.microsoft.com/office/drawing/2014/main" id="{AF8F7ECC-C9C7-E94C-9128-6C3FC01D89D4}"/>
+                  </a:ext>
+                </a:extLst>
+              </p:cNvPr>
+              <p:cNvSpPr txBox="1">
+                <a:spLocks noRot="1" noChangeAspect="1" noMove="1" noResize="1" noEditPoints="1" noAdjustHandles="1" noChangeArrowheads="1" noChangeShapeType="1" noTextEdit="1"/>
+              </p:cNvSpPr>
+              <p:nvPr/>
+            </p:nvSpPr>
+            <p:spPr>
+              <a:xfrm rot="16200000">
+                <a:off x="2747519" y="2616802"/>
+                <a:ext cx="1031373" cy="369332"/>
+              </a:xfrm>
+              <a:prstGeom prst="rect">
+                <a:avLst/>
+              </a:prstGeom>
+              <a:blipFill>
+                <a:blip r:embed="rId2"/>
+                <a:stretch>
+                  <a:fillRect/>
+                </a:stretch>
+              </a:blipFill>
+            </p:spPr>
+            <p:txBody>
+              <a:bodyPr/>
+              <a:lstStyle/>
+              <a:p>
+                <a:r>
+                  <a:rPr lang="en-US">
+                    <a:noFill/>
+                  </a:rPr>
+                  <a:t> </a:t>
+                </a:r>
+              </a:p>
+            </p:txBody>
+          </p:sp>
+        </mc:Fallback>
+      </mc:AlternateContent>
+      <p:cxnSp>
+        <p:nvCxnSpPr>
+          <p:cNvPr id="30" name="Straight Arrow Connector 29">
+            <a:extLst>
+              <a:ext uri="{FF2B5EF4-FFF2-40B4-BE49-F238E27FC236}">
+                <a16:creationId xmlns:a16="http://schemas.microsoft.com/office/drawing/2014/main" id="{A95999B9-B2B3-5941-8C6D-0A3C4043E943}"/>
+              </a:ext>
+            </a:extLst>
+          </p:cNvPr>
+          <p:cNvCxnSpPr>
+            <a:cxnSpLocks/>
+          </p:cNvCxnSpPr>
+          <p:nvPr/>
+        </p:nvCxnSpPr>
+        <p:spPr>
+          <a:xfrm>
+            <a:off x="3623594" y="2191871"/>
+            <a:ext cx="1712259" cy="0"/>
+          </a:xfrm>
+          <a:prstGeom prst="straightConnector1">
+            <a:avLst/>
+          </a:prstGeom>
+          <a:ln>
+            <a:headEnd type="triangle"/>
+            <a:tailEnd type="triangle"/>
+          </a:ln>
+        </p:spPr>
+        <p:style>
+          <a:lnRef idx="1">
+            <a:schemeClr val="accent1"/>
+          </a:lnRef>
+          <a:fillRef idx="0">
+            <a:schemeClr val="accent1"/>
+          </a:fillRef>
+          <a:effectRef idx="0">
+            <a:schemeClr val="accent1"/>
+          </a:effectRef>
+          <a:fontRef idx="minor">
+            <a:schemeClr val="tx1"/>
+          </a:fontRef>
+        </p:style>
+      </p:cxnSp>
+      <mc:AlternateContent xmlns:mc="http://schemas.openxmlformats.org/markup-compatibility/2006">
+        <mc:Choice xmlns:a14="http://schemas.microsoft.com/office/drawing/2010/main" Requires="a14">
+          <p:sp>
+            <p:nvSpPr>
+              <p:cNvPr id="31" name="TextBox 30">
+                <a:extLst>
+                  <a:ext uri="{FF2B5EF4-FFF2-40B4-BE49-F238E27FC236}">
+                    <a16:creationId xmlns:a16="http://schemas.microsoft.com/office/drawing/2014/main" id="{E92A7F68-EFC7-4948-BC3E-5DF6B001AF66}"/>
+                  </a:ext>
+                </a:extLst>
+              </p:cNvPr>
+              <p:cNvSpPr txBox="1"/>
+              <p:nvPr/>
+            </p:nvSpPr>
+            <p:spPr>
+              <a:xfrm>
+                <a:off x="4246230" y="1822539"/>
+                <a:ext cx="896592" cy="369332"/>
+              </a:xfrm>
+              <a:prstGeom prst="rect">
+                <a:avLst/>
+              </a:prstGeom>
+              <a:noFill/>
+            </p:spPr>
+            <p:txBody>
+              <a:bodyPr wrap="none" rtlCol="0">
+                <a:spAutoFit/>
+              </a:bodyPr>
+              <a:lstStyle/>
+              <a:p>
+                <a14:m>
+                  <m:oMathPara xmlns:m="http://schemas.openxmlformats.org/officeDocument/2006/math">
+                    <m:oMathParaPr>
+                      <m:jc m:val="centerGroup"/>
+                    </m:oMathParaPr>
+                    <m:oMath xmlns:m="http://schemas.openxmlformats.org/officeDocument/2006/math">
+                      <m:sSub>
+                        <m:sSubPr>
+                          <m:ctrlPr>
+                            <a:rPr lang="en-US" i="1" smtClean="0">
+                              <a:latin typeface="Cambria Math" panose="02040503050406030204" pitchFamily="18" charset="0"/>
+                            </a:rPr>
+                          </m:ctrlPr>
+                        </m:sSubPr>
+                        <m:e>
+                          <m:r>
+                            <a:rPr lang="es-ES" b="0" i="1" smtClean="0">
+                              <a:latin typeface="Cambria Math" panose="02040503050406030204" pitchFamily="18" charset="0"/>
+                            </a:rPr>
+                            <m:t>𝐿</m:t>
+                          </m:r>
+                        </m:e>
+                        <m:sub>
+                          <m:r>
+                            <a:rPr lang="es-ES" b="0" i="1" smtClean="0">
+                              <a:latin typeface="Cambria Math" panose="02040503050406030204" pitchFamily="18" charset="0"/>
+                            </a:rPr>
+                            <m:t>𝑒</m:t>
+                          </m:r>
+                        </m:sub>
+                      </m:sSub>
+                      <m:r>
+                        <a:rPr lang="es-ES" b="0" i="1" smtClean="0">
+                          <a:latin typeface="Cambria Math" panose="02040503050406030204" pitchFamily="18" charset="0"/>
+                        </a:rPr>
+                        <m:t>=1</m:t>
+                      </m:r>
+                    </m:oMath>
+                  </m:oMathPara>
+                </a14:m>
+                <a:endParaRPr lang="en-US" dirty="0"/>
+              </a:p>
+            </p:txBody>
+          </p:sp>
+        </mc:Choice>
+        <mc:Fallback>
+          <p:sp>
+            <p:nvSpPr>
+              <p:cNvPr id="31" name="TextBox 30">
+                <a:extLst>
+                  <a:ext uri="{FF2B5EF4-FFF2-40B4-BE49-F238E27FC236}">
+                    <a16:creationId xmlns:a16="http://schemas.microsoft.com/office/drawing/2014/main" id="{E92A7F68-EFC7-4948-BC3E-5DF6B001AF66}"/>
+                  </a:ext>
+                </a:extLst>
+              </p:cNvPr>
+              <p:cNvSpPr txBox="1">
+                <a:spLocks noRot="1" noChangeAspect="1" noMove="1" noResize="1" noEditPoints="1" noAdjustHandles="1" noChangeArrowheads="1" noChangeShapeType="1" noTextEdit="1"/>
+              </p:cNvSpPr>
+              <p:nvPr/>
+            </p:nvSpPr>
+            <p:spPr>
+              <a:xfrm>
+                <a:off x="4246230" y="1822539"/>
+                <a:ext cx="896592" cy="369332"/>
+              </a:xfrm>
+              <a:prstGeom prst="rect">
+                <a:avLst/>
+              </a:prstGeom>
+              <a:blipFill>
+                <a:blip r:embed="rId3"/>
+                <a:stretch>
+                  <a:fillRect/>
+                </a:stretch>
+              </a:blipFill>
+            </p:spPr>
+            <p:txBody>
+              <a:bodyPr/>
+              <a:lstStyle/>
+              <a:p>
+                <a:r>
+                  <a:rPr lang="en-US">
+                    <a:noFill/>
+                  </a:rPr>
+                  <a:t> </a:t>
+                </a:r>
+              </a:p>
+            </p:txBody>
+          </p:sp>
+        </mc:Fallback>
+      </mc:AlternateContent>
+      <p:sp>
+        <p:nvSpPr>
+          <p:cNvPr id="34" name="TextBox 33">
+            <a:extLst>
+              <a:ext uri="{FF2B5EF4-FFF2-40B4-BE49-F238E27FC236}">
+                <a16:creationId xmlns:a16="http://schemas.microsoft.com/office/drawing/2014/main" id="{229DAEDE-52D3-B541-B84F-6ECBE6090A13}"/>
+              </a:ext>
+            </a:extLst>
+          </p:cNvPr>
+          <p:cNvSpPr txBox="1"/>
+          <p:nvPr/>
+        </p:nvSpPr>
+        <p:spPr>
+          <a:xfrm>
+            <a:off x="3334870" y="1488138"/>
+            <a:ext cx="1315745" cy="369332"/>
+          </a:xfrm>
+          <a:prstGeom prst="rect">
+            <a:avLst/>
+          </a:prstGeom>
+          <a:noFill/>
+        </p:spPr>
+        <p:txBody>
+          <a:bodyPr wrap="none" rtlCol="0">
+            <a:spAutoFit/>
+          </a:bodyPr>
+          <a:lstStyle/>
+          <a:p>
+            <a:r>
+              <a:rPr lang="en-US" dirty="0"/>
+              <a:t>C: Recursive</a:t>
+            </a:r>
+          </a:p>
+        </p:txBody>
+      </p:sp>
+      <p:cxnSp>
+        <p:nvCxnSpPr>
+          <p:cNvPr id="4" name="Curved Connector 3">
+            <a:extLst>
+              <a:ext uri="{FF2B5EF4-FFF2-40B4-BE49-F238E27FC236}">
+                <a16:creationId xmlns:a16="http://schemas.microsoft.com/office/drawing/2014/main" id="{DF7AFB3C-52F5-2A49-9556-484387207DA4}"/>
+              </a:ext>
+            </a:extLst>
+          </p:cNvPr>
+          <p:cNvCxnSpPr>
+            <a:cxnSpLocks/>
+            <a:stCxn id="25" idx="0"/>
+            <a:endCxn id="25" idx="3"/>
+          </p:cNvCxnSpPr>
+          <p:nvPr/>
+        </p:nvCxnSpPr>
+        <p:spPr>
+          <a:xfrm rot="16200000" flipH="1">
+            <a:off x="3552727" y="2499376"/>
+            <a:ext cx="448235" cy="102167"/>
+          </a:xfrm>
+          <a:prstGeom prst="curvedConnector4">
+            <a:avLst>
+              <a:gd name="adj1" fmla="val -19000"/>
+              <a:gd name="adj2" fmla="val 367625"/>
+            </a:avLst>
+          </a:prstGeom>
+          <a:ln>
+            <a:solidFill>
+              <a:schemeClr val="accent4">
+                <a:lumMod val="40000"/>
+                <a:lumOff val="60000"/>
+              </a:schemeClr>
+            </a:solidFill>
+            <a:prstDash val="dash"/>
+            <a:tailEnd type="triangle"/>
+          </a:ln>
+        </p:spPr>
+        <p:style>
+          <a:lnRef idx="1">
+            <a:schemeClr val="accent1"/>
+          </a:lnRef>
+          <a:fillRef idx="0">
+            <a:schemeClr val="accent1"/>
+          </a:fillRef>
+          <a:effectRef idx="0">
+            <a:schemeClr val="accent1"/>
+          </a:effectRef>
+          <a:fontRef idx="minor">
+            <a:schemeClr val="tx1"/>
+          </a:fontRef>
+        </p:style>
+      </p:cxnSp>
+      <p:cxnSp>
+        <p:nvCxnSpPr>
+          <p:cNvPr id="32" name="Curved Connector 31">
+            <a:extLst>
+              <a:ext uri="{FF2B5EF4-FFF2-40B4-BE49-F238E27FC236}">
+                <a16:creationId xmlns:a16="http://schemas.microsoft.com/office/drawing/2014/main" id="{A8D8771C-9631-2240-A69F-02BC406836DE}"/>
+              </a:ext>
+            </a:extLst>
+          </p:cNvPr>
+          <p:cNvCxnSpPr>
+            <a:cxnSpLocks/>
+            <a:stCxn id="26" idx="0"/>
+            <a:endCxn id="26" idx="3"/>
+          </p:cNvCxnSpPr>
+          <p:nvPr/>
+        </p:nvCxnSpPr>
+        <p:spPr>
+          <a:xfrm rot="16200000" flipH="1">
+            <a:off x="3552727" y="3548242"/>
+            <a:ext cx="448235" cy="102167"/>
+          </a:xfrm>
+          <a:prstGeom prst="curvedConnector4">
+            <a:avLst>
+              <a:gd name="adj1" fmla="val -23000"/>
+              <a:gd name="adj2" fmla="val 323751"/>
+            </a:avLst>
+          </a:prstGeom>
+          <a:ln>
+            <a:solidFill>
+              <a:schemeClr val="accent6">
+                <a:lumMod val="40000"/>
+                <a:lumOff val="60000"/>
+              </a:schemeClr>
+            </a:solidFill>
+            <a:prstDash val="dash"/>
+            <a:tailEnd type="triangle"/>
+          </a:ln>
+        </p:spPr>
+        <p:style>
+          <a:lnRef idx="1">
+            <a:schemeClr val="accent1"/>
+          </a:lnRef>
+          <a:fillRef idx="0">
+            <a:schemeClr val="accent1"/>
+          </a:fillRef>
+          <a:effectRef idx="0">
+            <a:schemeClr val="accent1"/>
+          </a:effectRef>
+          <a:fontRef idx="minor">
+            <a:schemeClr val="tx1"/>
+          </a:fontRef>
+        </p:style>
+      </p:cxnSp>
+      <p:cxnSp>
+        <p:nvCxnSpPr>
+          <p:cNvPr id="35" name="Curved Connector 34">
+            <a:extLst>
+              <a:ext uri="{FF2B5EF4-FFF2-40B4-BE49-F238E27FC236}">
+                <a16:creationId xmlns:a16="http://schemas.microsoft.com/office/drawing/2014/main" id="{AFCD3787-020B-C249-BA1E-B6A0253217E9}"/>
+              </a:ext>
+            </a:extLst>
+          </p:cNvPr>
+          <p:cNvCxnSpPr>
+            <a:cxnSpLocks/>
+            <a:stCxn id="27" idx="0"/>
+            <a:endCxn id="27" idx="3"/>
+          </p:cNvCxnSpPr>
+          <p:nvPr/>
+        </p:nvCxnSpPr>
+        <p:spPr>
+          <a:xfrm rot="16200000" flipH="1">
+            <a:off x="3552727" y="4597108"/>
+            <a:ext cx="448235" cy="102167"/>
+          </a:xfrm>
+          <a:prstGeom prst="curvedConnector4">
+            <a:avLst>
+              <a:gd name="adj1" fmla="val -23000"/>
+              <a:gd name="adj2" fmla="val 323751"/>
+            </a:avLst>
+          </a:prstGeom>
+          <a:ln>
+            <a:solidFill>
+              <a:schemeClr val="accent2">
+                <a:lumMod val="40000"/>
+                <a:lumOff val="60000"/>
+              </a:schemeClr>
+            </a:solidFill>
+            <a:prstDash val="dash"/>
+            <a:tailEnd type="triangle"/>
+          </a:ln>
+        </p:spPr>
+        <p:style>
+          <a:lnRef idx="1">
+            <a:schemeClr val="accent1"/>
+          </a:lnRef>
+          <a:fillRef idx="0">
+            <a:schemeClr val="accent1"/>
+          </a:fillRef>
+          <a:effectRef idx="0">
+            <a:schemeClr val="accent1"/>
+          </a:effectRef>
+          <a:fontRef idx="minor">
+            <a:schemeClr val="tx1"/>
+          </a:fontRef>
+        </p:style>
+      </p:cxnSp>
+      <p:sp>
+        <p:nvSpPr>
+          <p:cNvPr id="38" name="TextBox 37">
+            <a:extLst>
+              <a:ext uri="{FF2B5EF4-FFF2-40B4-BE49-F238E27FC236}">
+                <a16:creationId xmlns:a16="http://schemas.microsoft.com/office/drawing/2014/main" id="{7503CDFC-B7A4-CC40-9539-C85E29197D1A}"/>
+              </a:ext>
+            </a:extLst>
+          </p:cNvPr>
+          <p:cNvSpPr txBox="1"/>
+          <p:nvPr/>
+        </p:nvSpPr>
+        <p:spPr>
+          <a:xfrm>
+            <a:off x="5889812" y="1453207"/>
+            <a:ext cx="2654253" cy="369332"/>
+          </a:xfrm>
+          <a:prstGeom prst="rect">
+            <a:avLst/>
+          </a:prstGeom>
+          <a:noFill/>
+        </p:spPr>
+        <p:txBody>
+          <a:bodyPr wrap="none" rtlCol="0">
+            <a:spAutoFit/>
+          </a:bodyPr>
+          <a:lstStyle/>
+          <a:p>
+            <a:r>
+              <a:rPr lang="en-US" dirty="0"/>
+              <a:t>CA: Conditioned Recursive</a:t>
+            </a:r>
+          </a:p>
+        </p:txBody>
+      </p:sp>
+      <p:sp>
+        <p:nvSpPr>
+          <p:cNvPr id="40" name="Rectangle 39">
+            <a:extLst>
+              <a:ext uri="{FF2B5EF4-FFF2-40B4-BE49-F238E27FC236}">
+                <a16:creationId xmlns:a16="http://schemas.microsoft.com/office/drawing/2014/main" id="{0782BEB9-FE38-C84F-8E88-86E2DF1C897C}"/>
+              </a:ext>
+            </a:extLst>
+          </p:cNvPr>
+          <p:cNvSpPr/>
+          <p:nvPr/>
+        </p:nvSpPr>
+        <p:spPr>
+          <a:xfrm>
+            <a:off x="6279852" y="2451849"/>
+            <a:ext cx="204334" cy="694769"/>
+          </a:xfrm>
+          <a:prstGeom prst="rect">
+            <a:avLst/>
+          </a:prstGeom>
+          <a:solidFill>
+            <a:schemeClr val="accent4">
+              <a:lumMod val="40000"/>
+              <a:lumOff val="60000"/>
+            </a:schemeClr>
+          </a:solidFill>
+          <a:ln>
+            <a:solidFill>
+              <a:schemeClr val="accent4">
+                <a:lumMod val="60000"/>
+                <a:lumOff val="40000"/>
+              </a:schemeClr>
+            </a:solidFill>
+          </a:ln>
+        </p:spPr>
+        <p:style>
+          <a:lnRef idx="2">
+            <a:schemeClr val="accent1">
+              <a:shade val="50000"/>
+            </a:schemeClr>
+          </a:lnRef>
+          <a:fillRef idx="1">
+            <a:schemeClr val="accent1"/>
+          </a:fillRef>
+          <a:effectRef idx="0">
+            <a:schemeClr val="accent1"/>
+          </a:effectRef>
+          <a:fontRef idx="minor">
+            <a:schemeClr val="lt1"/>
+          </a:fontRef>
+        </p:style>
+        <p:txBody>
+          <a:bodyPr rtlCol="0" anchor="ctr"/>
+          <a:lstStyle/>
+          <a:p>
+            <a:pPr algn="ctr"/>
+            <a:endParaRPr lang="en-US"/>
+          </a:p>
+        </p:txBody>
+      </p:sp>
+      <p:sp>
+        <p:nvSpPr>
+          <p:cNvPr id="41" name="Rectangle 40">
+            <a:extLst>
+              <a:ext uri="{FF2B5EF4-FFF2-40B4-BE49-F238E27FC236}">
+                <a16:creationId xmlns:a16="http://schemas.microsoft.com/office/drawing/2014/main" id="{9D0DAEB6-4AFF-3C48-937B-69A797CA59B1}"/>
+              </a:ext>
+            </a:extLst>
+          </p:cNvPr>
+          <p:cNvSpPr/>
+          <p:nvPr/>
+        </p:nvSpPr>
+        <p:spPr>
+          <a:xfrm>
+            <a:off x="6279852" y="3500715"/>
+            <a:ext cx="204334" cy="694769"/>
+          </a:xfrm>
+          <a:prstGeom prst="rect">
+            <a:avLst/>
+          </a:prstGeom>
+          <a:solidFill>
+            <a:schemeClr val="accent6">
+              <a:lumMod val="40000"/>
+              <a:lumOff val="60000"/>
+            </a:schemeClr>
+          </a:solidFill>
+          <a:ln>
+            <a:solidFill>
+              <a:schemeClr val="accent6">
+                <a:lumMod val="60000"/>
+                <a:lumOff val="40000"/>
+              </a:schemeClr>
+            </a:solidFill>
+          </a:ln>
+        </p:spPr>
+        <p:style>
+          <a:lnRef idx="2">
+            <a:schemeClr val="accent1">
+              <a:shade val="50000"/>
+            </a:schemeClr>
+          </a:lnRef>
+          <a:fillRef idx="1">
+            <a:schemeClr val="accent1"/>
+          </a:fillRef>
+          <a:effectRef idx="0">
+            <a:schemeClr val="accent1"/>
+          </a:effectRef>
+          <a:fontRef idx="minor">
+            <a:schemeClr val="lt1"/>
+          </a:fontRef>
+        </p:style>
+        <p:txBody>
+          <a:bodyPr rtlCol="0" anchor="ctr"/>
+          <a:lstStyle/>
+          <a:p>
+            <a:pPr algn="ctr"/>
+            <a:endParaRPr lang="en-US"/>
+          </a:p>
+        </p:txBody>
+      </p:sp>
+      <p:sp>
+        <p:nvSpPr>
+          <p:cNvPr id="43" name="Rectangle 42">
+            <a:extLst>
+              <a:ext uri="{FF2B5EF4-FFF2-40B4-BE49-F238E27FC236}">
+                <a16:creationId xmlns:a16="http://schemas.microsoft.com/office/drawing/2014/main" id="{2324A838-B2E9-E04A-A937-F892782D0386}"/>
+              </a:ext>
+            </a:extLst>
+          </p:cNvPr>
+          <p:cNvSpPr/>
+          <p:nvPr/>
+        </p:nvSpPr>
+        <p:spPr>
+          <a:xfrm>
+            <a:off x="6279852" y="4549581"/>
+            <a:ext cx="204334" cy="694769"/>
+          </a:xfrm>
+          <a:prstGeom prst="rect">
+            <a:avLst/>
+          </a:prstGeom>
+          <a:solidFill>
+            <a:schemeClr val="accent2">
+              <a:lumMod val="40000"/>
+              <a:lumOff val="60000"/>
+            </a:schemeClr>
+          </a:solidFill>
+          <a:ln>
+            <a:solidFill>
+              <a:schemeClr val="accent2">
+                <a:lumMod val="60000"/>
+                <a:lumOff val="40000"/>
+              </a:schemeClr>
+            </a:solidFill>
+          </a:ln>
+        </p:spPr>
+        <p:style>
+          <a:lnRef idx="2">
+            <a:schemeClr val="accent1">
+              <a:shade val="50000"/>
+            </a:schemeClr>
+          </a:lnRef>
+          <a:fillRef idx="1">
+            <a:schemeClr val="accent1"/>
+          </a:fillRef>
+          <a:effectRef idx="0">
+            <a:schemeClr val="accent1"/>
+          </a:effectRef>
+          <a:fontRef idx="minor">
+            <a:schemeClr val="lt1"/>
+          </a:fontRef>
+        </p:style>
+        <p:txBody>
+          <a:bodyPr rtlCol="0" anchor="ctr"/>
+          <a:lstStyle/>
+          <a:p>
+            <a:pPr algn="ctr"/>
+            <a:endParaRPr lang="en-US"/>
+          </a:p>
+        </p:txBody>
+      </p:sp>
+      <p:cxnSp>
+        <p:nvCxnSpPr>
+          <p:cNvPr id="44" name="Straight Arrow Connector 43">
+            <a:extLst>
+              <a:ext uri="{FF2B5EF4-FFF2-40B4-BE49-F238E27FC236}">
+                <a16:creationId xmlns:a16="http://schemas.microsoft.com/office/drawing/2014/main" id="{992542AB-35DD-CF49-A49F-31AE5DF43E9C}"/>
+              </a:ext>
+            </a:extLst>
+          </p:cNvPr>
+          <p:cNvCxnSpPr>
+            <a:cxnSpLocks/>
+          </p:cNvCxnSpPr>
+          <p:nvPr/>
+        </p:nvCxnSpPr>
+        <p:spPr>
+          <a:xfrm>
+            <a:off x="6127452" y="2451849"/>
+            <a:ext cx="0" cy="694769"/>
+          </a:xfrm>
+          <a:prstGeom prst="straightConnector1">
+            <a:avLst/>
+          </a:prstGeom>
+          <a:ln>
+            <a:headEnd type="triangle"/>
+            <a:tailEnd type="triangle"/>
+          </a:ln>
+        </p:spPr>
+        <p:style>
+          <a:lnRef idx="1">
+            <a:schemeClr val="accent1"/>
+          </a:lnRef>
+          <a:fillRef idx="0">
+            <a:schemeClr val="accent1"/>
+          </a:fillRef>
+          <a:effectRef idx="0">
+            <a:schemeClr val="accent1"/>
+          </a:effectRef>
+          <a:fontRef idx="minor">
+            <a:schemeClr val="tx1"/>
+          </a:fontRef>
+        </p:style>
+      </p:cxnSp>
+      <mc:AlternateContent xmlns:mc="http://schemas.openxmlformats.org/markup-compatibility/2006">
+        <mc:Choice xmlns:a14="http://schemas.microsoft.com/office/drawing/2010/main" Requires="a14">
+          <p:sp>
+            <p:nvSpPr>
+              <p:cNvPr id="45" name="TextBox 44">
+                <a:extLst>
+                  <a:ext uri="{FF2B5EF4-FFF2-40B4-BE49-F238E27FC236}">
+                    <a16:creationId xmlns:a16="http://schemas.microsoft.com/office/drawing/2014/main" id="{9ED06322-89D0-234B-9CDA-65D3892FF7E5}"/>
+                  </a:ext>
+                </a:extLst>
+              </p:cNvPr>
+              <p:cNvSpPr txBox="1"/>
+              <p:nvPr/>
+            </p:nvSpPr>
+            <p:spPr>
+              <a:xfrm rot="16200000">
+                <a:off x="5224770" y="2715417"/>
+                <a:ext cx="1310230" cy="369332"/>
+              </a:xfrm>
+              <a:prstGeom prst="rect">
+                <a:avLst/>
+              </a:prstGeom>
+              <a:noFill/>
+            </p:spPr>
+            <p:txBody>
+              <a:bodyPr wrap="none" rtlCol="0">
+                <a:spAutoFit/>
+              </a:bodyPr>
+              <a:lstStyle/>
+              <a:p>
+                <a14:m>
+                  <m:oMathPara xmlns:m="http://schemas.openxmlformats.org/officeDocument/2006/math">
+                    <m:oMathParaPr>
+                      <m:jc m:val="centerGroup"/>
+                    </m:oMathParaPr>
+                    <m:oMath xmlns:m="http://schemas.openxmlformats.org/officeDocument/2006/math">
+                      <m:sSub>
+                        <m:sSubPr>
+                          <m:ctrlPr>
+                            <a:rPr lang="en-US" i="1" smtClean="0">
+                              <a:latin typeface="Cambria Math" panose="02040503050406030204" pitchFamily="18" charset="0"/>
+                            </a:rPr>
+                          </m:ctrlPr>
+                        </m:sSubPr>
+                        <m:e>
+                          <m:r>
+                            <a:rPr lang="es-ES" b="0" i="1" smtClean="0">
+                              <a:latin typeface="Cambria Math" panose="02040503050406030204" pitchFamily="18" charset="0"/>
+                            </a:rPr>
+                            <m:t>𝑀</m:t>
+                          </m:r>
+                        </m:e>
+                        <m:sub>
+                          <m:r>
+                            <a:rPr lang="es-ES" b="0" i="1" smtClean="0">
+                              <a:latin typeface="Cambria Math" panose="02040503050406030204" pitchFamily="18" charset="0"/>
+                            </a:rPr>
+                            <m:t>𝑒</m:t>
+                          </m:r>
+                        </m:sub>
+                      </m:sSub>
+                      <m:r>
+                        <a:rPr lang="es-ES" b="0" i="1" smtClean="0">
+                          <a:latin typeface="Cambria Math" panose="02040503050406030204" pitchFamily="18" charset="0"/>
+                        </a:rPr>
+                        <m:t>(</m:t>
+                      </m:r>
+                      <m:r>
+                        <a:rPr lang="es-ES" b="0" i="1" smtClean="0">
+                          <a:latin typeface="Cambria Math" panose="02040503050406030204" pitchFamily="18" charset="0"/>
+                        </a:rPr>
+                        <m:t>𝑔𝑖𝑣𝑒𝑛</m:t>
+                      </m:r>
+                      <m:r>
+                        <a:rPr lang="es-ES" b="0" i="1" smtClean="0">
+                          <a:latin typeface="Cambria Math" panose="02040503050406030204" pitchFamily="18" charset="0"/>
+                        </a:rPr>
+                        <m:t>)</m:t>
+                      </m:r>
+                    </m:oMath>
+                  </m:oMathPara>
+                </a14:m>
+                <a:endParaRPr lang="en-US" dirty="0"/>
+              </a:p>
+            </p:txBody>
+          </p:sp>
+        </mc:Choice>
+        <mc:Fallback>
+          <p:sp>
+            <p:nvSpPr>
+              <p:cNvPr id="45" name="TextBox 44">
+                <a:extLst>
+                  <a:ext uri="{FF2B5EF4-FFF2-40B4-BE49-F238E27FC236}">
+                    <a16:creationId xmlns:a16="http://schemas.microsoft.com/office/drawing/2014/main" id="{9ED06322-89D0-234B-9CDA-65D3892FF7E5}"/>
+                  </a:ext>
+                </a:extLst>
+              </p:cNvPr>
+              <p:cNvSpPr txBox="1">
+                <a:spLocks noRot="1" noChangeAspect="1" noMove="1" noResize="1" noEditPoints="1" noAdjustHandles="1" noChangeArrowheads="1" noChangeShapeType="1" noTextEdit="1"/>
+              </p:cNvSpPr>
+              <p:nvPr/>
+            </p:nvSpPr>
+            <p:spPr>
+              <a:xfrm rot="16200000">
+                <a:off x="5224770" y="2715417"/>
+                <a:ext cx="1310230" cy="369332"/>
+              </a:xfrm>
+              <a:prstGeom prst="rect">
+                <a:avLst/>
+              </a:prstGeom>
+              <a:blipFill>
+                <a:blip r:embed="rId4"/>
+                <a:stretch>
+                  <a:fillRect r="-9677"/>
+                </a:stretch>
+              </a:blipFill>
+            </p:spPr>
+            <p:txBody>
+              <a:bodyPr/>
+              <a:lstStyle/>
+              <a:p>
+                <a:r>
+                  <a:rPr lang="en-US">
+                    <a:noFill/>
+                  </a:rPr>
+                  <a:t> </a:t>
+                </a:r>
+              </a:p>
+            </p:txBody>
+          </p:sp>
+        </mc:Fallback>
+      </mc:AlternateContent>
+      <p:cxnSp>
+        <p:nvCxnSpPr>
+          <p:cNvPr id="46" name="Straight Arrow Connector 45">
+            <a:extLst>
+              <a:ext uri="{FF2B5EF4-FFF2-40B4-BE49-F238E27FC236}">
+                <a16:creationId xmlns:a16="http://schemas.microsoft.com/office/drawing/2014/main" id="{E7BD627A-C755-F241-8EA5-BC82AF0573D4}"/>
+              </a:ext>
+            </a:extLst>
+          </p:cNvPr>
+          <p:cNvCxnSpPr>
+            <a:cxnSpLocks/>
+          </p:cNvCxnSpPr>
+          <p:nvPr/>
+        </p:nvCxnSpPr>
+        <p:spPr>
+          <a:xfrm>
+            <a:off x="6279851" y="2191871"/>
+            <a:ext cx="1712259" cy="0"/>
+          </a:xfrm>
+          <a:prstGeom prst="straightConnector1">
+            <a:avLst/>
+          </a:prstGeom>
+          <a:ln>
+            <a:headEnd type="triangle"/>
+            <a:tailEnd type="triangle"/>
+          </a:ln>
+        </p:spPr>
+        <p:style>
+          <a:lnRef idx="1">
+            <a:schemeClr val="accent1"/>
+          </a:lnRef>
+          <a:fillRef idx="0">
+            <a:schemeClr val="accent1"/>
+          </a:fillRef>
+          <a:effectRef idx="0">
+            <a:schemeClr val="accent1"/>
+          </a:effectRef>
+          <a:fontRef idx="minor">
+            <a:schemeClr val="tx1"/>
+          </a:fontRef>
+        </p:style>
+      </p:cxnSp>
+      <mc:AlternateContent xmlns:mc="http://schemas.openxmlformats.org/markup-compatibility/2006">
+        <mc:Choice xmlns:a14="http://schemas.microsoft.com/office/drawing/2010/main" Requires="a14">
+          <p:sp>
+            <p:nvSpPr>
+              <p:cNvPr id="54" name="TextBox 53">
+                <a:extLst>
+                  <a:ext uri="{FF2B5EF4-FFF2-40B4-BE49-F238E27FC236}">
+                    <a16:creationId xmlns:a16="http://schemas.microsoft.com/office/drawing/2014/main" id="{763059FA-FAD3-D148-B823-FE100BD864A6}"/>
+                  </a:ext>
+                </a:extLst>
+              </p:cNvPr>
+              <p:cNvSpPr txBox="1"/>
+              <p:nvPr/>
+            </p:nvSpPr>
+            <p:spPr>
+              <a:xfrm>
+                <a:off x="6902487" y="1822539"/>
+                <a:ext cx="896592" cy="369332"/>
+              </a:xfrm>
+              <a:prstGeom prst="rect">
+                <a:avLst/>
+              </a:prstGeom>
+              <a:noFill/>
+            </p:spPr>
+            <p:txBody>
+              <a:bodyPr wrap="none" rtlCol="0">
+                <a:spAutoFit/>
+              </a:bodyPr>
+              <a:lstStyle/>
+              <a:p>
+                <a14:m>
+                  <m:oMathPara xmlns:m="http://schemas.openxmlformats.org/officeDocument/2006/math">
+                    <m:oMathParaPr>
+                      <m:jc m:val="centerGroup"/>
+                    </m:oMathParaPr>
+                    <m:oMath xmlns:m="http://schemas.openxmlformats.org/officeDocument/2006/math">
+                      <m:sSub>
+                        <m:sSubPr>
+                          <m:ctrlPr>
+                            <a:rPr lang="en-US" i="1" smtClean="0">
+                              <a:latin typeface="Cambria Math" panose="02040503050406030204" pitchFamily="18" charset="0"/>
+                            </a:rPr>
+                          </m:ctrlPr>
+                        </m:sSubPr>
+                        <m:e>
+                          <m:r>
+                            <a:rPr lang="es-ES" b="0" i="1" smtClean="0">
+                              <a:latin typeface="Cambria Math" panose="02040503050406030204" pitchFamily="18" charset="0"/>
+                            </a:rPr>
+                            <m:t>𝐿</m:t>
+                          </m:r>
+                        </m:e>
+                        <m:sub>
+                          <m:r>
+                            <a:rPr lang="es-ES" b="0" i="1" smtClean="0">
+                              <a:latin typeface="Cambria Math" panose="02040503050406030204" pitchFamily="18" charset="0"/>
+                            </a:rPr>
+                            <m:t>𝑒</m:t>
+                          </m:r>
+                        </m:sub>
+                      </m:sSub>
+                      <m:r>
+                        <a:rPr lang="es-ES" b="0" i="1" smtClean="0">
+                          <a:latin typeface="Cambria Math" panose="02040503050406030204" pitchFamily="18" charset="0"/>
+                        </a:rPr>
+                        <m:t>=1</m:t>
+                      </m:r>
+                    </m:oMath>
+                  </m:oMathPara>
+                </a14:m>
+                <a:endParaRPr lang="en-US" dirty="0"/>
+              </a:p>
+            </p:txBody>
+          </p:sp>
+        </mc:Choice>
+        <mc:Fallback>
+          <p:sp>
+            <p:nvSpPr>
+              <p:cNvPr id="54" name="TextBox 53">
+                <a:extLst>
+                  <a:ext uri="{FF2B5EF4-FFF2-40B4-BE49-F238E27FC236}">
+                    <a16:creationId xmlns:a16="http://schemas.microsoft.com/office/drawing/2014/main" id="{763059FA-FAD3-D148-B823-FE100BD864A6}"/>
+                  </a:ext>
+                </a:extLst>
+              </p:cNvPr>
+              <p:cNvSpPr txBox="1">
+                <a:spLocks noRot="1" noChangeAspect="1" noMove="1" noResize="1" noEditPoints="1" noAdjustHandles="1" noChangeArrowheads="1" noChangeShapeType="1" noTextEdit="1"/>
+              </p:cNvSpPr>
+              <p:nvPr/>
+            </p:nvSpPr>
+            <p:spPr>
+              <a:xfrm>
+                <a:off x="6902487" y="1822539"/>
+                <a:ext cx="896592" cy="369332"/>
+              </a:xfrm>
+              <a:prstGeom prst="rect">
+                <a:avLst/>
+              </a:prstGeom>
+              <a:blipFill>
+                <a:blip r:embed="rId5"/>
+                <a:stretch>
+                  <a:fillRect/>
+                </a:stretch>
+              </a:blipFill>
+            </p:spPr>
+            <p:txBody>
+              <a:bodyPr/>
+              <a:lstStyle/>
+              <a:p>
+                <a:r>
+                  <a:rPr lang="en-US">
+                    <a:noFill/>
+                  </a:rPr>
+                  <a:t> </a:t>
+                </a:r>
+              </a:p>
+            </p:txBody>
+          </p:sp>
+        </mc:Fallback>
+      </mc:AlternateContent>
+      <p:cxnSp>
+        <p:nvCxnSpPr>
+          <p:cNvPr id="55" name="Curved Connector 54">
+            <a:extLst>
+              <a:ext uri="{FF2B5EF4-FFF2-40B4-BE49-F238E27FC236}">
+                <a16:creationId xmlns:a16="http://schemas.microsoft.com/office/drawing/2014/main" id="{B7FB6492-C2A5-BB4C-9B83-3B76F4F48D36}"/>
+              </a:ext>
+            </a:extLst>
+          </p:cNvPr>
+          <p:cNvCxnSpPr>
+            <a:cxnSpLocks/>
+            <a:stCxn id="40" idx="0"/>
+            <a:endCxn id="40" idx="3"/>
+          </p:cNvCxnSpPr>
+          <p:nvPr/>
+        </p:nvCxnSpPr>
+        <p:spPr>
+          <a:xfrm rot="16200000" flipH="1">
+            <a:off x="6259409" y="2574458"/>
+            <a:ext cx="347385" cy="102167"/>
+          </a:xfrm>
+          <a:prstGeom prst="curvedConnector4">
+            <a:avLst>
+              <a:gd name="adj1" fmla="val -16774"/>
+              <a:gd name="adj2" fmla="val 323751"/>
+            </a:avLst>
+          </a:prstGeom>
+          <a:ln>
+            <a:solidFill>
+              <a:schemeClr val="accent4">
+                <a:lumMod val="40000"/>
+                <a:lumOff val="60000"/>
+              </a:schemeClr>
+            </a:solidFill>
+            <a:prstDash val="dash"/>
+            <a:tailEnd type="triangle"/>
+          </a:ln>
+        </p:spPr>
+        <p:style>
+          <a:lnRef idx="1">
+            <a:schemeClr val="accent1"/>
+          </a:lnRef>
+          <a:fillRef idx="0">
+            <a:schemeClr val="accent1"/>
+          </a:fillRef>
+          <a:effectRef idx="0">
+            <a:schemeClr val="accent1"/>
+          </a:effectRef>
+          <a:fontRef idx="minor">
+            <a:schemeClr val="tx1"/>
+          </a:fontRef>
+        </p:style>
+      </p:cxnSp>
+      <p:cxnSp>
+        <p:nvCxnSpPr>
+          <p:cNvPr id="56" name="Curved Connector 55">
+            <a:extLst>
+              <a:ext uri="{FF2B5EF4-FFF2-40B4-BE49-F238E27FC236}">
+                <a16:creationId xmlns:a16="http://schemas.microsoft.com/office/drawing/2014/main" id="{4B9894DD-1441-1445-AA5A-BFFA0EE3A290}"/>
+              </a:ext>
+            </a:extLst>
+          </p:cNvPr>
+          <p:cNvCxnSpPr>
+            <a:cxnSpLocks/>
+            <a:stCxn id="41" idx="0"/>
+            <a:endCxn id="41" idx="3"/>
+          </p:cNvCxnSpPr>
+          <p:nvPr/>
+        </p:nvCxnSpPr>
+        <p:spPr>
+          <a:xfrm rot="16200000" flipH="1">
+            <a:off x="6259409" y="3623324"/>
+            <a:ext cx="347385" cy="102167"/>
+          </a:xfrm>
+          <a:prstGeom prst="curvedConnector4">
+            <a:avLst>
+              <a:gd name="adj1" fmla="val -37419"/>
+              <a:gd name="adj2" fmla="val 323751"/>
+            </a:avLst>
+          </a:prstGeom>
+          <a:ln>
+            <a:solidFill>
+              <a:schemeClr val="accent6">
+                <a:lumMod val="40000"/>
+                <a:lumOff val="60000"/>
+              </a:schemeClr>
+            </a:solidFill>
+            <a:prstDash val="dash"/>
+            <a:tailEnd type="triangle"/>
+          </a:ln>
+        </p:spPr>
+        <p:style>
+          <a:lnRef idx="1">
+            <a:schemeClr val="accent1"/>
+          </a:lnRef>
+          <a:fillRef idx="0">
+            <a:schemeClr val="accent1"/>
+          </a:fillRef>
+          <a:effectRef idx="0">
+            <a:schemeClr val="accent1"/>
+          </a:effectRef>
+          <a:fontRef idx="minor">
+            <a:schemeClr val="tx1"/>
+          </a:fontRef>
+        </p:style>
+      </p:cxnSp>
+      <p:cxnSp>
+        <p:nvCxnSpPr>
+          <p:cNvPr id="57" name="Curved Connector 56">
+            <a:extLst>
+              <a:ext uri="{FF2B5EF4-FFF2-40B4-BE49-F238E27FC236}">
+                <a16:creationId xmlns:a16="http://schemas.microsoft.com/office/drawing/2014/main" id="{CD1755D6-07F4-204F-9093-795D0D221E55}"/>
+              </a:ext>
+            </a:extLst>
+          </p:cNvPr>
+          <p:cNvCxnSpPr>
+            <a:cxnSpLocks/>
+            <a:stCxn id="43" idx="0"/>
+            <a:endCxn id="43" idx="3"/>
+          </p:cNvCxnSpPr>
+          <p:nvPr/>
+        </p:nvCxnSpPr>
+        <p:spPr>
+          <a:xfrm rot="16200000" flipH="1">
+            <a:off x="6259409" y="4672190"/>
+            <a:ext cx="347385" cy="102167"/>
+          </a:xfrm>
+          <a:prstGeom prst="curvedConnector4">
+            <a:avLst>
+              <a:gd name="adj1" fmla="val -34838"/>
+              <a:gd name="adj2" fmla="val 323751"/>
+            </a:avLst>
+          </a:prstGeom>
+          <a:ln>
+            <a:solidFill>
+              <a:schemeClr val="accent2">
+                <a:lumMod val="40000"/>
+                <a:lumOff val="60000"/>
+              </a:schemeClr>
+            </a:solidFill>
+            <a:prstDash val="dash"/>
+            <a:tailEnd type="triangle"/>
+          </a:ln>
+        </p:spPr>
+        <p:style>
+          <a:lnRef idx="1">
+            <a:schemeClr val="accent1"/>
+          </a:lnRef>
+          <a:fillRef idx="0">
+            <a:schemeClr val="accent1"/>
+          </a:fillRef>
+          <a:effectRef idx="0">
+            <a:schemeClr val="accent1"/>
+          </a:effectRef>
+          <a:fontRef idx="minor">
+            <a:schemeClr val="tx1"/>
+          </a:fontRef>
+        </p:style>
+      </p:cxnSp>
+    </p:spTree>
+    <p:extLst>
+      <p:ext uri="{BB962C8B-B14F-4D97-AF65-F5344CB8AC3E}">
+        <p14:creationId xmlns:p14="http://schemas.microsoft.com/office/powerpoint/2010/main" val="3982121406"/>
       </p:ext>
     </p:extLst>
   </p:cSld>

</xml_diff>

<commit_message>
imgs for big picture
</commit_message>
<xml_diff>
--- a/images/images.pptx
+++ b/images/images.pptx
@@ -17812,7 +17812,7 @@
         </p:nvSpPr>
         <p:spPr>
           <a:xfrm>
-            <a:off x="1289477" y="1884373"/>
+            <a:off x="2645403" y="1810536"/>
             <a:ext cx="1712259" cy="896470"/>
           </a:xfrm>
           <a:prstGeom prst="rect">
@@ -17872,7 +17872,7 @@
         </p:nvSpPr>
         <p:spPr>
           <a:xfrm>
-            <a:off x="4252279" y="1515041"/>
+            <a:off x="5608205" y="1441204"/>
             <a:ext cx="1712259" cy="448235"/>
           </a:xfrm>
           <a:prstGeom prst="rect">
@@ -17932,7 +17932,7 @@
         </p:nvSpPr>
         <p:spPr>
           <a:xfrm>
-            <a:off x="4252279" y="2214285"/>
+            <a:off x="5608205" y="2140448"/>
             <a:ext cx="1712259" cy="448235"/>
           </a:xfrm>
           <a:prstGeom prst="rect">
@@ -17992,7 +17992,7 @@
         </p:nvSpPr>
         <p:spPr>
           <a:xfrm>
-            <a:off x="4252279" y="2913529"/>
+            <a:off x="5608205" y="2839692"/>
             <a:ext cx="1712259" cy="448235"/>
           </a:xfrm>
           <a:prstGeom prst="rect">
@@ -18052,7 +18052,7 @@
         </p:nvCxnSpPr>
         <p:spPr>
           <a:xfrm>
-            <a:off x="1065359" y="1884373"/>
+            <a:off x="2421285" y="1810536"/>
             <a:ext cx="0" cy="896470"/>
           </a:xfrm>
           <a:prstGeom prst="straightConnector1">
@@ -18092,7 +18092,7 @@
         </p:nvSpPr>
         <p:spPr>
           <a:xfrm>
-            <a:off x="683523" y="2147942"/>
+            <a:off x="2039449" y="2074105"/>
             <a:ext cx="381836" cy="369332"/>
           </a:xfrm>
           <a:prstGeom prst="rect">
@@ -18127,7 +18127,7 @@
         </p:nvCxnSpPr>
         <p:spPr>
           <a:xfrm>
-            <a:off x="1289477" y="1642326"/>
+            <a:off x="2645403" y="1568489"/>
             <a:ext cx="1712259" cy="0"/>
           </a:xfrm>
           <a:prstGeom prst="straightConnector1">
@@ -18167,7 +18167,7 @@
         </p:nvSpPr>
         <p:spPr>
           <a:xfrm>
-            <a:off x="2004381" y="1281070"/>
+            <a:off x="3360307" y="1207233"/>
             <a:ext cx="282450" cy="369332"/>
           </a:xfrm>
           <a:prstGeom prst="rect">
@@ -18204,7 +18204,7 @@
         </p:nvCxnSpPr>
         <p:spPr>
           <a:xfrm>
-            <a:off x="4126775" y="1515041"/>
+            <a:off x="5482701" y="1441204"/>
             <a:ext cx="0" cy="448235"/>
           </a:xfrm>
           <a:prstGeom prst="straightConnector1">
@@ -18246,7 +18246,7 @@
             </p:nvSpPr>
             <p:spPr>
               <a:xfrm>
-                <a:off x="3636399" y="1515041"/>
+                <a:off x="4992325" y="1441204"/>
                 <a:ext cx="527196" cy="369332"/>
               </a:xfrm>
               <a:prstGeom prst="rect">
@@ -18317,7 +18317,7 @@
             </p:nvSpPr>
             <p:spPr>
               <a:xfrm>
-                <a:off x="3636399" y="1515041"/>
+                <a:off x="4992325" y="1441204"/>
                 <a:ext cx="527196" cy="369332"/>
               </a:xfrm>
               <a:prstGeom prst="rect">
@@ -18359,7 +18359,7 @@
         </p:nvCxnSpPr>
         <p:spPr>
           <a:xfrm>
-            <a:off x="4252279" y="1380570"/>
+            <a:off x="5608205" y="1306733"/>
             <a:ext cx="1712259" cy="0"/>
           </a:xfrm>
           <a:prstGeom prst="straightConnector1">
@@ -18401,7 +18401,7 @@
             </p:nvSpPr>
             <p:spPr>
               <a:xfrm>
-                <a:off x="4660144" y="1020205"/>
+                <a:off x="6016070" y="946368"/>
                 <a:ext cx="896527" cy="369332"/>
               </a:xfrm>
               <a:prstGeom prst="rect">
@@ -18484,7 +18484,7 @@
             </p:nvSpPr>
             <p:spPr>
               <a:xfrm>
-                <a:off x="4660144" y="1020205"/>
+                <a:off x="6016070" y="946368"/>
                 <a:ext cx="896527" cy="369332"/>
               </a:xfrm>
               <a:prstGeom prst="rect">
@@ -18526,7 +18526,7 @@
         </p:nvSpPr>
         <p:spPr>
           <a:xfrm>
-            <a:off x="3902656" y="582704"/>
+            <a:off x="5258582" y="508867"/>
             <a:ext cx="2189638" cy="369332"/>
           </a:xfrm>
           <a:prstGeom prst="rect">
@@ -18769,8 +18769,8 @@
           </a:fontRef>
         </p:style>
       </p:cxnSp>
-      <mc:AlternateContent xmlns:mc="http://schemas.openxmlformats.org/markup-compatibility/2006">
-        <mc:Choice xmlns:a14="http://schemas.microsoft.com/office/drawing/2010/main" Requires="a14">
+      <mc:AlternateContent xmlns:mc="http://schemas.openxmlformats.org/markup-compatibility/2006" xmlns:a14="http://schemas.microsoft.com/office/drawing/2010/main">
+        <mc:Choice Requires="a14">
           <p:sp>
             <p:nvSpPr>
               <p:cNvPr id="39" name="TextBox 38">
@@ -18839,7 +18839,7 @@
             </p:txBody>
           </p:sp>
         </mc:Choice>
-        <mc:Fallback>
+        <mc:Fallback xmlns="">
           <p:sp>
             <p:nvSpPr>
               <p:cNvPr id="39" name="TextBox 38">
@@ -18926,8 +18926,8 @@
           </a:fontRef>
         </p:style>
       </p:cxnSp>
-      <mc:AlternateContent xmlns:mc="http://schemas.openxmlformats.org/markup-compatibility/2006">
-        <mc:Choice xmlns:a14="http://schemas.microsoft.com/office/drawing/2010/main" Requires="a14">
+      <mc:AlternateContent xmlns:mc="http://schemas.openxmlformats.org/markup-compatibility/2006" xmlns:a14="http://schemas.microsoft.com/office/drawing/2010/main">
+        <mc:Choice Requires="a14">
           <p:sp>
             <p:nvSpPr>
               <p:cNvPr id="41" name="TextBox 40">
@@ -19014,7 +19014,7 @@
             </p:txBody>
           </p:sp>
         </mc:Choice>
-        <mc:Fallback>
+        <mc:Fallback xmlns="">
           <p:sp>
             <p:nvSpPr>
               <p:cNvPr id="41" name="TextBox 40">
@@ -19059,8 +19059,8 @@
           </p:sp>
         </mc:Fallback>
       </mc:AlternateContent>
-      <mc:AlternateContent xmlns:mc="http://schemas.openxmlformats.org/markup-compatibility/2006">
-        <mc:Choice xmlns:a14="http://schemas.microsoft.com/office/drawing/2010/main" Requires="a14">
+      <mc:AlternateContent xmlns:mc="http://schemas.openxmlformats.org/markup-compatibility/2006" xmlns:a14="http://schemas.microsoft.com/office/drawing/2010/main">
+        <mc:Choice Requires="a14">
           <p:sp>
             <p:nvSpPr>
               <p:cNvPr id="42" name="TextBox 41">
@@ -19139,7 +19139,7 @@
             </p:txBody>
           </p:sp>
         </mc:Choice>
-        <mc:Fallback>
+        <mc:Fallback xmlns="">
           <p:sp>
             <p:nvSpPr>
               <p:cNvPr id="42" name="TextBox 41">
@@ -19198,7 +19198,7 @@
         </p:nvSpPr>
         <p:spPr>
           <a:xfrm>
-            <a:off x="6092294" y="1465736"/>
+            <a:off x="7448220" y="1391899"/>
             <a:ext cx="45719" cy="1963264"/>
           </a:xfrm>
           <a:prstGeom prst="rightBrace">
@@ -19242,7 +19242,7 @@
         </p:nvSpPr>
         <p:spPr>
           <a:xfrm>
-            <a:off x="6138013" y="2262702"/>
+            <a:off x="7493939" y="2188865"/>
             <a:ext cx="304892" cy="369332"/>
           </a:xfrm>
           <a:prstGeom prst="rect">
@@ -19356,7 +19356,7 @@
         </p:nvSpPr>
         <p:spPr>
           <a:xfrm>
-            <a:off x="6569287" y="4650898"/>
+            <a:off x="6216094" y="4650898"/>
             <a:ext cx="2176563" cy="322730"/>
           </a:xfrm>
           <a:prstGeom prst="rect">
@@ -19416,7 +19416,7 @@
         </p:nvSpPr>
         <p:spPr>
           <a:xfrm>
-            <a:off x="6569287" y="5350142"/>
+            <a:off x="6216094" y="5350142"/>
             <a:ext cx="2176563" cy="322730"/>
           </a:xfrm>
           <a:prstGeom prst="rect">
@@ -19476,7 +19476,7 @@
         </p:nvSpPr>
         <p:spPr>
           <a:xfrm>
-            <a:off x="6569287" y="6049386"/>
+            <a:off x="6216094" y="6049386"/>
             <a:ext cx="2176563" cy="322730"/>
           </a:xfrm>
           <a:prstGeom prst="rect">
@@ -19538,7 +19538,7 @@
         </p:nvCxnSpPr>
         <p:spPr>
           <a:xfrm>
-            <a:off x="6464335" y="4586368"/>
+            <a:off x="6111142" y="4586368"/>
             <a:ext cx="0" cy="448235"/>
           </a:xfrm>
           <a:prstGeom prst="straightConnector1">
@@ -19580,7 +19580,7 @@
             </p:nvSpPr>
             <p:spPr>
               <a:xfrm>
-                <a:off x="5973959" y="4586368"/>
+                <a:off x="5620766" y="4586368"/>
                 <a:ext cx="527196" cy="369332"/>
               </a:xfrm>
               <a:prstGeom prst="rect">
@@ -19651,7 +19651,7 @@
             </p:nvSpPr>
             <p:spPr>
               <a:xfrm>
-                <a:off x="5973959" y="4586368"/>
+                <a:off x="5620766" y="4586368"/>
                 <a:ext cx="527196" cy="369332"/>
               </a:xfrm>
               <a:prstGeom prst="rect">
@@ -19695,7 +19695,7 @@
         </p:nvCxnSpPr>
         <p:spPr>
           <a:xfrm>
-            <a:off x="6589839" y="4451897"/>
+            <a:off x="6236646" y="4451897"/>
             <a:ext cx="2156011" cy="0"/>
           </a:xfrm>
           <a:prstGeom prst="straightConnector1">
@@ -19737,7 +19737,7 @@
             </p:nvSpPr>
             <p:spPr>
               <a:xfrm>
-                <a:off x="6934308" y="4076870"/>
+                <a:off x="6581115" y="4076870"/>
                 <a:ext cx="1301318" cy="369332"/>
               </a:xfrm>
               <a:prstGeom prst="rect">
@@ -19826,7 +19826,7 @@
             </p:nvSpPr>
             <p:spPr>
               <a:xfrm>
-                <a:off x="6934308" y="4076870"/>
+                <a:off x="6581115" y="4076870"/>
                 <a:ext cx="1301318" cy="369332"/>
               </a:xfrm>
               <a:prstGeom prst="rect">
@@ -19870,7 +19870,7 @@
             </p:nvSpPr>
             <p:spPr>
               <a:xfrm>
-                <a:off x="5872714" y="3654031"/>
+                <a:off x="5519521" y="3654031"/>
                 <a:ext cx="4398705" cy="369332"/>
               </a:xfrm>
               <a:prstGeom prst="rect">
@@ -19951,7 +19951,7 @@
             </p:nvSpPr>
             <p:spPr>
               <a:xfrm>
-                <a:off x="5872714" y="3654031"/>
+                <a:off x="5519521" y="3654031"/>
                 <a:ext cx="4398705" cy="369332"/>
               </a:xfrm>
               <a:prstGeom prst="rect">
@@ -19960,7 +19960,7 @@
               <a:blipFill>
                 <a:blip r:embed="rId9"/>
                 <a:stretch>
-                  <a:fillRect l="-862" t="-10345" b="-24138"/>
+                  <a:fillRect l="-1153" t="-10345" b="-24138"/>
                 </a:stretch>
               </a:blipFill>
             </p:spPr>
@@ -19993,7 +19993,7 @@
         </p:nvSpPr>
         <p:spPr>
           <a:xfrm>
-            <a:off x="8938381" y="4506574"/>
+            <a:off x="8585188" y="4506574"/>
             <a:ext cx="45719" cy="1963264"/>
           </a:xfrm>
           <a:prstGeom prst="rightBrace">
@@ -20037,7 +20037,7 @@
         </p:nvSpPr>
         <p:spPr>
           <a:xfrm>
-            <a:off x="8984100" y="5303540"/>
+            <a:off x="8630907" y="5303540"/>
             <a:ext cx="304892" cy="369332"/>
           </a:xfrm>
           <a:prstGeom prst="rect">
@@ -20102,7 +20102,7 @@
         </p:nvSpPr>
         <p:spPr>
           <a:xfrm>
-            <a:off x="856422" y="3102666"/>
+            <a:off x="596744" y="1471043"/>
             <a:ext cx="1712259" cy="896470"/>
           </a:xfrm>
           <a:prstGeom prst="rect">
@@ -20162,7 +20162,7 @@
         </p:nvCxnSpPr>
         <p:spPr>
           <a:xfrm>
-            <a:off x="632304" y="3102666"/>
+            <a:off x="372626" y="1471043"/>
             <a:ext cx="0" cy="896470"/>
           </a:xfrm>
           <a:prstGeom prst="straightConnector1">
@@ -20202,7 +20202,7 @@
         </p:nvSpPr>
         <p:spPr>
           <a:xfrm>
-            <a:off x="250468" y="3366235"/>
+            <a:off x="-9210" y="1734612"/>
             <a:ext cx="381836" cy="369332"/>
           </a:xfrm>
           <a:prstGeom prst="rect">
@@ -20237,7 +20237,7 @@
         </p:nvCxnSpPr>
         <p:spPr>
           <a:xfrm>
-            <a:off x="856422" y="2860619"/>
+            <a:off x="596744" y="1228996"/>
             <a:ext cx="1712259" cy="0"/>
           </a:xfrm>
           <a:prstGeom prst="straightConnector1">
@@ -20277,7 +20277,7 @@
         </p:nvSpPr>
         <p:spPr>
           <a:xfrm>
-            <a:off x="1571326" y="2499363"/>
+            <a:off x="1311648" y="867740"/>
             <a:ext cx="282450" cy="369332"/>
           </a:xfrm>
           <a:prstGeom prst="rect">
@@ -20312,7 +20312,7 @@
         </p:nvSpPr>
         <p:spPr>
           <a:xfrm>
-            <a:off x="3733200" y="2111853"/>
+            <a:off x="978170" y="3718794"/>
             <a:ext cx="907166" cy="896470"/>
           </a:xfrm>
           <a:prstGeom prst="rect">
@@ -20372,7 +20372,7 @@
         </p:nvSpPr>
         <p:spPr>
           <a:xfrm>
-            <a:off x="3733200" y="3160719"/>
+            <a:off x="978170" y="4767660"/>
             <a:ext cx="907166" cy="896470"/>
           </a:xfrm>
           <a:prstGeom prst="rect">
@@ -20432,7 +20432,7 @@
         </p:nvSpPr>
         <p:spPr>
           <a:xfrm>
-            <a:off x="3733200" y="4209585"/>
+            <a:off x="978170" y="5816526"/>
             <a:ext cx="907166" cy="896470"/>
           </a:xfrm>
           <a:prstGeom prst="rect">
@@ -20494,7 +20494,7 @@
         </p:nvCxnSpPr>
         <p:spPr>
           <a:xfrm>
-            <a:off x="3580800" y="2111853"/>
+            <a:off x="825770" y="3718794"/>
             <a:ext cx="0" cy="896470"/>
           </a:xfrm>
           <a:prstGeom prst="straightConnector1">
@@ -20536,7 +20536,7 @@
             </p:nvSpPr>
             <p:spPr>
               <a:xfrm rot="16200000">
-                <a:off x="2857124" y="2402313"/>
+                <a:off x="102094" y="4009254"/>
                 <a:ext cx="1031373" cy="369332"/>
               </a:xfrm>
               <a:prstGeom prst="rect">
@@ -20619,7 +20619,7 @@
             </p:nvSpPr>
             <p:spPr>
               <a:xfrm rot="16200000">
-                <a:off x="2857124" y="2402313"/>
+                <a:off x="102094" y="4009254"/>
                 <a:ext cx="1031373" cy="369332"/>
               </a:xfrm>
               <a:prstGeom prst="rect">
@@ -20663,7 +20663,7 @@
         </p:nvCxnSpPr>
         <p:spPr>
           <a:xfrm>
-            <a:off x="3708452" y="1977382"/>
+            <a:off x="953422" y="3584323"/>
             <a:ext cx="907167" cy="0"/>
           </a:xfrm>
           <a:prstGeom prst="straightConnector1">
@@ -20705,7 +20705,7 @@
             </p:nvSpPr>
             <p:spPr>
               <a:xfrm>
-                <a:off x="3938361" y="1600187"/>
+                <a:off x="1219380" y="3241833"/>
                 <a:ext cx="466986" cy="369332"/>
               </a:xfrm>
               <a:prstGeom prst="rect">
@@ -20776,7 +20776,7 @@
             </p:nvSpPr>
             <p:spPr>
               <a:xfrm>
-                <a:off x="3938361" y="1600187"/>
+                <a:off x="1219380" y="3241833"/>
                 <a:ext cx="466986" cy="369332"/>
               </a:xfrm>
               <a:prstGeom prst="rect">
@@ -20818,7 +20818,7 @@
         </p:nvSpPr>
         <p:spPr>
           <a:xfrm>
-            <a:off x="3444475" y="1273649"/>
+            <a:off x="654494" y="317780"/>
             <a:ext cx="1921745" cy="369332"/>
           </a:xfrm>
           <a:prstGeom prst="rect">
@@ -20855,7 +20855,7 @@
             </p:nvSpPr>
             <p:spPr>
               <a:xfrm>
-                <a:off x="6530739" y="123507"/>
+                <a:off x="3492818" y="2822645"/>
                 <a:ext cx="4265655" cy="369332"/>
               </a:xfrm>
               <a:prstGeom prst="rect">
@@ -20936,7 +20936,7 @@
             </p:nvSpPr>
             <p:spPr>
               <a:xfrm>
-                <a:off x="6530739" y="123507"/>
+                <a:off x="3492818" y="2822645"/>
                 <a:ext cx="4265655" cy="369332"/>
               </a:xfrm>
               <a:prstGeom prst="rect">
@@ -20945,7 +20945,7 @@
               <a:blipFill>
                 <a:blip r:embed="rId4"/>
                 <a:stretch>
-                  <a:fillRect l="-890" t="-6667" b="-23333"/>
+                  <a:fillRect l="-890" t="-3333" b="-26667"/>
                 </a:stretch>
               </a:blipFill>
             </p:spPr>
@@ -20978,7 +20978,7 @@
         </p:nvSpPr>
         <p:spPr>
           <a:xfrm>
-            <a:off x="7291918" y="961712"/>
+            <a:off x="4381729" y="3691206"/>
             <a:ext cx="2291251" cy="495308"/>
           </a:xfrm>
           <a:prstGeom prst="rect">
@@ -21038,7 +21038,7 @@
         </p:nvSpPr>
         <p:spPr>
           <a:xfrm>
-            <a:off x="7291918" y="1582051"/>
+            <a:off x="4381729" y="4311545"/>
             <a:ext cx="2291251" cy="495308"/>
           </a:xfrm>
           <a:prstGeom prst="rect">
@@ -21098,7 +21098,7 @@
         </p:nvSpPr>
         <p:spPr>
           <a:xfrm>
-            <a:off x="7291918" y="2176657"/>
+            <a:off x="4381729" y="4906151"/>
             <a:ext cx="2291251" cy="495308"/>
           </a:xfrm>
           <a:prstGeom prst="rect">
@@ -21160,7 +21160,7 @@
         </p:nvCxnSpPr>
         <p:spPr>
           <a:xfrm>
-            <a:off x="7139519" y="961711"/>
+            <a:off x="4229330" y="3691205"/>
             <a:ext cx="0" cy="896470"/>
           </a:xfrm>
           <a:prstGeom prst="straightConnector1">
@@ -21202,7 +21202,7 @@
             </p:nvSpPr>
             <p:spPr>
               <a:xfrm rot="16200000">
-                <a:off x="6276416" y="1252171"/>
+                <a:off x="3366227" y="3981665"/>
                 <a:ext cx="1310230" cy="369332"/>
               </a:xfrm>
               <a:prstGeom prst="rect">
@@ -21291,7 +21291,7 @@
             </p:nvSpPr>
             <p:spPr>
               <a:xfrm rot="16200000">
-                <a:off x="6276416" y="1252171"/>
+                <a:off x="3366227" y="3981665"/>
                 <a:ext cx="1310230" cy="369332"/>
               </a:xfrm>
               <a:prstGeom prst="rect">
@@ -21335,7 +21335,7 @@
         </p:nvCxnSpPr>
         <p:spPr>
           <a:xfrm>
-            <a:off x="7291918" y="827240"/>
+            <a:off x="4381729" y="3556734"/>
             <a:ext cx="2291251" cy="0"/>
           </a:xfrm>
           <a:prstGeom prst="straightConnector1">
@@ -21377,7 +21377,7 @@
             </p:nvSpPr>
             <p:spPr>
               <a:xfrm>
-                <a:off x="8335895" y="475374"/>
+                <a:off x="5305523" y="3165605"/>
                 <a:ext cx="466986" cy="369332"/>
               </a:xfrm>
               <a:prstGeom prst="rect">
@@ -21448,7 +21448,7 @@
             </p:nvSpPr>
             <p:spPr>
               <a:xfrm>
-                <a:off x="8335895" y="475374"/>
+                <a:off x="5305523" y="3165605"/>
                 <a:ext cx="466986" cy="369332"/>
               </a:xfrm>
               <a:prstGeom prst="rect">
@@ -21490,7 +21490,7 @@
         </p:nvSpPr>
         <p:spPr>
           <a:xfrm>
-            <a:off x="4802208" y="2121034"/>
+            <a:off x="2047178" y="3727975"/>
             <a:ext cx="55828" cy="3012130"/>
           </a:xfrm>
           <a:prstGeom prst="rightBrace">
@@ -21534,7 +21534,7 @@
         </p:nvSpPr>
         <p:spPr>
           <a:xfrm>
-            <a:off x="4858036" y="3442433"/>
+            <a:off x="2147559" y="5049374"/>
             <a:ext cx="372307" cy="369332"/>
           </a:xfrm>
           <a:prstGeom prst="rect">
@@ -21569,7 +21569,7 @@
         </p:nvSpPr>
         <p:spPr>
           <a:xfrm>
-            <a:off x="9758890" y="781722"/>
+            <a:off x="6848701" y="3511216"/>
             <a:ext cx="45719" cy="1963264"/>
           </a:xfrm>
           <a:prstGeom prst="rightBrace">
@@ -21613,7 +21613,7 @@
         </p:nvSpPr>
         <p:spPr>
           <a:xfrm>
-            <a:off x="9804609" y="1578688"/>
+            <a:off x="6894420" y="4308182"/>
             <a:ext cx="304892" cy="369332"/>
           </a:xfrm>
           <a:prstGeom prst="rect">
@@ -21650,7 +21650,7 @@
             </p:nvSpPr>
             <p:spPr>
               <a:xfrm>
-                <a:off x="6429090" y="2860619"/>
+                <a:off x="7810272" y="2822477"/>
                 <a:ext cx="4265655" cy="369332"/>
               </a:xfrm>
               <a:prstGeom prst="rect">
@@ -21731,7 +21731,7 @@
             </p:nvSpPr>
             <p:spPr>
               <a:xfrm>
-                <a:off x="6429090" y="2860619"/>
+                <a:off x="7810272" y="2822477"/>
                 <a:ext cx="4265655" cy="369332"/>
               </a:xfrm>
               <a:prstGeom prst="rect">
@@ -21773,7 +21773,7 @@
         </p:nvSpPr>
         <p:spPr>
           <a:xfrm>
-            <a:off x="7183155" y="3662084"/>
+            <a:off x="10088385" y="3625990"/>
             <a:ext cx="671862" cy="939802"/>
           </a:xfrm>
           <a:prstGeom prst="rect">
@@ -21833,7 +21833,7 @@
         </p:nvSpPr>
         <p:spPr>
           <a:xfrm>
-            <a:off x="7190270" y="4689728"/>
+            <a:off x="10095500" y="4653634"/>
             <a:ext cx="671862" cy="939802"/>
           </a:xfrm>
           <a:prstGeom prst="rect">
@@ -21893,7 +21893,7 @@
         </p:nvSpPr>
         <p:spPr>
           <a:xfrm>
-            <a:off x="7190270" y="5717373"/>
+            <a:off x="10095500" y="5681279"/>
             <a:ext cx="671862" cy="939802"/>
           </a:xfrm>
           <a:prstGeom prst="rect">
@@ -21955,7 +21955,7 @@
         </p:nvCxnSpPr>
         <p:spPr>
           <a:xfrm>
-            <a:off x="7037870" y="3698823"/>
+            <a:off x="9943100" y="3662729"/>
             <a:ext cx="0" cy="896470"/>
           </a:xfrm>
           <a:prstGeom prst="straightConnector1">
@@ -21997,7 +21997,7 @@
             </p:nvSpPr>
             <p:spPr>
               <a:xfrm rot="16200000">
-                <a:off x="6174767" y="3989283"/>
+                <a:off x="9079997" y="3953189"/>
                 <a:ext cx="1310230" cy="369332"/>
               </a:xfrm>
               <a:prstGeom prst="rect">
@@ -22086,7 +22086,7 @@
             </p:nvSpPr>
             <p:spPr>
               <a:xfrm rot="16200000">
-                <a:off x="6174767" y="3989283"/>
+                <a:off x="9079997" y="3953189"/>
                 <a:ext cx="1310230" cy="369332"/>
               </a:xfrm>
               <a:prstGeom prst="rect">
@@ -22130,7 +22130,7 @@
         </p:nvCxnSpPr>
         <p:spPr>
           <a:xfrm>
-            <a:off x="7190269" y="3564352"/>
+            <a:off x="10095499" y="3528258"/>
             <a:ext cx="664748" cy="0"/>
           </a:xfrm>
           <a:prstGeom prst="straightConnector1">
@@ -22172,7 +22172,7 @@
             </p:nvSpPr>
             <p:spPr>
               <a:xfrm>
-                <a:off x="7304063" y="3217734"/>
+                <a:off x="10209293" y="3181640"/>
                 <a:ext cx="466986" cy="369332"/>
               </a:xfrm>
               <a:prstGeom prst="rect">
@@ -22243,7 +22243,7 @@
             </p:nvSpPr>
             <p:spPr>
               <a:xfrm>
-                <a:off x="7304063" y="3217734"/>
+                <a:off x="10209293" y="3181640"/>
                 <a:ext cx="466986" cy="369332"/>
               </a:xfrm>
               <a:prstGeom prst="rect">
@@ -22285,7 +22285,7 @@
         </p:nvSpPr>
         <p:spPr>
           <a:xfrm>
-            <a:off x="7977904" y="3662083"/>
+            <a:off x="10883134" y="3625989"/>
             <a:ext cx="45719" cy="2995092"/>
           </a:xfrm>
           <a:prstGeom prst="rightBrace">
@@ -22329,7 +22329,7 @@
         </p:nvSpPr>
         <p:spPr>
           <a:xfrm>
-            <a:off x="8022457" y="4973255"/>
+            <a:off x="10927687" y="4937161"/>
             <a:ext cx="304892" cy="369332"/>
           </a:xfrm>
           <a:prstGeom prst="rect">

</xml_diff>